<commit_message>
Added one slide, no content
</commit_message>
<xml_diff>
--- a/WebAPI_Short.pptx
+++ b/WebAPI_Short.pptx
@@ -5,23 +5,24 @@
     <p:sldMasterId id="2147483672" r:id="rId4"/>
   </p:sldMasterIdLst>
   <p:notesMasterIdLst>
-    <p:notesMasterId r:id="rId16"/>
+    <p:notesMasterId r:id="rId17"/>
   </p:notesMasterIdLst>
   <p:handoutMasterIdLst>
-    <p:handoutMasterId r:id="rId17"/>
+    <p:handoutMasterId r:id="rId18"/>
   </p:handoutMasterIdLst>
   <p:sldIdLst>
     <p:sldId id="256" r:id="rId5"/>
     <p:sldId id="260" r:id="rId6"/>
-    <p:sldId id="282" r:id="rId7"/>
-    <p:sldId id="263" r:id="rId8"/>
-    <p:sldId id="267" r:id="rId9"/>
-    <p:sldId id="268" r:id="rId10"/>
-    <p:sldId id="269" r:id="rId11"/>
-    <p:sldId id="273" r:id="rId12"/>
-    <p:sldId id="287" r:id="rId13"/>
-    <p:sldId id="286" r:id="rId14"/>
-    <p:sldId id="258" r:id="rId15"/>
+    <p:sldId id="288" r:id="rId7"/>
+    <p:sldId id="282" r:id="rId8"/>
+    <p:sldId id="263" r:id="rId9"/>
+    <p:sldId id="267" r:id="rId10"/>
+    <p:sldId id="268" r:id="rId11"/>
+    <p:sldId id="269" r:id="rId12"/>
+    <p:sldId id="273" r:id="rId13"/>
+    <p:sldId id="287" r:id="rId14"/>
+    <p:sldId id="286" r:id="rId15"/>
+    <p:sldId id="258" r:id="rId16"/>
   </p:sldIdLst>
   <p:sldSz cx="9144000" cy="6858000" type="screen4x3"/>
   <p:notesSz cx="6858000" cy="9144000"/>
@@ -222,7 +223,7 @@
             <a:fld id="{078357F8-8E28-43D5-BF07-FC29592C940A}" type="datetimeFigureOut">
               <a:rPr lang="de-CH" smtClean="0"/>
               <a:pPr/>
-              <a:t>22.05.2014</a:t>
+              <a:t>08.09.2014</a:t>
             </a:fld>
             <a:endParaRPr lang="de-CH"/>
           </a:p>
@@ -390,7 +391,7 @@
             <a:fld id="{3ACFD632-2497-48A7-92DA-4BE68FDDCD20}" type="datetimeFigureOut">
               <a:rPr lang="de-CH" smtClean="0"/>
               <a:pPr/>
-              <a:t>22.05.2014</a:t>
+              <a:t>08.09.2014</a:t>
             </a:fld>
             <a:endParaRPr lang="de-CH"/>
           </a:p>
@@ -4553,15 +4554,7 @@
                   <a:srgbClr val="8B8D8E"/>
                 </a:solidFill>
               </a:rPr>
-              <a:t>Damien </a:t>
-            </a:r>
-            <a:r>
-              <a:rPr lang="de-CH" dirty="0" smtClean="0">
-                <a:solidFill>
-                  <a:srgbClr val="8B8D8E"/>
-                </a:solidFill>
-              </a:rPr>
-              <a:t>Bowden,</a:t>
+              <a:t>Damien Bowden,</a:t>
             </a:r>
           </a:p>
           <a:p>
@@ -4635,11 +4628,6 @@
               </a:rPr>
               <a:t>Michael Glaus</a:t>
             </a:r>
-            <a:endParaRPr lang="de-CH" dirty="0" smtClean="0">
-              <a:solidFill>
-                <a:srgbClr val="8B8D8E"/>
-              </a:solidFill>
-            </a:endParaRPr>
           </a:p>
         </p:txBody>
       </p:sp>
@@ -4691,8 +4679,8 @@
           <a:lstStyle/>
           <a:p>
             <a:r>
-              <a:rPr lang="de-CH" dirty="0" smtClean="0"/>
-              <a:t>Resources, Links</a:t>
+              <a:rPr lang="de-CH" dirty="0" err="1"/>
+              <a:t>Disadvantages</a:t>
             </a:r>
             <a:endParaRPr lang="de-CH" dirty="0"/>
           </a:p>
@@ -4716,93 +4704,59 @@
           <a:lstStyle/>
           <a:p>
             <a:r>
-              <a:rPr lang="de-CH" dirty="0">
-                <a:hlinkClick r:id="rId2"/>
-              </a:rPr>
-              <a:t>https://</a:t>
-            </a:r>
-            <a:r>
-              <a:rPr lang="de-CH" dirty="0" smtClean="0">
-                <a:hlinkClick r:id="rId2"/>
-              </a:rPr>
-              <a:t>github.com/damienbod/WebAPIRestWithNest/tree/demoNoserPresentation</a:t>
+              <a:rPr lang="de-CH" dirty="0" smtClean="0"/>
+              <a:t>Multi-</a:t>
+            </a:r>
+            <a:r>
+              <a:rPr lang="de-CH" dirty="0" err="1" smtClean="0"/>
+              <a:t>Process</a:t>
+            </a:r>
+            <a:r>
+              <a:rPr lang="de-CH" dirty="0" smtClean="0"/>
+              <a:t> </a:t>
+            </a:r>
+            <a:r>
+              <a:rPr lang="de-CH" dirty="0" err="1" smtClean="0"/>
+              <a:t>transactions</a:t>
+            </a:r>
+            <a:r>
+              <a:rPr lang="de-CH" dirty="0" smtClean="0"/>
+              <a:t> </a:t>
+            </a:r>
+            <a:r>
+              <a:rPr lang="de-CH" dirty="0" err="1" smtClean="0"/>
+              <a:t>missing</a:t>
             </a:r>
             <a:endParaRPr lang="de-CH" dirty="0" smtClean="0"/>
           </a:p>
           <a:p>
-            <a:endParaRPr lang="de-CH" dirty="0" smtClean="0"/>
-          </a:p>
-          <a:p>
-            <a:r>
-              <a:rPr lang="de-CH" dirty="0">
-                <a:hlinkClick r:id="rId3"/>
-              </a:rPr>
-              <a:t>http://</a:t>
-            </a:r>
-            <a:r>
-              <a:rPr lang="de-CH" dirty="0" smtClean="0">
-                <a:hlinkClick r:id="rId3"/>
-              </a:rPr>
-              <a:t>aspnetwebstack.codeplex.com</a:t>
-            </a:r>
-            <a:endParaRPr lang="de-CH" dirty="0" smtClean="0"/>
-          </a:p>
-          <a:p>
-            <a:endParaRPr lang="de-CH" dirty="0" smtClean="0"/>
-          </a:p>
-          <a:p>
-            <a:r>
-              <a:rPr lang="de-CH" dirty="0" smtClean="0">
-                <a:hlinkClick r:id="rId4"/>
-              </a:rPr>
-              <a:t>http://damienbod.wordpress.com</a:t>
-            </a:r>
-            <a:endParaRPr lang="de-CH" dirty="0" smtClean="0"/>
-          </a:p>
-          <a:p>
-            <a:endParaRPr lang="de-CH" dirty="0" smtClean="0"/>
-          </a:p>
-          <a:p>
-            <a:r>
-              <a:rPr lang="de-CH" dirty="0">
-                <a:hlinkClick r:id="rId5"/>
-              </a:rPr>
-              <a:t>https://</a:t>
-            </a:r>
-            <a:r>
-              <a:rPr lang="de-CH" dirty="0" smtClean="0">
-                <a:hlinkClick r:id="rId5"/>
-              </a:rPr>
-              <a:t>github.com/WebApiContrib</a:t>
-            </a:r>
-            <a:endParaRPr lang="de-CH" dirty="0" smtClean="0"/>
-          </a:p>
-          <a:p>
-            <a:endParaRPr lang="de-CH" dirty="0" smtClean="0"/>
-          </a:p>
-          <a:p>
-            <a:r>
-              <a:rPr lang="de-CH" dirty="0">
-                <a:hlinkClick r:id="rId6"/>
-              </a:rPr>
-              <a:t>http://</a:t>
-            </a:r>
-            <a:r>
-              <a:rPr lang="de-CH" dirty="0" smtClean="0">
-                <a:hlinkClick r:id="rId6"/>
-              </a:rPr>
-              <a:t>www.asp.net/web-api</a:t>
-            </a:r>
-            <a:endParaRPr lang="de-CH" dirty="0" smtClean="0"/>
-          </a:p>
-          <a:p>
-            <a:endParaRPr lang="de-CH" dirty="0" smtClean="0"/>
-          </a:p>
-          <a:p>
-            <a:endParaRPr lang="de-CH" dirty="0" smtClean="0"/>
-          </a:p>
-          <a:p>
-            <a:endParaRPr lang="de-CH" dirty="0" smtClean="0"/>
+            <a:r>
+              <a:rPr lang="de-CH" dirty="0" err="1" smtClean="0"/>
+              <a:t>No</a:t>
+            </a:r>
+            <a:r>
+              <a:rPr lang="de-CH" dirty="0" smtClean="0"/>
+              <a:t> UDP</a:t>
+            </a:r>
+          </a:p>
+          <a:p>
+            <a:r>
+              <a:rPr lang="de-CH" dirty="0" err="1" smtClean="0"/>
+              <a:t>No</a:t>
+            </a:r>
+            <a:r>
+              <a:rPr lang="de-CH" dirty="0" smtClean="0"/>
+              <a:t> </a:t>
+            </a:r>
+            <a:r>
+              <a:rPr lang="de-CH" dirty="0" err="1" smtClean="0"/>
+              <a:t>full</a:t>
+            </a:r>
+            <a:r>
+              <a:rPr lang="de-CH" dirty="0" smtClean="0"/>
+              <a:t>-duplex</a:t>
+            </a:r>
+            <a:endParaRPr lang="de-CH" dirty="0"/>
           </a:p>
         </p:txBody>
       </p:sp>
@@ -4845,7 +4799,7 @@
     </p:spTree>
     <p:extLst>
       <p:ext uri="{BB962C8B-B14F-4D97-AF65-F5344CB8AC3E}">
-        <p14:creationId xmlns:p14="http://schemas.microsoft.com/office/powerpoint/2010/main" val="2693294116"/>
+        <p14:creationId xmlns:p14="http://schemas.microsoft.com/office/powerpoint/2010/main" val="4254707714"/>
       </p:ext>
     </p:extLst>
   </p:cSld>
@@ -4881,6 +4835,210 @@
       </p:grpSpPr>
       <p:sp>
         <p:nvSpPr>
+          <p:cNvPr id="2" name="Titel 1"/>
+          <p:cNvSpPr>
+            <a:spLocks noGrp="1"/>
+          </p:cNvSpPr>
+          <p:nvPr>
+            <p:ph type="title"/>
+          </p:nvPr>
+        </p:nvSpPr>
+        <p:spPr/>
+        <p:txBody>
+          <a:bodyPr/>
+          <a:lstStyle/>
+          <a:p>
+            <a:r>
+              <a:rPr lang="de-CH" dirty="0" smtClean="0"/>
+              <a:t>Resources, Links</a:t>
+            </a:r>
+            <a:endParaRPr lang="de-CH" dirty="0"/>
+          </a:p>
+        </p:txBody>
+      </p:sp>
+      <p:sp>
+        <p:nvSpPr>
+          <p:cNvPr id="3" name="Textplatzhalter 2"/>
+          <p:cNvSpPr>
+            <a:spLocks noGrp="1"/>
+          </p:cNvSpPr>
+          <p:nvPr>
+            <p:ph type="body" sz="quarter" idx="16"/>
+          </p:nvPr>
+        </p:nvSpPr>
+        <p:spPr/>
+        <p:txBody>
+          <a:bodyPr>
+            <a:normAutofit/>
+          </a:bodyPr>
+          <a:lstStyle/>
+          <a:p>
+            <a:r>
+              <a:rPr lang="de-CH" dirty="0">
+                <a:hlinkClick r:id="rId2"/>
+              </a:rPr>
+              <a:t>https://</a:t>
+            </a:r>
+            <a:r>
+              <a:rPr lang="de-CH" dirty="0" smtClean="0">
+                <a:hlinkClick r:id="rId2"/>
+              </a:rPr>
+              <a:t>github.com/damienbod/WebAPIRestWithNest/tree/demoNoserPresentation</a:t>
+            </a:r>
+            <a:endParaRPr lang="de-CH" dirty="0" smtClean="0"/>
+          </a:p>
+          <a:p>
+            <a:endParaRPr lang="de-CH" dirty="0" smtClean="0"/>
+          </a:p>
+          <a:p>
+            <a:r>
+              <a:rPr lang="de-CH" dirty="0">
+                <a:hlinkClick r:id="rId3"/>
+              </a:rPr>
+              <a:t>http://</a:t>
+            </a:r>
+            <a:r>
+              <a:rPr lang="de-CH" dirty="0" smtClean="0">
+                <a:hlinkClick r:id="rId3"/>
+              </a:rPr>
+              <a:t>aspnetwebstack.codeplex.com</a:t>
+            </a:r>
+            <a:endParaRPr lang="de-CH" dirty="0" smtClean="0"/>
+          </a:p>
+          <a:p>
+            <a:endParaRPr lang="de-CH" dirty="0" smtClean="0"/>
+          </a:p>
+          <a:p>
+            <a:r>
+              <a:rPr lang="de-CH" dirty="0" smtClean="0">
+                <a:hlinkClick r:id="rId4"/>
+              </a:rPr>
+              <a:t>http://damienbod.wordpress.com</a:t>
+            </a:r>
+            <a:endParaRPr lang="de-CH" dirty="0" smtClean="0"/>
+          </a:p>
+          <a:p>
+            <a:endParaRPr lang="de-CH" dirty="0" smtClean="0"/>
+          </a:p>
+          <a:p>
+            <a:r>
+              <a:rPr lang="de-CH" dirty="0">
+                <a:hlinkClick r:id="rId5"/>
+              </a:rPr>
+              <a:t>https://</a:t>
+            </a:r>
+            <a:r>
+              <a:rPr lang="de-CH" dirty="0" smtClean="0">
+                <a:hlinkClick r:id="rId5"/>
+              </a:rPr>
+              <a:t>github.com/WebApiContrib</a:t>
+            </a:r>
+            <a:endParaRPr lang="de-CH" dirty="0" smtClean="0"/>
+          </a:p>
+          <a:p>
+            <a:endParaRPr lang="de-CH" dirty="0" smtClean="0"/>
+          </a:p>
+          <a:p>
+            <a:r>
+              <a:rPr lang="de-CH" dirty="0">
+                <a:hlinkClick r:id="rId6"/>
+              </a:rPr>
+              <a:t>http://</a:t>
+            </a:r>
+            <a:r>
+              <a:rPr lang="de-CH" dirty="0" smtClean="0">
+                <a:hlinkClick r:id="rId6"/>
+              </a:rPr>
+              <a:t>www.asp.net/web-api</a:t>
+            </a:r>
+            <a:endParaRPr lang="de-CH" dirty="0" smtClean="0"/>
+          </a:p>
+          <a:p>
+            <a:endParaRPr lang="de-CH" dirty="0" smtClean="0"/>
+          </a:p>
+          <a:p>
+            <a:endParaRPr lang="de-CH" dirty="0" smtClean="0"/>
+          </a:p>
+          <a:p>
+            <a:endParaRPr lang="de-CH" dirty="0" smtClean="0"/>
+          </a:p>
+        </p:txBody>
+      </p:sp>
+      <p:sp>
+        <p:nvSpPr>
+          <p:cNvPr id="4" name="Fußzeilenplatzhalter 3"/>
+          <p:cNvSpPr>
+            <a:spLocks noGrp="1"/>
+          </p:cNvSpPr>
+          <p:nvPr>
+            <p:ph type="ftr" sz="quarter" idx="3"/>
+          </p:nvPr>
+        </p:nvSpPr>
+        <p:spPr/>
+        <p:txBody>
+          <a:bodyPr/>
+          <a:lstStyle/>
+          <a:p>
+            <a:r>
+              <a:rPr lang="de-CH" dirty="0" smtClean="0">
+                <a:solidFill>
+                  <a:srgbClr val="8B8D8E"/>
+                </a:solidFill>
+              </a:rPr>
+              <a:t>#</a:t>
+            </a:r>
+            <a:fld id="{FAF533A0-CC08-4AD3-B9FD-66E41B46AD42}" type="slidenum">
+              <a:rPr lang="de-CH" smtClean="0">
+                <a:solidFill>
+                  <a:srgbClr val="8B8D8E"/>
+                </a:solidFill>
+              </a:rPr>
+              <a:pPr/>
+              <a:t>11</a:t>
+            </a:fld>
+            <a:endParaRPr lang="de-CH" dirty="0"/>
+          </a:p>
+        </p:txBody>
+      </p:sp>
+    </p:spTree>
+    <p:extLst>
+      <p:ext uri="{BB962C8B-B14F-4D97-AF65-F5344CB8AC3E}">
+        <p14:creationId xmlns:p14="http://schemas.microsoft.com/office/powerpoint/2010/main" val="2693294116"/>
+      </p:ext>
+    </p:extLst>
+  </p:cSld>
+  <p:clrMapOvr>
+    <a:masterClrMapping/>
+  </p:clrMapOvr>
+  <p:timing>
+    <p:tnLst>
+      <p:par>
+        <p:cTn id="1" dur="indefinite" restart="never" nodeType="tmRoot"/>
+      </p:par>
+    </p:tnLst>
+  </p:timing>
+</p:sld>
+</file>
+
+<file path=ppt/slides/slide12.xml><?xml version="1.0" encoding="utf-8"?>
+<p:sld xmlns:a="http://schemas.openxmlformats.org/drawingml/2006/main" xmlns:r="http://schemas.openxmlformats.org/officeDocument/2006/relationships" xmlns:p="http://schemas.openxmlformats.org/presentationml/2006/main">
+  <p:cSld>
+    <p:spTree>
+      <p:nvGrpSpPr>
+        <p:cNvPr id="1" name=""/>
+        <p:cNvGrpSpPr/>
+        <p:nvPr/>
+      </p:nvGrpSpPr>
+      <p:grpSpPr>
+        <a:xfrm>
+          <a:off x="0" y="0"/>
+          <a:ext cx="0" cy="0"/>
+          <a:chOff x="0" y="0"/>
+          <a:chExt cx="0" cy="0"/>
+        </a:xfrm>
+      </p:grpSpPr>
+      <p:sp>
+        <p:nvSpPr>
           <p:cNvPr id="3" name="Textfeld 2"/>
           <p:cNvSpPr txBox="1"/>
           <p:nvPr/>
@@ -4989,8 +5147,46 @@
           <a:lstStyle/>
           <a:p>
             <a:r>
-              <a:rPr lang="de-CH" dirty="0" smtClean="0"/>
-              <a:t>OWIN Middleware</a:t>
+              <a:rPr lang="de-CH" dirty="0" err="1" smtClean="0"/>
+              <a:t>What</a:t>
+            </a:r>
+            <a:r>
+              <a:rPr lang="de-CH" dirty="0" smtClean="0"/>
+              <a:t> </a:t>
+            </a:r>
+            <a:r>
+              <a:rPr lang="de-CH" dirty="0" err="1" smtClean="0"/>
+              <a:t>is</a:t>
+            </a:r>
+            <a:r>
+              <a:rPr lang="de-CH" dirty="0" smtClean="0"/>
+              <a:t> Web API 2 in </a:t>
+            </a:r>
+            <a:r>
+              <a:rPr lang="de-CH" dirty="0" err="1" smtClean="0"/>
+              <a:t>one</a:t>
+            </a:r>
+            <a:r>
+              <a:rPr lang="de-CH" dirty="0" smtClean="0"/>
+              <a:t> </a:t>
+            </a:r>
+            <a:r>
+              <a:rPr lang="de-CH" dirty="0" err="1" smtClean="0"/>
+              <a:t>sentence</a:t>
+            </a:r>
+            <a:r>
+              <a:rPr lang="de-CH" dirty="0" smtClean="0"/>
+              <a:t>?</a:t>
+            </a:r>
+          </a:p>
+          <a:p>
+            <a:r>
+              <a:rPr lang="de-CH" dirty="0" smtClean="0"/>
+              <a:t>OWIN </a:t>
+            </a:r>
+            <a:r>
+              <a:rPr lang="de-CH" dirty="0" smtClean="0"/>
+              <a:t>Middleware</a:t>
             </a:r>
           </a:p>
           <a:p>
@@ -4998,16 +5194,11 @@
               <a:rPr lang="de-CH" dirty="0" smtClean="0"/>
               <a:t>Hosting</a:t>
             </a:r>
-            <a:endParaRPr lang="de-CH" dirty="0" smtClean="0"/>
-          </a:p>
-          <a:p>
-            <a:r>
-              <a:rPr lang="de-CH" dirty="0" smtClean="0"/>
-              <a:t>Attribute </a:t>
-            </a:r>
-            <a:r>
-              <a:rPr lang="de-CH" dirty="0" smtClean="0"/>
-              <a:t>Routing</a:t>
+          </a:p>
+          <a:p>
+            <a:r>
+              <a:rPr lang="de-CH" dirty="0" smtClean="0"/>
+              <a:t>Attribute Routing</a:t>
             </a:r>
           </a:p>
           <a:p>
@@ -5135,12 +5326,36 @@
           <a:lstStyle/>
           <a:p>
             <a:r>
-              <a:rPr lang="de-CH" dirty="0" smtClean="0"/>
-              <a:t>OWIN </a:t>
-            </a:r>
-            <a:r>
-              <a:rPr lang="de-CH" dirty="0" smtClean="0"/>
-              <a:t>Middleware</a:t>
+              <a:rPr lang="de-CH" dirty="0" err="1" smtClean="0"/>
+              <a:t>What</a:t>
+            </a:r>
+            <a:r>
+              <a:rPr lang="de-CH" dirty="0" smtClean="0"/>
+              <a:t> </a:t>
+            </a:r>
+            <a:r>
+              <a:rPr lang="de-CH" dirty="0" err="1" smtClean="0"/>
+              <a:t>is</a:t>
+            </a:r>
+            <a:r>
+              <a:rPr lang="de-CH" dirty="0" smtClean="0"/>
+              <a:t> Web API 2 in </a:t>
+            </a:r>
+            <a:r>
+              <a:rPr lang="de-CH" dirty="0" err="1" smtClean="0"/>
+              <a:t>one</a:t>
+            </a:r>
+            <a:r>
+              <a:rPr lang="de-CH" dirty="0" smtClean="0"/>
+              <a:t> </a:t>
+            </a:r>
+            <a:r>
+              <a:rPr lang="de-CH" dirty="0" err="1" smtClean="0"/>
+              <a:t>sentence</a:t>
+            </a:r>
+            <a:r>
+              <a:rPr lang="de-CH" dirty="0" smtClean="0"/>
+              <a:t>?</a:t>
             </a:r>
             <a:endParaRPr lang="de-CH" dirty="0"/>
           </a:p>
@@ -5160,160 +5375,6 @@
         <p:txBody>
           <a:bodyPr/>
           <a:lstStyle/>
-          <a:p>
-            <a:r>
-              <a:rPr lang="de-CH" dirty="0" smtClean="0"/>
-              <a:t>OWIN = Open web </a:t>
-            </a:r>
-            <a:r>
-              <a:rPr lang="de-CH" dirty="0" err="1" smtClean="0"/>
-              <a:t>interface</a:t>
-            </a:r>
-            <a:r>
-              <a:rPr lang="de-CH" dirty="0" smtClean="0"/>
-              <a:t> </a:t>
-            </a:r>
-            <a:r>
-              <a:rPr lang="de-CH" dirty="0" err="1" smtClean="0"/>
-              <a:t>for</a:t>
-            </a:r>
-            <a:r>
-              <a:rPr lang="de-CH" dirty="0" smtClean="0"/>
-              <a:t> .Net</a:t>
-            </a:r>
-          </a:p>
-          <a:p>
-            <a:r>
-              <a:rPr lang="de-CH" dirty="0" smtClean="0"/>
-              <a:t>Web </a:t>
-            </a:r>
-            <a:r>
-              <a:rPr lang="de-CH" dirty="0" smtClean="0"/>
-              <a:t>API 2 </a:t>
-            </a:r>
-            <a:r>
-              <a:rPr lang="de-CH" dirty="0" err="1" smtClean="0"/>
-              <a:t>is</a:t>
-            </a:r>
-            <a:r>
-              <a:rPr lang="de-CH" dirty="0" smtClean="0"/>
-              <a:t> an OWIN Middleware </a:t>
-            </a:r>
-            <a:r>
-              <a:rPr lang="de-CH" dirty="0" err="1" smtClean="0"/>
-              <a:t>component</a:t>
-            </a:r>
-            <a:r>
-              <a:rPr lang="de-CH" dirty="0" smtClean="0"/>
-              <a:t>.</a:t>
-            </a:r>
-          </a:p>
-          <a:p>
-            <a:r>
-              <a:rPr lang="de-CH" dirty="0" smtClean="0"/>
-              <a:t>Can </a:t>
-            </a:r>
-            <a:r>
-              <a:rPr lang="de-CH" dirty="0" err="1" smtClean="0"/>
-              <a:t>be</a:t>
-            </a:r>
-            <a:r>
-              <a:rPr lang="de-CH" dirty="0" smtClean="0"/>
-              <a:t> </a:t>
-            </a:r>
-            <a:r>
-              <a:rPr lang="de-CH" dirty="0" err="1" smtClean="0"/>
-              <a:t>chained</a:t>
-            </a:r>
-            <a:r>
-              <a:rPr lang="de-CH" dirty="0" smtClean="0"/>
-              <a:t> </a:t>
-            </a:r>
-            <a:r>
-              <a:rPr lang="de-CH" dirty="0" err="1" smtClean="0"/>
-              <a:t>with</a:t>
-            </a:r>
-            <a:r>
-              <a:rPr lang="de-CH" dirty="0" smtClean="0"/>
-              <a:t> </a:t>
-            </a:r>
-            <a:r>
-              <a:rPr lang="de-CH" dirty="0" err="1" smtClean="0"/>
-              <a:t>any</a:t>
-            </a:r>
-            <a:r>
-              <a:rPr lang="de-CH" dirty="0" smtClean="0"/>
-              <a:t> </a:t>
-            </a:r>
-            <a:r>
-              <a:rPr lang="de-CH" dirty="0" err="1" smtClean="0"/>
-              <a:t>other</a:t>
-            </a:r>
-            <a:r>
-              <a:rPr lang="de-CH" dirty="0"/>
-              <a:t> </a:t>
-            </a:r>
-            <a:r>
-              <a:rPr lang="de-CH" dirty="0" smtClean="0"/>
-              <a:t>OWIN </a:t>
-            </a:r>
-            <a:r>
-              <a:rPr lang="de-CH" dirty="0" err="1" smtClean="0"/>
-              <a:t>middleware</a:t>
-            </a:r>
-            <a:r>
-              <a:rPr lang="de-CH" dirty="0" smtClean="0"/>
-              <a:t>, </a:t>
-            </a:r>
-            <a:r>
-              <a:rPr lang="de-CH" dirty="0" err="1" smtClean="0"/>
-              <a:t>for</a:t>
-            </a:r>
-            <a:r>
-              <a:rPr lang="de-CH" dirty="0" smtClean="0"/>
-              <a:t> </a:t>
-            </a:r>
-            <a:r>
-              <a:rPr lang="de-CH" dirty="0" err="1" smtClean="0"/>
-              <a:t>example</a:t>
-            </a:r>
-            <a:r>
-              <a:rPr lang="de-CH" dirty="0" smtClean="0"/>
-              <a:t> </a:t>
-            </a:r>
-            <a:r>
-              <a:rPr lang="de-CH" dirty="0" err="1" smtClean="0"/>
-              <a:t>SignalR</a:t>
-            </a:r>
-            <a:r>
-              <a:rPr lang="de-CH" dirty="0" smtClean="0"/>
-              <a:t> </a:t>
-            </a:r>
-            <a:r>
-              <a:rPr lang="de-CH" dirty="0" err="1" smtClean="0"/>
-              <a:t>or</a:t>
-            </a:r>
-            <a:r>
-              <a:rPr lang="de-CH" dirty="0" smtClean="0"/>
-              <a:t> </a:t>
-            </a:r>
-            <a:r>
-              <a:rPr lang="de-CH" dirty="0" err="1" smtClean="0"/>
-              <a:t>your</a:t>
-            </a:r>
-            <a:r>
-              <a:rPr lang="de-CH" dirty="0" smtClean="0"/>
-              <a:t> </a:t>
-            </a:r>
-            <a:r>
-              <a:rPr lang="de-CH" dirty="0" err="1" smtClean="0"/>
-              <a:t>own</a:t>
-            </a:r>
-            <a:r>
-              <a:rPr lang="de-CH" dirty="0" smtClean="0"/>
-              <a:t>…</a:t>
-            </a:r>
-          </a:p>
           <a:p>
             <a:endParaRPr lang="de-CH" dirty="0"/>
           </a:p>
@@ -5358,20 +5419,13 @@
     </p:spTree>
     <p:extLst>
       <p:ext uri="{BB962C8B-B14F-4D97-AF65-F5344CB8AC3E}">
-        <p14:creationId xmlns:p14="http://schemas.microsoft.com/office/powerpoint/2010/main" val="3624010411"/>
+        <p14:creationId xmlns:p14="http://schemas.microsoft.com/office/powerpoint/2010/main" val="133011606"/>
       </p:ext>
     </p:extLst>
   </p:cSld>
   <p:clrMapOvr>
     <a:masterClrMapping/>
   </p:clrMapOvr>
-  <p:timing>
-    <p:tnLst>
-      <p:par>
-        <p:cTn id="1" dur="indefinite" restart="never" nodeType="tmRoot"/>
-      </p:par>
-    </p:tnLst>
-  </p:timing>
 </p:sld>
 </file>
 
@@ -5409,7 +5463,7 @@
           <a:p>
             <a:r>
               <a:rPr lang="de-CH" dirty="0" smtClean="0"/>
-              <a:t>Hosting</a:t>
+              <a:t>OWIN Middleware</a:t>
             </a:r>
             <a:endParaRPr lang="de-CH" dirty="0"/>
           </a:p>
@@ -5432,40 +5486,91 @@
           <a:p>
             <a:r>
               <a:rPr lang="de-CH" dirty="0" smtClean="0"/>
-              <a:t>IIS (</a:t>
-            </a:r>
-            <a:r>
-              <a:rPr lang="de-CH" dirty="0" err="1" smtClean="0">
-                <a:solidFill>
-                  <a:schemeClr val="bg1">
-                    <a:lumMod val="75000"/>
-                  </a:schemeClr>
-                </a:solidFill>
-              </a:rPr>
-              <a:t>System.Web</a:t>
-            </a:r>
-            <a:r>
-              <a:rPr lang="de-CH" dirty="0" smtClean="0"/>
-              <a:t>, Helios, OWIN </a:t>
-            </a:r>
-            <a:r>
-              <a:rPr lang="de-CH" dirty="0" err="1" smtClean="0"/>
-              <a:t>Adaptor</a:t>
-            </a:r>
-            <a:r>
-              <a:rPr lang="de-CH" dirty="0" smtClean="0"/>
-              <a:t>)</a:t>
-            </a:r>
-            <a:endParaRPr lang="de-CH" dirty="0" smtClean="0"/>
-          </a:p>
-          <a:p>
-            <a:r>
-              <a:rPr lang="de-CH" dirty="0" err="1" smtClean="0"/>
-              <a:t>Self-Hosted</a:t>
-            </a:r>
-            <a:r>
-              <a:rPr lang="de-CH" dirty="0" smtClean="0"/>
-              <a:t> (</a:t>
+              <a:t>OWIN = Open web </a:t>
+            </a:r>
+            <a:r>
+              <a:rPr lang="de-CH" dirty="0" err="1" smtClean="0"/>
+              <a:t>interface</a:t>
+            </a:r>
+            <a:r>
+              <a:rPr lang="de-CH" dirty="0" smtClean="0"/>
+              <a:t> </a:t>
+            </a:r>
+            <a:r>
+              <a:rPr lang="de-CH" dirty="0" err="1" smtClean="0"/>
+              <a:t>for</a:t>
+            </a:r>
+            <a:r>
+              <a:rPr lang="de-CH" dirty="0" smtClean="0"/>
+              <a:t> .Net</a:t>
+            </a:r>
+          </a:p>
+          <a:p>
+            <a:r>
+              <a:rPr lang="de-CH" dirty="0" smtClean="0"/>
+              <a:t>Web API 2 </a:t>
+            </a:r>
+            <a:r>
+              <a:rPr lang="de-CH" dirty="0" err="1" smtClean="0"/>
+              <a:t>is</a:t>
+            </a:r>
+            <a:r>
+              <a:rPr lang="de-CH" dirty="0" smtClean="0"/>
+              <a:t> an OWIN Middleware </a:t>
+            </a:r>
+            <a:r>
+              <a:rPr lang="de-CH" dirty="0" err="1" smtClean="0"/>
+              <a:t>component</a:t>
+            </a:r>
+            <a:r>
+              <a:rPr lang="de-CH" dirty="0" smtClean="0"/>
+              <a:t>.</a:t>
+            </a:r>
+          </a:p>
+          <a:p>
+            <a:r>
+              <a:rPr lang="de-CH" dirty="0" smtClean="0"/>
+              <a:t>Can </a:t>
+            </a:r>
+            <a:r>
+              <a:rPr lang="de-CH" dirty="0" err="1" smtClean="0"/>
+              <a:t>be</a:t>
+            </a:r>
+            <a:r>
+              <a:rPr lang="de-CH" dirty="0" smtClean="0"/>
+              <a:t> </a:t>
+            </a:r>
+            <a:r>
+              <a:rPr lang="de-CH" dirty="0" err="1" smtClean="0"/>
+              <a:t>chained</a:t>
+            </a:r>
+            <a:r>
+              <a:rPr lang="de-CH" dirty="0" smtClean="0"/>
+              <a:t> </a:t>
+            </a:r>
+            <a:r>
+              <a:rPr lang="de-CH" dirty="0" err="1" smtClean="0"/>
+              <a:t>with</a:t>
+            </a:r>
+            <a:r>
+              <a:rPr lang="de-CH" dirty="0" smtClean="0"/>
+              <a:t> </a:t>
+            </a:r>
+            <a:r>
+              <a:rPr lang="de-CH" dirty="0" err="1" smtClean="0"/>
+              <a:t>any</a:t>
+            </a:r>
+            <a:r>
+              <a:rPr lang="de-CH" dirty="0" smtClean="0"/>
+              <a:t> </a:t>
+            </a:r>
+            <a:r>
+              <a:rPr lang="de-CH" dirty="0" err="1" smtClean="0"/>
+              <a:t>other</a:t>
+            </a:r>
+            <a:r>
+              <a:rPr lang="de-CH" dirty="0"/>
+              <a:t> </a:t>
             </a:r>
             <a:r>
               <a:rPr lang="de-CH" dirty="0" smtClean="0"/>
@@ -5473,7 +5578,15 @@
             </a:r>
             <a:r>
               <a:rPr lang="de-CH" dirty="0" err="1" smtClean="0"/>
-              <a:t>with</a:t>
+              <a:t>middleware</a:t>
+            </a:r>
+            <a:r>
+              <a:rPr lang="de-CH" dirty="0" smtClean="0"/>
+              <a:t>, </a:t>
+            </a:r>
+            <a:r>
+              <a:rPr lang="de-CH" dirty="0" err="1" smtClean="0"/>
+              <a:t>for</a:t>
             </a:r>
             <a:r>
               <a:rPr lang="de-CH" dirty="0" smtClean="0"/>
@@ -5481,61 +5594,47 @@
             </a:r>
             <a:r>
               <a:rPr lang="de-CH" dirty="0" err="1" smtClean="0"/>
-              <a:t>Katana</a:t>
-            </a:r>
-            <a:r>
-              <a:rPr lang="de-CH" dirty="0" smtClean="0"/>
-              <a:t>)</a:t>
-            </a:r>
-            <a:endParaRPr lang="de-CH" dirty="0" smtClean="0"/>
-          </a:p>
-          <a:p>
-            <a:r>
-              <a:rPr lang="de-CH" dirty="0" err="1" smtClean="0"/>
-              <a:t>Azure</a:t>
-            </a:r>
+              <a:t>example</a:t>
+            </a:r>
+            <a:r>
+              <a:rPr lang="de-CH" dirty="0" smtClean="0"/>
+              <a:t> </a:t>
+            </a:r>
+            <a:r>
+              <a:rPr lang="de-CH" dirty="0" err="1" smtClean="0"/>
+              <a:t>SignalR</a:t>
+            </a:r>
+            <a:r>
+              <a:rPr lang="de-CH" dirty="0" smtClean="0"/>
+              <a:t> </a:t>
+            </a:r>
+            <a:r>
+              <a:rPr lang="de-CH" dirty="0" err="1" smtClean="0"/>
+              <a:t>or</a:t>
+            </a:r>
+            <a:r>
+              <a:rPr lang="de-CH" dirty="0" smtClean="0"/>
+              <a:t> </a:t>
+            </a:r>
+            <a:r>
+              <a:rPr lang="de-CH" dirty="0" err="1" smtClean="0"/>
+              <a:t>your</a:t>
+            </a:r>
+            <a:r>
+              <a:rPr lang="de-CH" dirty="0" smtClean="0"/>
+              <a:t> </a:t>
+            </a:r>
+            <a:r>
+              <a:rPr lang="de-CH" dirty="0" err="1" smtClean="0"/>
+              <a:t>own</a:t>
+            </a:r>
+            <a:r>
+              <a:rPr lang="de-CH" dirty="0" smtClean="0"/>
+              <a:t>…</a:t>
+            </a:r>
+          </a:p>
+          <a:p>
             <a:endParaRPr lang="de-CH" dirty="0"/>
-          </a:p>
-          <a:p>
-            <a:r>
-              <a:rPr lang="de-CH" dirty="0" smtClean="0"/>
-              <a:t>MVC</a:t>
-            </a:r>
-            <a:r>
-              <a:rPr lang="de-CH" dirty="0" smtClean="0"/>
-              <a:t>, IIS Hosting (Update </a:t>
-            </a:r>
-            <a:r>
-              <a:rPr lang="de-CH" dirty="0" err="1" smtClean="0"/>
-              <a:t>NuGet</a:t>
-            </a:r>
-            <a:r>
-              <a:rPr lang="de-CH" dirty="0" smtClean="0"/>
-              <a:t> </a:t>
-            </a:r>
-            <a:r>
-              <a:rPr lang="de-CH" dirty="0" err="1" smtClean="0"/>
-              <a:t>packages</a:t>
-            </a:r>
-            <a:r>
-              <a:rPr lang="de-CH" dirty="0" smtClean="0"/>
-              <a:t>!)</a:t>
-            </a:r>
-          </a:p>
-          <a:p>
-            <a:r>
-              <a:rPr lang="de-CH" dirty="0" smtClean="0"/>
-              <a:t>In-Memory (Unit-</a:t>
-            </a:r>
-            <a:r>
-              <a:rPr lang="de-CH" dirty="0" err="1" smtClean="0"/>
-              <a:t>Testing</a:t>
-            </a:r>
-            <a:r>
-              <a:rPr lang="de-CH" dirty="0" smtClean="0"/>
-              <a:t>)</a:t>
-            </a:r>
-            <a:endParaRPr lang="de-CH" dirty="0" smtClean="0"/>
           </a:p>
         </p:txBody>
       </p:sp>
@@ -5578,7 +5677,7 @@
     </p:spTree>
     <p:extLst>
       <p:ext uri="{BB962C8B-B14F-4D97-AF65-F5344CB8AC3E}">
-        <p14:creationId xmlns:p14="http://schemas.microsoft.com/office/powerpoint/2010/main" val="1438219252"/>
+        <p14:creationId xmlns:p14="http://schemas.microsoft.com/office/powerpoint/2010/main" val="3624010411"/>
       </p:ext>
     </p:extLst>
   </p:cSld>
@@ -5629,7 +5728,7 @@
           <a:p>
             <a:r>
               <a:rPr lang="de-CH" dirty="0" smtClean="0"/>
-              <a:t>Attribute Routing</a:t>
+              <a:t>Hosting</a:t>
             </a:r>
             <a:endParaRPr lang="de-CH" dirty="0"/>
           </a:p>
@@ -5652,34 +5751,99 @@
           <a:p>
             <a:r>
               <a:rPr lang="de-CH" dirty="0" smtClean="0"/>
-              <a:t>Global Routing </a:t>
-            </a:r>
-            <a:r>
-              <a:rPr lang="de-CH" dirty="0" err="1"/>
-              <a:t>C</a:t>
-            </a:r>
-            <a:r>
-              <a:rPr lang="de-CH" dirty="0" err="1" smtClean="0"/>
-              <a:t>onfiguration</a:t>
-            </a:r>
-            <a:endParaRPr lang="de-CH" dirty="0" smtClean="0"/>
-          </a:p>
-          <a:p>
-            <a:r>
-              <a:rPr lang="de-CH" dirty="0" smtClean="0"/>
-              <a:t>Controller </a:t>
-            </a:r>
-            <a:r>
-              <a:rPr lang="de-CH" dirty="0" smtClean="0"/>
-              <a:t>/ Action Level</a:t>
-            </a:r>
-          </a:p>
-          <a:p>
-            <a:r>
-              <a:rPr lang="de-CH" dirty="0" smtClean="0"/>
-              <a:t>Attribute Routing</a:t>
-            </a:r>
-            <a:endParaRPr lang="de-CH" dirty="0" smtClean="0"/>
+              <a:t>IIS (</a:t>
+            </a:r>
+            <a:r>
+              <a:rPr lang="de-CH" dirty="0" err="1" smtClean="0">
+                <a:solidFill>
+                  <a:schemeClr val="bg1">
+                    <a:lumMod val="75000"/>
+                  </a:schemeClr>
+                </a:solidFill>
+              </a:rPr>
+              <a:t>System.Web</a:t>
+            </a:r>
+            <a:r>
+              <a:rPr lang="de-CH" dirty="0" smtClean="0"/>
+              <a:t>, Helios, OWIN </a:t>
+            </a:r>
+            <a:r>
+              <a:rPr lang="de-CH" dirty="0" err="1" smtClean="0"/>
+              <a:t>Adaptor</a:t>
+            </a:r>
+            <a:r>
+              <a:rPr lang="de-CH" dirty="0" smtClean="0"/>
+              <a:t>)</a:t>
+            </a:r>
+          </a:p>
+          <a:p>
+            <a:r>
+              <a:rPr lang="de-CH" dirty="0" err="1" smtClean="0"/>
+              <a:t>Self-Hosted</a:t>
+            </a:r>
+            <a:r>
+              <a:rPr lang="de-CH" dirty="0" smtClean="0"/>
+              <a:t> (OWIN </a:t>
+            </a:r>
+            <a:r>
+              <a:rPr lang="de-CH" dirty="0" err="1" smtClean="0"/>
+              <a:t>with</a:t>
+            </a:r>
+            <a:r>
+              <a:rPr lang="de-CH" dirty="0" smtClean="0"/>
+              <a:t> </a:t>
+            </a:r>
+            <a:r>
+              <a:rPr lang="de-CH" dirty="0" err="1" smtClean="0"/>
+              <a:t>Katana</a:t>
+            </a:r>
+            <a:r>
+              <a:rPr lang="de-CH" dirty="0" smtClean="0"/>
+              <a:t>)</a:t>
+            </a:r>
+          </a:p>
+          <a:p>
+            <a:r>
+              <a:rPr lang="de-CH" dirty="0" err="1" smtClean="0"/>
+              <a:t>Azure</a:t>
+            </a:r>
+            <a:endParaRPr lang="de-CH" dirty="0"/>
+          </a:p>
+          <a:p>
+            <a:r>
+              <a:rPr lang="de-CH" dirty="0" smtClean="0"/>
+              <a:t>MVC, IIS Hosting (Update </a:t>
+            </a:r>
+            <a:r>
+              <a:rPr lang="de-CH" dirty="0" err="1" smtClean="0"/>
+              <a:t>NuGet</a:t>
+            </a:r>
+            <a:r>
+              <a:rPr lang="de-CH" dirty="0" smtClean="0"/>
+              <a:t> </a:t>
+            </a:r>
+            <a:r>
+              <a:rPr lang="de-CH" dirty="0" err="1" smtClean="0"/>
+              <a:t>packages</a:t>
+            </a:r>
+            <a:r>
+              <a:rPr lang="de-CH" dirty="0" smtClean="0"/>
+              <a:t>!)</a:t>
+            </a:r>
+          </a:p>
+          <a:p>
+            <a:r>
+              <a:rPr lang="de-CH" dirty="0" smtClean="0"/>
+              <a:t>In-Memory (Unit-</a:t>
+            </a:r>
+            <a:r>
+              <a:rPr lang="de-CH" dirty="0" err="1" smtClean="0"/>
+              <a:t>Testing</a:t>
+            </a:r>
+            <a:r>
+              <a:rPr lang="de-CH" dirty="0" smtClean="0"/>
+              <a:t>)</a:t>
+            </a:r>
           </a:p>
         </p:txBody>
       </p:sp>
@@ -5722,7 +5886,7 @@
     </p:spTree>
     <p:extLst>
       <p:ext uri="{BB962C8B-B14F-4D97-AF65-F5344CB8AC3E}">
-        <p14:creationId xmlns:p14="http://schemas.microsoft.com/office/powerpoint/2010/main" val="1911446561"/>
+        <p14:creationId xmlns:p14="http://schemas.microsoft.com/office/powerpoint/2010/main" val="1438219252"/>
       </p:ext>
     </p:extLst>
   </p:cSld>
@@ -5772,28 +5936,8 @@
           <a:lstStyle/>
           <a:p>
             <a:r>
-              <a:rPr lang="de-CH" dirty="0"/>
-              <a:t>Media </a:t>
-            </a:r>
-            <a:r>
-              <a:rPr lang="de-CH" dirty="0" err="1"/>
-              <a:t>Formatters</a:t>
-            </a:r>
-            <a:r>
-              <a:rPr lang="de-CH" dirty="0"/>
-              <a:t> / e.g. File </a:t>
-            </a:r>
-            <a:r>
-              <a:rPr lang="de-CH" dirty="0" err="1"/>
-              <a:t>Up</a:t>
-            </a:r>
-            <a:r>
-              <a:rPr lang="de-CH" dirty="0"/>
-              <a:t>-/</a:t>
-            </a:r>
-            <a:r>
-              <a:rPr lang="de-CH" dirty="0" smtClean="0"/>
-              <a:t>Download</a:t>
+              <a:rPr lang="de-CH" dirty="0" smtClean="0"/>
+              <a:t>Attribute Routing</a:t>
             </a:r>
             <a:endParaRPr lang="de-CH" dirty="0"/>
           </a:p>
@@ -5815,48 +5959,30 @@
           <a:lstStyle/>
           <a:p>
             <a:r>
-              <a:rPr lang="de-CH" dirty="0" err="1" smtClean="0"/>
-              <a:t>Xml</a:t>
-            </a:r>
-            <a:endParaRPr lang="de-CH" dirty="0"/>
-          </a:p>
-          <a:p>
-            <a:r>
-              <a:rPr lang="de-CH" dirty="0" err="1" smtClean="0"/>
-              <a:t>Json</a:t>
+              <a:rPr lang="de-CH" dirty="0" smtClean="0"/>
+              <a:t>Global Routing </a:t>
+            </a:r>
+            <a:r>
+              <a:rPr lang="de-CH" dirty="0" err="1"/>
+              <a:t>C</a:t>
+            </a:r>
+            <a:r>
+              <a:rPr lang="de-CH" dirty="0" err="1" smtClean="0"/>
+              <a:t>onfiguration</a:t>
             </a:r>
             <a:endParaRPr lang="de-CH" dirty="0" smtClean="0"/>
           </a:p>
           <a:p>
             <a:r>
-              <a:rPr lang="de-CH" dirty="0" err="1" smtClean="0"/>
-              <a:t>Xlsx</a:t>
-            </a:r>
-            <a:endParaRPr lang="de-CH" dirty="0" smtClean="0"/>
-          </a:p>
-          <a:p>
-            <a:r>
-              <a:rPr lang="de-CH" dirty="0" err="1" smtClean="0"/>
-              <a:t>Csv</a:t>
-            </a:r>
-            <a:endParaRPr lang="de-CH" dirty="0" smtClean="0"/>
-          </a:p>
-          <a:p>
-            <a:r>
-              <a:rPr lang="de-CH" dirty="0" err="1" smtClean="0"/>
-              <a:t>Protobuf</a:t>
-            </a:r>
-            <a:r>
-              <a:rPr lang="de-CH" dirty="0" smtClean="0"/>
-              <a:t>-Net</a:t>
-            </a:r>
-          </a:p>
-          <a:p>
-            <a:r>
-              <a:rPr lang="de-CH" dirty="0" smtClean="0"/>
-              <a:t>Custom</a:t>
-            </a:r>
-            <a:endParaRPr lang="de-CH" dirty="0" smtClean="0"/>
+              <a:rPr lang="de-CH" dirty="0" smtClean="0"/>
+              <a:t>Controller / Action Level</a:t>
+            </a:r>
+          </a:p>
+          <a:p>
+            <a:r>
+              <a:rPr lang="de-CH" dirty="0" smtClean="0"/>
+              <a:t>Attribute Routing</a:t>
+            </a:r>
           </a:p>
         </p:txBody>
       </p:sp>
@@ -5899,7 +6025,7 @@
     </p:spTree>
     <p:extLst>
       <p:ext uri="{BB962C8B-B14F-4D97-AF65-F5344CB8AC3E}">
-        <p14:creationId xmlns:p14="http://schemas.microsoft.com/office/powerpoint/2010/main" val="3313734200"/>
+        <p14:creationId xmlns:p14="http://schemas.microsoft.com/office/powerpoint/2010/main" val="1911446561"/>
       </p:ext>
     </p:extLst>
   </p:cSld>
@@ -5949,8 +6075,28 @@
           <a:lstStyle/>
           <a:p>
             <a:r>
-              <a:rPr lang="de-CH" dirty="0" smtClean="0"/>
-              <a:t>ODATA</a:t>
+              <a:rPr lang="de-CH" dirty="0"/>
+              <a:t>Media </a:t>
+            </a:r>
+            <a:r>
+              <a:rPr lang="de-CH" dirty="0" err="1"/>
+              <a:t>Formatters</a:t>
+            </a:r>
+            <a:r>
+              <a:rPr lang="de-CH" dirty="0"/>
+              <a:t> / e.g. File </a:t>
+            </a:r>
+            <a:r>
+              <a:rPr lang="de-CH" dirty="0" err="1"/>
+              <a:t>Up</a:t>
+            </a:r>
+            <a:r>
+              <a:rPr lang="de-CH" dirty="0"/>
+              <a:t>-/</a:t>
+            </a:r>
+            <a:r>
+              <a:rPr lang="de-CH" dirty="0" smtClean="0"/>
+              <a:t>Download</a:t>
             </a:r>
             <a:endParaRPr lang="de-CH" dirty="0"/>
           </a:p>
@@ -5973,123 +6119,46 @@
           <a:p>
             <a:r>
               <a:rPr lang="de-CH" dirty="0" err="1" smtClean="0"/>
-              <a:t>Allows</a:t>
-            </a:r>
-            <a:r>
-              <a:rPr lang="de-CH" dirty="0" smtClean="0"/>
-              <a:t> </a:t>
-            </a:r>
-            <a:r>
-              <a:rPr lang="de-CH" dirty="0" err="1" smtClean="0"/>
-              <a:t>for</a:t>
-            </a:r>
-            <a:r>
-              <a:rPr lang="de-CH" dirty="0" smtClean="0"/>
-              <a:t> </a:t>
-            </a:r>
-            <a:r>
-              <a:rPr lang="de-CH" dirty="0" err="1" smtClean="0"/>
-              <a:t>very</a:t>
-            </a:r>
-            <a:r>
-              <a:rPr lang="de-CH" dirty="0" smtClean="0"/>
-              <a:t> flexible </a:t>
-            </a:r>
-            <a:r>
-              <a:rPr lang="de-CH" dirty="0" err="1" smtClean="0"/>
-              <a:t>client</a:t>
-            </a:r>
-            <a:r>
-              <a:rPr lang="de-CH" dirty="0" smtClean="0"/>
-              <a:t> </a:t>
-            </a:r>
-            <a:r>
-              <a:rPr lang="de-CH" dirty="0" err="1" smtClean="0"/>
-              <a:t>queries</a:t>
+              <a:t>Xml</a:t>
+            </a:r>
+            <a:endParaRPr lang="de-CH" dirty="0"/>
+          </a:p>
+          <a:p>
+            <a:r>
+              <a:rPr lang="de-CH" dirty="0" err="1" smtClean="0"/>
+              <a:t>Json</a:t>
             </a:r>
             <a:endParaRPr lang="de-CH" dirty="0" smtClean="0"/>
           </a:p>
           <a:p>
             <a:r>
               <a:rPr lang="de-CH" dirty="0" err="1" smtClean="0"/>
-              <a:t>Exposes</a:t>
-            </a:r>
-            <a:r>
-              <a:rPr lang="de-CH" dirty="0" smtClean="0"/>
-              <a:t> </a:t>
-            </a:r>
-            <a:r>
-              <a:rPr lang="de-CH" dirty="0" err="1" smtClean="0"/>
-              <a:t>the</a:t>
-            </a:r>
-            <a:r>
-              <a:rPr lang="de-CH" dirty="0" smtClean="0"/>
-              <a:t> </a:t>
-            </a:r>
-            <a:r>
-              <a:rPr lang="de-CH" dirty="0" err="1" smtClean="0"/>
-              <a:t>IQueryable</a:t>
-            </a:r>
-            <a:r>
-              <a:rPr lang="de-CH" dirty="0" smtClean="0"/>
-              <a:t> </a:t>
-            </a:r>
-            <a:r>
-              <a:rPr lang="de-CH" dirty="0" err="1" smtClean="0"/>
-              <a:t>interface</a:t>
+              <a:t>Xlsx</a:t>
             </a:r>
             <a:endParaRPr lang="de-CH" dirty="0" smtClean="0"/>
           </a:p>
           <a:p>
             <a:r>
-              <a:rPr lang="de-CH" dirty="0" smtClean="0"/>
-              <a:t>$</a:t>
-            </a:r>
-            <a:r>
-              <a:rPr lang="de-CH" dirty="0" err="1" smtClean="0"/>
-              <a:t>stop</a:t>
-            </a:r>
-            <a:r>
-              <a:rPr lang="de-CH" dirty="0" smtClean="0"/>
-              <a:t>, $</a:t>
-            </a:r>
-            <a:r>
-              <a:rPr lang="de-CH" dirty="0" err="1" smtClean="0"/>
-              <a:t>skip</a:t>
-            </a:r>
-            <a:r>
-              <a:rPr lang="de-CH" dirty="0" smtClean="0"/>
-              <a:t>, $</a:t>
-            </a:r>
-            <a:r>
-              <a:rPr lang="de-CH" dirty="0" err="1" smtClean="0"/>
-              <a:t>expand</a:t>
-            </a:r>
-            <a:r>
-              <a:rPr lang="de-CH" dirty="0" smtClean="0"/>
-              <a:t>, $</a:t>
-            </a:r>
-            <a:r>
-              <a:rPr lang="de-CH" dirty="0" err="1" smtClean="0"/>
-              <a:t>select</a:t>
-            </a:r>
-            <a:r>
-              <a:rPr lang="de-CH" dirty="0" smtClean="0"/>
-              <a:t>, $</a:t>
-            </a:r>
-            <a:r>
-              <a:rPr lang="de-CH" dirty="0" err="1" smtClean="0"/>
-              <a:t>orderby</a:t>
-            </a:r>
-            <a:r>
-              <a:rPr lang="de-CH" dirty="0" smtClean="0"/>
-              <a:t>, $</a:t>
-            </a:r>
-            <a:r>
-              <a:rPr lang="de-CH" dirty="0" err="1" smtClean="0"/>
-              <a:t>filter</a:t>
+              <a:rPr lang="de-CH" dirty="0" err="1" smtClean="0"/>
+              <a:t>Csv</a:t>
             </a:r>
             <a:endParaRPr lang="de-CH" dirty="0" smtClean="0"/>
+          </a:p>
+          <a:p>
+            <a:r>
+              <a:rPr lang="de-CH" dirty="0" err="1" smtClean="0"/>
+              <a:t>Protobuf</a:t>
+            </a:r>
+            <a:r>
+              <a:rPr lang="de-CH" dirty="0" smtClean="0"/>
+              <a:t>-Net</a:t>
+            </a:r>
+          </a:p>
+          <a:p>
+            <a:r>
+              <a:rPr lang="de-CH" dirty="0" smtClean="0"/>
+              <a:t>Custom</a:t>
+            </a:r>
           </a:p>
         </p:txBody>
       </p:sp>
@@ -6124,6 +6193,239 @@
               </a:rPr>
               <a:pPr/>
               <a:t>7</a:t>
+            </a:fld>
+            <a:endParaRPr lang="de-CH" dirty="0"/>
+          </a:p>
+        </p:txBody>
+      </p:sp>
+    </p:spTree>
+    <p:extLst>
+      <p:ext uri="{BB962C8B-B14F-4D97-AF65-F5344CB8AC3E}">
+        <p14:creationId xmlns:p14="http://schemas.microsoft.com/office/powerpoint/2010/main" val="3313734200"/>
+      </p:ext>
+    </p:extLst>
+  </p:cSld>
+  <p:clrMapOvr>
+    <a:masterClrMapping/>
+  </p:clrMapOvr>
+  <p:timing>
+    <p:tnLst>
+      <p:par>
+        <p:cTn id="1" dur="indefinite" restart="never" nodeType="tmRoot"/>
+      </p:par>
+    </p:tnLst>
+  </p:timing>
+</p:sld>
+</file>
+
+<file path=ppt/slides/slide8.xml><?xml version="1.0" encoding="utf-8"?>
+<p:sld xmlns:a="http://schemas.openxmlformats.org/drawingml/2006/main" xmlns:r="http://schemas.openxmlformats.org/officeDocument/2006/relationships" xmlns:p="http://schemas.openxmlformats.org/presentationml/2006/main">
+  <p:cSld>
+    <p:spTree>
+      <p:nvGrpSpPr>
+        <p:cNvPr id="1" name=""/>
+        <p:cNvGrpSpPr/>
+        <p:nvPr/>
+      </p:nvGrpSpPr>
+      <p:grpSpPr>
+        <a:xfrm>
+          <a:off x="0" y="0"/>
+          <a:ext cx="0" cy="0"/>
+          <a:chOff x="0" y="0"/>
+          <a:chExt cx="0" cy="0"/>
+        </a:xfrm>
+      </p:grpSpPr>
+      <p:sp>
+        <p:nvSpPr>
+          <p:cNvPr id="2" name="Titel 1"/>
+          <p:cNvSpPr>
+            <a:spLocks noGrp="1"/>
+          </p:cNvSpPr>
+          <p:nvPr>
+            <p:ph type="title"/>
+          </p:nvPr>
+        </p:nvSpPr>
+        <p:spPr/>
+        <p:txBody>
+          <a:bodyPr/>
+          <a:lstStyle/>
+          <a:p>
+            <a:r>
+              <a:rPr lang="de-CH" dirty="0" smtClean="0"/>
+              <a:t>ODATA</a:t>
+            </a:r>
+            <a:endParaRPr lang="de-CH" dirty="0"/>
+          </a:p>
+        </p:txBody>
+      </p:sp>
+      <p:sp>
+        <p:nvSpPr>
+          <p:cNvPr id="3" name="Textplatzhalter 2"/>
+          <p:cNvSpPr>
+            <a:spLocks noGrp="1"/>
+          </p:cNvSpPr>
+          <p:nvPr>
+            <p:ph type="body" sz="quarter" idx="16"/>
+          </p:nvPr>
+        </p:nvSpPr>
+        <p:spPr/>
+        <p:txBody>
+          <a:bodyPr/>
+          <a:lstStyle/>
+          <a:p>
+            <a:r>
+              <a:rPr lang="de-CH" dirty="0" err="1" smtClean="0"/>
+              <a:t>Allows</a:t>
+            </a:r>
+            <a:r>
+              <a:rPr lang="de-CH" dirty="0" smtClean="0"/>
+              <a:t> </a:t>
+            </a:r>
+            <a:r>
+              <a:rPr lang="de-CH" dirty="0" err="1" smtClean="0"/>
+              <a:t>for</a:t>
+            </a:r>
+            <a:r>
+              <a:rPr lang="de-CH" dirty="0" smtClean="0"/>
+              <a:t> </a:t>
+            </a:r>
+            <a:r>
+              <a:rPr lang="de-CH" dirty="0" err="1" smtClean="0"/>
+              <a:t>very</a:t>
+            </a:r>
+            <a:r>
+              <a:rPr lang="de-CH" dirty="0" smtClean="0"/>
+              <a:t> flexible </a:t>
+            </a:r>
+            <a:r>
+              <a:rPr lang="de-CH" dirty="0" err="1" smtClean="0"/>
+              <a:t>client</a:t>
+            </a:r>
+            <a:r>
+              <a:rPr lang="de-CH" dirty="0" smtClean="0"/>
+              <a:t> </a:t>
+            </a:r>
+            <a:r>
+              <a:rPr lang="de-CH" dirty="0" err="1" smtClean="0"/>
+              <a:t>queries</a:t>
+            </a:r>
+            <a:endParaRPr lang="de-CH" dirty="0" smtClean="0"/>
+          </a:p>
+          <a:p>
+            <a:r>
+              <a:rPr lang="de-CH" dirty="0" err="1" smtClean="0"/>
+              <a:t>Exposes</a:t>
+            </a:r>
+            <a:r>
+              <a:rPr lang="de-CH" dirty="0" smtClean="0"/>
+              <a:t> </a:t>
+            </a:r>
+            <a:r>
+              <a:rPr lang="de-CH" dirty="0" err="1" smtClean="0"/>
+              <a:t>the</a:t>
+            </a:r>
+            <a:r>
+              <a:rPr lang="de-CH" dirty="0" smtClean="0"/>
+              <a:t> </a:t>
+            </a:r>
+            <a:r>
+              <a:rPr lang="de-CH" dirty="0" err="1" smtClean="0"/>
+              <a:t>IQueryable</a:t>
+            </a:r>
+            <a:r>
+              <a:rPr lang="de-CH" dirty="0" smtClean="0"/>
+              <a:t> </a:t>
+            </a:r>
+            <a:r>
+              <a:rPr lang="de-CH" dirty="0" err="1" smtClean="0"/>
+              <a:t>interface</a:t>
+            </a:r>
+            <a:endParaRPr lang="de-CH" dirty="0" smtClean="0"/>
+          </a:p>
+          <a:p>
+            <a:r>
+              <a:rPr lang="de-CH" dirty="0" smtClean="0"/>
+              <a:t>$</a:t>
+            </a:r>
+            <a:r>
+              <a:rPr lang="de-CH" dirty="0" err="1" smtClean="0"/>
+              <a:t>stop</a:t>
+            </a:r>
+            <a:r>
+              <a:rPr lang="de-CH" dirty="0" smtClean="0"/>
+              <a:t>, $</a:t>
+            </a:r>
+            <a:r>
+              <a:rPr lang="de-CH" dirty="0" err="1" smtClean="0"/>
+              <a:t>skip</a:t>
+            </a:r>
+            <a:r>
+              <a:rPr lang="de-CH" dirty="0" smtClean="0"/>
+              <a:t>, $</a:t>
+            </a:r>
+            <a:r>
+              <a:rPr lang="de-CH" dirty="0" err="1" smtClean="0"/>
+              <a:t>expand</a:t>
+            </a:r>
+            <a:r>
+              <a:rPr lang="de-CH" dirty="0" smtClean="0"/>
+              <a:t>, $</a:t>
+            </a:r>
+            <a:r>
+              <a:rPr lang="de-CH" dirty="0" err="1" smtClean="0"/>
+              <a:t>select</a:t>
+            </a:r>
+            <a:r>
+              <a:rPr lang="de-CH" dirty="0" smtClean="0"/>
+              <a:t>, $</a:t>
+            </a:r>
+            <a:r>
+              <a:rPr lang="de-CH" dirty="0" err="1" smtClean="0"/>
+              <a:t>orderby</a:t>
+            </a:r>
+            <a:r>
+              <a:rPr lang="de-CH" dirty="0" smtClean="0"/>
+              <a:t>, $</a:t>
+            </a:r>
+            <a:r>
+              <a:rPr lang="de-CH" dirty="0" err="1" smtClean="0"/>
+              <a:t>filter</a:t>
+            </a:r>
+            <a:endParaRPr lang="de-CH" dirty="0" smtClean="0"/>
+          </a:p>
+        </p:txBody>
+      </p:sp>
+      <p:sp>
+        <p:nvSpPr>
+          <p:cNvPr id="4" name="Fußzeilenplatzhalter 3"/>
+          <p:cNvSpPr>
+            <a:spLocks noGrp="1"/>
+          </p:cNvSpPr>
+          <p:nvPr>
+            <p:ph type="ftr" sz="quarter" idx="3"/>
+          </p:nvPr>
+        </p:nvSpPr>
+        <p:spPr/>
+        <p:txBody>
+          <a:bodyPr/>
+          <a:lstStyle/>
+          <a:p>
+            <a:r>
+              <a:rPr lang="de-CH" dirty="0" smtClean="0">
+                <a:solidFill>
+                  <a:srgbClr val="8B8D8E"/>
+                </a:solidFill>
+              </a:rPr>
+              <a:t>#</a:t>
+            </a:r>
+            <a:fld id="{FAF533A0-CC08-4AD3-B9FD-66E41B46AD42}" type="slidenum">
+              <a:rPr lang="de-CH" smtClean="0">
+                <a:solidFill>
+                  <a:srgbClr val="8B8D8E"/>
+                </a:solidFill>
+              </a:rPr>
+              <a:pPr/>
+              <a:t>8</a:t>
             </a:fld>
             <a:endParaRPr lang="de-CH" dirty="0"/>
           </a:p>
@@ -6178,355 +6480,6 @@
 </p:sld>
 </file>
 
-<file path=ppt/slides/slide8.xml><?xml version="1.0" encoding="utf-8"?>
-<p:sld xmlns:a="http://schemas.openxmlformats.org/drawingml/2006/main" xmlns:r="http://schemas.openxmlformats.org/officeDocument/2006/relationships" xmlns:p="http://schemas.openxmlformats.org/presentationml/2006/main">
-  <p:cSld>
-    <p:spTree>
-      <p:nvGrpSpPr>
-        <p:cNvPr id="1" name=""/>
-        <p:cNvGrpSpPr/>
-        <p:nvPr/>
-      </p:nvGrpSpPr>
-      <p:grpSpPr>
-        <a:xfrm>
-          <a:off x="0" y="0"/>
-          <a:ext cx="0" cy="0"/>
-          <a:chOff x="0" y="0"/>
-          <a:chExt cx="0" cy="0"/>
-        </a:xfrm>
-      </p:grpSpPr>
-      <p:sp>
-        <p:nvSpPr>
-          <p:cNvPr id="2" name="Titel 1"/>
-          <p:cNvSpPr>
-            <a:spLocks noGrp="1"/>
-          </p:cNvSpPr>
-          <p:nvPr>
-            <p:ph type="title"/>
-          </p:nvPr>
-        </p:nvSpPr>
-        <p:spPr/>
-        <p:txBody>
-          <a:bodyPr/>
-          <a:lstStyle/>
-          <a:p>
-            <a:r>
-              <a:rPr lang="de-CH" dirty="0" smtClean="0"/>
-              <a:t>Advantages</a:t>
-            </a:r>
-            <a:endParaRPr lang="de-CH" dirty="0"/>
-          </a:p>
-        </p:txBody>
-      </p:sp>
-      <p:sp>
-        <p:nvSpPr>
-          <p:cNvPr id="3" name="Textplatzhalter 2"/>
-          <p:cNvSpPr>
-            <a:spLocks noGrp="1"/>
-          </p:cNvSpPr>
-          <p:nvPr>
-            <p:ph type="body" sz="quarter" idx="16"/>
-          </p:nvPr>
-        </p:nvSpPr>
-        <p:spPr/>
-        <p:txBody>
-          <a:bodyPr>
-            <a:normAutofit/>
-          </a:bodyPr>
-          <a:lstStyle/>
-          <a:p>
-            <a:r>
-              <a:rPr lang="de-CH" dirty="0" smtClean="0"/>
-              <a:t>KISS</a:t>
-            </a:r>
-            <a:r>
-              <a:rPr lang="de-CH" dirty="0" smtClean="0"/>
-              <a:t>, flexible </a:t>
-            </a:r>
-          </a:p>
-          <a:p>
-            <a:r>
-              <a:rPr lang="de-CH" dirty="0" err="1"/>
-              <a:t>E</a:t>
-            </a:r>
-            <a:r>
-              <a:rPr lang="de-CH" dirty="0" err="1" smtClean="0"/>
-              <a:t>xtensions</a:t>
-            </a:r>
-            <a:r>
-              <a:rPr lang="de-CH" dirty="0" smtClean="0"/>
-              <a:t> </a:t>
-            </a:r>
-            <a:r>
-              <a:rPr lang="de-CH" dirty="0" err="1" smtClean="0"/>
-              <a:t>to</a:t>
-            </a:r>
-            <a:r>
-              <a:rPr lang="de-CH" dirty="0" smtClean="0"/>
-              <a:t> </a:t>
-            </a:r>
-            <a:r>
-              <a:rPr lang="de-CH" dirty="0" err="1" smtClean="0"/>
-              <a:t>the</a:t>
-            </a:r>
-            <a:r>
-              <a:rPr lang="de-CH" dirty="0" smtClean="0"/>
-              <a:t> </a:t>
-            </a:r>
-            <a:r>
-              <a:rPr lang="de-CH" dirty="0" err="1" smtClean="0"/>
-              <a:t>framework</a:t>
-            </a:r>
-            <a:r>
-              <a:rPr lang="de-CH" dirty="0" smtClean="0"/>
-              <a:t> </a:t>
-            </a:r>
-            <a:r>
-              <a:rPr lang="de-CH" dirty="0" err="1" smtClean="0"/>
-              <a:t>are</a:t>
-            </a:r>
-            <a:r>
-              <a:rPr lang="de-CH" dirty="0" smtClean="0"/>
-              <a:t> easy</a:t>
-            </a:r>
-          </a:p>
-          <a:p>
-            <a:r>
-              <a:rPr lang="de-CH" dirty="0" smtClean="0"/>
-              <a:t>Can </a:t>
-            </a:r>
-            <a:r>
-              <a:rPr lang="de-CH" dirty="0" err="1" smtClean="0"/>
-              <a:t>reach</a:t>
-            </a:r>
-            <a:r>
-              <a:rPr lang="de-CH" dirty="0" smtClean="0"/>
-              <a:t> all </a:t>
-            </a:r>
-            <a:r>
-              <a:rPr lang="de-CH" dirty="0" err="1" smtClean="0"/>
-              <a:t>clients</a:t>
-            </a:r>
-            <a:endParaRPr lang="de-CH" dirty="0" smtClean="0"/>
-          </a:p>
-          <a:p>
-            <a:r>
-              <a:rPr lang="de-CH" dirty="0" smtClean="0"/>
-              <a:t>Fast, </a:t>
-            </a:r>
-            <a:r>
-              <a:rPr lang="de-CH" dirty="0" err="1" smtClean="0"/>
-              <a:t>no</a:t>
-            </a:r>
-            <a:r>
-              <a:rPr lang="de-CH" dirty="0" smtClean="0"/>
-              <a:t> </a:t>
-            </a:r>
-            <a:r>
-              <a:rPr lang="de-CH" dirty="0" err="1" smtClean="0"/>
-              <a:t>legacy</a:t>
-            </a:r>
-            <a:r>
-              <a:rPr lang="de-CH" dirty="0" smtClean="0"/>
-              <a:t> </a:t>
-            </a:r>
-            <a:r>
-              <a:rPr lang="de-CH" dirty="0" err="1" smtClean="0"/>
-              <a:t>components</a:t>
-            </a:r>
-            <a:endParaRPr lang="de-CH" dirty="0" smtClean="0"/>
-          </a:p>
-          <a:p>
-            <a:r>
-              <a:rPr lang="de-CH" dirty="0" smtClean="0"/>
-              <a:t>Can </a:t>
-            </a:r>
-            <a:r>
-              <a:rPr lang="de-CH" dirty="0" err="1" smtClean="0"/>
-              <a:t>be</a:t>
-            </a:r>
-            <a:r>
-              <a:rPr lang="de-CH" dirty="0" smtClean="0"/>
-              <a:t> </a:t>
-            </a:r>
-            <a:r>
-              <a:rPr lang="de-CH" dirty="0" err="1" smtClean="0"/>
-              <a:t>hosted</a:t>
-            </a:r>
-            <a:r>
-              <a:rPr lang="de-CH" dirty="0" smtClean="0"/>
-              <a:t> </a:t>
-            </a:r>
-            <a:r>
-              <a:rPr lang="de-CH" dirty="0" err="1" smtClean="0"/>
-              <a:t>anywhere</a:t>
-            </a:r>
-            <a:r>
-              <a:rPr lang="de-CH" dirty="0" smtClean="0"/>
-              <a:t> in .NET</a:t>
-            </a:r>
-          </a:p>
-          <a:p>
-            <a:r>
-              <a:rPr lang="de-CH" dirty="0" smtClean="0"/>
-              <a:t>ODATA</a:t>
-            </a:r>
-          </a:p>
-          <a:p>
-            <a:r>
-              <a:rPr lang="de-CH" dirty="0" smtClean="0"/>
-              <a:t>Support </a:t>
-            </a:r>
-            <a:r>
-              <a:rPr lang="de-CH" dirty="0" err="1" smtClean="0"/>
-              <a:t>for</a:t>
-            </a:r>
-            <a:r>
-              <a:rPr lang="de-CH" dirty="0" smtClean="0"/>
-              <a:t> </a:t>
-            </a:r>
-            <a:r>
-              <a:rPr lang="de-CH" dirty="0" err="1" smtClean="0"/>
-              <a:t>any</a:t>
-            </a:r>
-            <a:r>
-              <a:rPr lang="de-CH" dirty="0" smtClean="0"/>
-              <a:t> </a:t>
-            </a:r>
-            <a:r>
-              <a:rPr lang="de-CH" dirty="0" err="1" smtClean="0"/>
-              <a:t>serializations</a:t>
-            </a:r>
-            <a:endParaRPr lang="de-CH" dirty="0" smtClean="0"/>
-          </a:p>
-          <a:p>
-            <a:r>
-              <a:rPr lang="de-CH" dirty="0" smtClean="0"/>
-              <a:t>Open </a:t>
-            </a:r>
-            <a:r>
-              <a:rPr lang="de-CH" dirty="0" err="1" smtClean="0"/>
-              <a:t>source</a:t>
-            </a:r>
-            <a:r>
-              <a:rPr lang="de-CH" dirty="0" smtClean="0"/>
-              <a:t>, </a:t>
-            </a:r>
-            <a:r>
-              <a:rPr lang="de-CH" dirty="0" err="1" smtClean="0"/>
-              <a:t>very</a:t>
-            </a:r>
-            <a:r>
-              <a:rPr lang="de-CH" dirty="0" smtClean="0"/>
-              <a:t> large </a:t>
-            </a:r>
-            <a:r>
-              <a:rPr lang="de-CH" dirty="0" err="1" smtClean="0"/>
-              <a:t>community</a:t>
-            </a:r>
-            <a:endParaRPr lang="de-CH" dirty="0" smtClean="0"/>
-          </a:p>
-          <a:p>
-            <a:r>
-              <a:rPr lang="de-CH" dirty="0" smtClean="0"/>
-              <a:t>Regular </a:t>
-            </a:r>
-            <a:r>
-              <a:rPr lang="de-CH" dirty="0" err="1" smtClean="0"/>
-              <a:t>updates</a:t>
-            </a:r>
-            <a:r>
-              <a:rPr lang="de-CH" dirty="0" smtClean="0"/>
-              <a:t>, </a:t>
-            </a:r>
-            <a:r>
-              <a:rPr lang="de-CH" dirty="0" err="1" smtClean="0"/>
-              <a:t>free</a:t>
-            </a:r>
-            <a:r>
-              <a:rPr lang="de-CH" dirty="0" smtClean="0"/>
-              <a:t> </a:t>
-            </a:r>
-            <a:r>
-              <a:rPr lang="de-CH" dirty="0" err="1" smtClean="0"/>
-              <a:t>from</a:t>
-            </a:r>
-            <a:r>
-              <a:rPr lang="de-CH" dirty="0" smtClean="0"/>
-              <a:t> .NET </a:t>
-            </a:r>
-            <a:r>
-              <a:rPr lang="de-CH" dirty="0" err="1" smtClean="0"/>
-              <a:t>release</a:t>
-            </a:r>
-            <a:r>
-              <a:rPr lang="de-CH" dirty="0" smtClean="0"/>
-              <a:t> </a:t>
-            </a:r>
-            <a:r>
-              <a:rPr lang="de-CH" dirty="0" err="1" smtClean="0"/>
-              <a:t>cycle</a:t>
-            </a:r>
-            <a:endParaRPr lang="de-CH" dirty="0" smtClean="0"/>
-          </a:p>
-        </p:txBody>
-      </p:sp>
-      <p:sp>
-        <p:nvSpPr>
-          <p:cNvPr id="4" name="Fußzeilenplatzhalter 3"/>
-          <p:cNvSpPr>
-            <a:spLocks noGrp="1"/>
-          </p:cNvSpPr>
-          <p:nvPr>
-            <p:ph type="ftr" sz="quarter" idx="3"/>
-          </p:nvPr>
-        </p:nvSpPr>
-        <p:spPr/>
-        <p:txBody>
-          <a:bodyPr/>
-          <a:lstStyle/>
-          <a:p>
-            <a:r>
-              <a:rPr lang="de-CH" dirty="0" smtClean="0">
-                <a:solidFill>
-                  <a:srgbClr val="8B8D8E"/>
-                </a:solidFill>
-              </a:rPr>
-              <a:t>#</a:t>
-            </a:r>
-            <a:fld id="{FAF533A0-CC08-4AD3-B9FD-66E41B46AD42}" type="slidenum">
-              <a:rPr lang="de-CH" smtClean="0">
-                <a:solidFill>
-                  <a:srgbClr val="8B8D8E"/>
-                </a:solidFill>
-              </a:rPr>
-              <a:pPr/>
-              <a:t>8</a:t>
-            </a:fld>
-            <a:endParaRPr lang="de-CH" dirty="0"/>
-          </a:p>
-        </p:txBody>
-      </p:sp>
-    </p:spTree>
-    <p:extLst>
-      <p:ext uri="{BB962C8B-B14F-4D97-AF65-F5344CB8AC3E}">
-        <p14:creationId xmlns:p14="http://schemas.microsoft.com/office/powerpoint/2010/main" val="2508772223"/>
-      </p:ext>
-    </p:extLst>
-  </p:cSld>
-  <p:clrMapOvr>
-    <a:masterClrMapping/>
-  </p:clrMapOvr>
-  <p:timing>
-    <p:tnLst>
-      <p:par>
-        <p:cTn id="1" dur="indefinite" restart="never" nodeType="tmRoot"/>
-      </p:par>
-    </p:tnLst>
-  </p:timing>
-</p:sld>
-</file>
-
 <file path=ppt/slides/slide9.xml><?xml version="1.0" encoding="utf-8"?>
 <p:sld xmlns:a="http://schemas.openxmlformats.org/drawingml/2006/main" xmlns:r="http://schemas.openxmlformats.org/officeDocument/2006/relationships" xmlns:p="http://schemas.openxmlformats.org/presentationml/2006/main">
   <p:cSld>
@@ -6560,8 +6513,8 @@
           <a:lstStyle/>
           <a:p>
             <a:r>
-              <a:rPr lang="de-CH" dirty="0" err="1"/>
-              <a:t>Disadvantages</a:t>
+              <a:rPr lang="de-CH" dirty="0" smtClean="0"/>
+              <a:t>Advantages</a:t>
             </a:r>
             <a:endParaRPr lang="de-CH" dirty="0"/>
           </a:p>
@@ -6586,11 +6539,17 @@
           <a:p>
             <a:r>
               <a:rPr lang="de-CH" dirty="0" smtClean="0"/>
-              <a:t>Multi-</a:t>
-            </a:r>
-            <a:r>
-              <a:rPr lang="de-CH" dirty="0" err="1" smtClean="0"/>
-              <a:t>Process</a:t>
+              <a:t>KISS, flexible </a:t>
+            </a:r>
+          </a:p>
+          <a:p>
+            <a:r>
+              <a:rPr lang="de-CH" dirty="0" err="1"/>
+              <a:t>E</a:t>
+            </a:r>
+            <a:r>
+              <a:rPr lang="de-CH" dirty="0" err="1" smtClean="0"/>
+              <a:t>xtensions</a:t>
             </a:r>
             <a:r>
               <a:rPr lang="de-CH" dirty="0" smtClean="0"/>
@@ -6598,7 +6557,7 @@
             </a:r>
             <a:r>
               <a:rPr lang="de-CH" dirty="0" err="1" smtClean="0"/>
-              <a:t>transactions</a:t>
+              <a:t>to</a:t>
             </a:r>
             <a:r>
               <a:rPr lang="de-CH" dirty="0" smtClean="0"/>
@@ -6606,24 +6565,56 @@
             </a:r>
             <a:r>
               <a:rPr lang="de-CH" dirty="0" err="1" smtClean="0"/>
-              <a:t>missing</a:t>
+              <a:t>the</a:t>
+            </a:r>
+            <a:r>
+              <a:rPr lang="de-CH" dirty="0" smtClean="0"/>
+              <a:t> </a:t>
+            </a:r>
+            <a:r>
+              <a:rPr lang="de-CH" dirty="0" err="1" smtClean="0"/>
+              <a:t>framework</a:t>
+            </a:r>
+            <a:r>
+              <a:rPr lang="de-CH" dirty="0" smtClean="0"/>
+              <a:t> </a:t>
+            </a:r>
+            <a:r>
+              <a:rPr lang="de-CH" dirty="0" err="1" smtClean="0"/>
+              <a:t>are</a:t>
+            </a:r>
+            <a:r>
+              <a:rPr lang="de-CH" dirty="0" smtClean="0"/>
+              <a:t> easy</a:t>
+            </a:r>
+          </a:p>
+          <a:p>
+            <a:r>
+              <a:rPr lang="de-CH" dirty="0" smtClean="0"/>
+              <a:t>Can </a:t>
+            </a:r>
+            <a:r>
+              <a:rPr lang="de-CH" dirty="0" err="1" smtClean="0"/>
+              <a:t>reach</a:t>
+            </a:r>
+            <a:r>
+              <a:rPr lang="de-CH" dirty="0" smtClean="0"/>
+              <a:t> all </a:t>
+            </a:r>
+            <a:r>
+              <a:rPr lang="de-CH" dirty="0" err="1" smtClean="0"/>
+              <a:t>clients</a:t>
             </a:r>
             <a:endParaRPr lang="de-CH" dirty="0" smtClean="0"/>
           </a:p>
           <a:p>
             <a:r>
-              <a:rPr lang="de-CH" dirty="0" err="1" smtClean="0"/>
-              <a:t>No</a:t>
-            </a:r>
-            <a:r>
-              <a:rPr lang="de-CH" dirty="0" smtClean="0"/>
-              <a:t> UDP</a:t>
-            </a:r>
-          </a:p>
-          <a:p>
-            <a:r>
-              <a:rPr lang="de-CH" dirty="0" err="1" smtClean="0"/>
-              <a:t>No</a:t>
+              <a:rPr lang="de-CH" dirty="0" smtClean="0"/>
+              <a:t>Fast, </a:t>
+            </a:r>
+            <a:r>
+              <a:rPr lang="de-CH" dirty="0" err="1" smtClean="0"/>
+              <a:t>no</a:t>
             </a:r>
             <a:r>
               <a:rPr lang="de-CH" dirty="0" smtClean="0"/>
@@ -6631,13 +6622,150 @@
             </a:r>
             <a:r>
               <a:rPr lang="de-CH" dirty="0" err="1" smtClean="0"/>
-              <a:t>full</a:t>
-            </a:r>
-            <a:r>
-              <a:rPr lang="de-CH" dirty="0" smtClean="0"/>
-              <a:t>-duplex</a:t>
-            </a:r>
-            <a:endParaRPr lang="de-CH" dirty="0"/>
+              <a:t>legacy</a:t>
+            </a:r>
+            <a:r>
+              <a:rPr lang="de-CH" dirty="0" smtClean="0"/>
+              <a:t> </a:t>
+            </a:r>
+            <a:r>
+              <a:rPr lang="de-CH" dirty="0" err="1" smtClean="0"/>
+              <a:t>components</a:t>
+            </a:r>
+            <a:endParaRPr lang="de-CH" dirty="0" smtClean="0"/>
+          </a:p>
+          <a:p>
+            <a:r>
+              <a:rPr lang="de-CH" dirty="0" smtClean="0"/>
+              <a:t>Can </a:t>
+            </a:r>
+            <a:r>
+              <a:rPr lang="de-CH" dirty="0" err="1" smtClean="0"/>
+              <a:t>be</a:t>
+            </a:r>
+            <a:r>
+              <a:rPr lang="de-CH" dirty="0" smtClean="0"/>
+              <a:t> </a:t>
+            </a:r>
+            <a:r>
+              <a:rPr lang="de-CH" dirty="0" err="1" smtClean="0"/>
+              <a:t>hosted</a:t>
+            </a:r>
+            <a:r>
+              <a:rPr lang="de-CH" dirty="0" smtClean="0"/>
+              <a:t> </a:t>
+            </a:r>
+            <a:r>
+              <a:rPr lang="de-CH" dirty="0" err="1" smtClean="0"/>
+              <a:t>anywhere</a:t>
+            </a:r>
+            <a:r>
+              <a:rPr lang="de-CH" dirty="0" smtClean="0"/>
+              <a:t> in .NET</a:t>
+            </a:r>
+          </a:p>
+          <a:p>
+            <a:r>
+              <a:rPr lang="de-CH" dirty="0" smtClean="0"/>
+              <a:t>ODATA</a:t>
+            </a:r>
+          </a:p>
+          <a:p>
+            <a:r>
+              <a:rPr lang="de-CH" dirty="0" smtClean="0"/>
+              <a:t>Support </a:t>
+            </a:r>
+            <a:r>
+              <a:rPr lang="de-CH" dirty="0" err="1" smtClean="0"/>
+              <a:t>for</a:t>
+            </a:r>
+            <a:r>
+              <a:rPr lang="de-CH" dirty="0" smtClean="0"/>
+              <a:t> </a:t>
+            </a:r>
+            <a:r>
+              <a:rPr lang="de-CH" dirty="0" err="1" smtClean="0"/>
+              <a:t>any</a:t>
+            </a:r>
+            <a:r>
+              <a:rPr lang="de-CH" dirty="0" smtClean="0"/>
+              <a:t> </a:t>
+            </a:r>
+            <a:r>
+              <a:rPr lang="de-CH" dirty="0" err="1" smtClean="0"/>
+              <a:t>serializations</a:t>
+            </a:r>
+            <a:endParaRPr lang="de-CH" dirty="0" smtClean="0"/>
+          </a:p>
+          <a:p>
+            <a:r>
+              <a:rPr lang="de-CH" dirty="0" smtClean="0"/>
+              <a:t>Open </a:t>
+            </a:r>
+            <a:r>
+              <a:rPr lang="de-CH" dirty="0" err="1" smtClean="0"/>
+              <a:t>source</a:t>
+            </a:r>
+            <a:r>
+              <a:rPr lang="de-CH" dirty="0" smtClean="0"/>
+              <a:t>, </a:t>
+            </a:r>
+            <a:r>
+              <a:rPr lang="de-CH" dirty="0" err="1" smtClean="0"/>
+              <a:t>very</a:t>
+            </a:r>
+            <a:r>
+              <a:rPr lang="de-CH" dirty="0" smtClean="0"/>
+              <a:t> large </a:t>
+            </a:r>
+            <a:r>
+              <a:rPr lang="de-CH" dirty="0" err="1" smtClean="0"/>
+              <a:t>community</a:t>
+            </a:r>
+            <a:endParaRPr lang="de-CH" dirty="0" smtClean="0"/>
+          </a:p>
+          <a:p>
+            <a:r>
+              <a:rPr lang="de-CH" dirty="0" smtClean="0"/>
+              <a:t>Regular </a:t>
+            </a:r>
+            <a:r>
+              <a:rPr lang="de-CH" dirty="0" err="1" smtClean="0"/>
+              <a:t>updates</a:t>
+            </a:r>
+            <a:r>
+              <a:rPr lang="de-CH" dirty="0" smtClean="0"/>
+              <a:t>, </a:t>
+            </a:r>
+            <a:r>
+              <a:rPr lang="de-CH" dirty="0" err="1" smtClean="0"/>
+              <a:t>free</a:t>
+            </a:r>
+            <a:r>
+              <a:rPr lang="de-CH" dirty="0" smtClean="0"/>
+              <a:t> </a:t>
+            </a:r>
+            <a:r>
+              <a:rPr lang="de-CH" dirty="0" err="1" smtClean="0"/>
+              <a:t>from</a:t>
+            </a:r>
+            <a:r>
+              <a:rPr lang="de-CH" dirty="0" smtClean="0"/>
+              <a:t> .NET </a:t>
+            </a:r>
+            <a:r>
+              <a:rPr lang="de-CH" dirty="0" err="1" smtClean="0"/>
+              <a:t>release</a:t>
+            </a:r>
+            <a:r>
+              <a:rPr lang="de-CH" dirty="0" smtClean="0"/>
+              <a:t> </a:t>
+            </a:r>
+            <a:r>
+              <a:rPr lang="de-CH" dirty="0" err="1" smtClean="0"/>
+              <a:t>cycle</a:t>
+            </a:r>
+            <a:endParaRPr lang="de-CH" dirty="0" smtClean="0"/>
           </a:p>
         </p:txBody>
       </p:sp>
@@ -6680,7 +6808,7 @@
     </p:spTree>
     <p:extLst>
       <p:ext uri="{BB962C8B-B14F-4D97-AF65-F5344CB8AC3E}">
-        <p14:creationId xmlns:p14="http://schemas.microsoft.com/office/powerpoint/2010/main" val="4254707714"/>
+        <p14:creationId xmlns:p14="http://schemas.microsoft.com/office/powerpoint/2010/main" val="2508772223"/>
       </p:ext>
     </p:extLst>
   </p:cSld>
@@ -7500,6 +7628,15 @@
 </file>
 
 <file path=customXml/item2.xml><?xml version="1.0" encoding="utf-8"?>
+<?mso-contentType ?>
+<FormTemplates xmlns="http://schemas.microsoft.com/sharepoint/v3/contenttype/forms">
+  <Display>DocumentLibraryForm</Display>
+  <Edit>DocumentLibraryForm</Edit>
+  <New>DocumentLibraryForm</New>
+</FormTemplates>
+</file>
+
+<file path=customXml/item3.xml><?xml version="1.0" encoding="utf-8"?>
 <ct:contentTypeSchema xmlns:ct="http://schemas.microsoft.com/office/2006/metadata/contentType" xmlns:ma="http://schemas.microsoft.com/office/2006/metadata/properties/metaAttributes" ct:_="" ma:_="" ma:contentTypeName="Document" ma:contentTypeID="0x0101009B1271BAB3BD97469364141CDC266217" ma:contentTypeVersion="18" ma:contentTypeDescription="Create a new document." ma:contentTypeScope="" ma:versionID="4ab34ffa81e4289ac366dd042dee0b44">
   <xsd:schema xmlns:xsd="http://www.w3.org/2001/XMLSchema" xmlns:p="http://schemas.microsoft.com/office/2006/metadata/properties" xmlns:ns2="0e489163-6afe-4c56-81b4-2fcc3441f0c8" xmlns:ns3="c4c7ba7a-6051-45d4-8501-79302ee9308f" targetNamespace="http://schemas.microsoft.com/office/2006/metadata/properties" ma:root="true" ma:fieldsID="fd4dc6e2fab02cfa8725ef4fd4332e68" ns2:_="" ns3:_="">
     <xsd:import namespace="0e489163-6afe-4c56-81b4-2fcc3441f0c8"/>
@@ -7581,15 +7718,6 @@
 </ct:contentTypeSchema>
 </file>
 
-<file path=customXml/item3.xml><?xml version="1.0" encoding="utf-8"?>
-<?mso-contentType ?>
-<FormTemplates xmlns="http://schemas.microsoft.com/sharepoint/v3/contenttype/forms">
-  <Display>DocumentLibraryForm</Display>
-  <Edit>DocumentLibraryForm</Edit>
-  <New>DocumentLibraryForm</New>
-</FormTemplates>
-</file>
-
 <file path=customXml/itemProps1.xml><?xml version="1.0" encoding="utf-8"?>
 <ds:datastoreItem xmlns:ds="http://schemas.openxmlformats.org/officeDocument/2006/customXml" ds:itemID="{522F6AE9-0EF6-425D-9073-DA80930CD1E5}">
   <ds:schemaRefs>
@@ -7607,6 +7735,14 @@
 </file>
 
 <file path=customXml/itemProps2.xml><?xml version="1.0" encoding="utf-8"?>
+<ds:datastoreItem xmlns:ds="http://schemas.openxmlformats.org/officeDocument/2006/customXml" ds:itemID="{9AFF41A3-1D4D-43FE-BB40-C98B0057EB79}">
+  <ds:schemaRefs>
+    <ds:schemaRef ds:uri="http://schemas.microsoft.com/sharepoint/v3/contenttype/forms"/>
+  </ds:schemaRefs>
+</ds:datastoreItem>
+</file>
+
+<file path=customXml/itemProps3.xml><?xml version="1.0" encoding="utf-8"?>
 <ds:datastoreItem xmlns:ds="http://schemas.openxmlformats.org/officeDocument/2006/customXml" ds:itemID="{B44422EC-4294-4942-AD7A-B87223D7FA2D}">
   <ds:schemaRefs>
     <ds:schemaRef ds:uri="http://schemas.microsoft.com/office/2006/metadata/contentType"/>
@@ -7622,12 +7758,4 @@
     <ds:schemaRef ds:uri="http://schemas.microsoft.com/office/internal/2005/internalDocumentation"/>
   </ds:schemaRefs>
 </ds:datastoreItem>
-</file>
-
-<file path=customXml/itemProps3.xml><?xml version="1.0" encoding="utf-8"?>
-<ds:datastoreItem xmlns:ds="http://schemas.openxmlformats.org/officeDocument/2006/customXml" ds:itemID="{9AFF41A3-1D4D-43FE-BB40-C98B0057EB79}">
-  <ds:schemaRefs>
-    <ds:schemaRef ds:uri="http://schemas.microsoft.com/sharepoint/v3/contenttype/forms"/>
-  </ds:schemaRefs>
-</ds:datastoreItem>
 </file>
</xml_diff>

<commit_message>
Changed: Short Presentation and corresponding code in project
</commit_message>
<xml_diff>
--- a/WebAPI_Short.pptx
+++ b/WebAPI_Short.pptx
@@ -5,10 +5,10 @@
     <p:sldMasterId id="2147483672" r:id="rId4"/>
   </p:sldMasterIdLst>
   <p:notesMasterIdLst>
-    <p:notesMasterId r:id="rId17"/>
+    <p:notesMasterId r:id="rId19"/>
   </p:notesMasterIdLst>
   <p:handoutMasterIdLst>
-    <p:handoutMasterId r:id="rId18"/>
+    <p:handoutMasterId r:id="rId20"/>
   </p:handoutMasterIdLst>
   <p:sldIdLst>
     <p:sldId id="256" r:id="rId5"/>
@@ -19,10 +19,12 @@
     <p:sldId id="267" r:id="rId10"/>
     <p:sldId id="268" r:id="rId11"/>
     <p:sldId id="269" r:id="rId12"/>
-    <p:sldId id="273" r:id="rId13"/>
-    <p:sldId id="287" r:id="rId14"/>
-    <p:sldId id="286" r:id="rId15"/>
-    <p:sldId id="258" r:id="rId16"/>
+    <p:sldId id="289" r:id="rId13"/>
+    <p:sldId id="273" r:id="rId14"/>
+    <p:sldId id="287" r:id="rId15"/>
+    <p:sldId id="290" r:id="rId16"/>
+    <p:sldId id="291" r:id="rId17"/>
+    <p:sldId id="258" r:id="rId18"/>
   </p:sldIdLst>
   <p:sldSz cx="9144000" cy="6858000" type="screen4x3"/>
   <p:notesSz cx="6858000" cy="9144000"/>
@@ -223,7 +225,7 @@
             <a:fld id="{078357F8-8E28-43D5-BF07-FC29592C940A}" type="datetimeFigureOut">
               <a:rPr lang="de-CH" smtClean="0"/>
               <a:pPr/>
-              <a:t>08.09.2014</a:t>
+              <a:t>09.09.2014</a:t>
             </a:fld>
             <a:endParaRPr lang="de-CH"/>
           </a:p>
@@ -391,7 +393,7 @@
             <a:fld id="{3ACFD632-2497-48A7-92DA-4BE68FDDCD20}" type="datetimeFigureOut">
               <a:rPr lang="de-CH" smtClean="0"/>
               <a:pPr/>
-              <a:t>08.09.2014</a:t>
+              <a:t>09.09.2014</a:t>
             </a:fld>
             <a:endParaRPr lang="de-CH"/>
           </a:p>
@@ -4679,8 +4681,8 @@
           <a:lstStyle/>
           <a:p>
             <a:r>
-              <a:rPr lang="de-CH" dirty="0" err="1"/>
-              <a:t>Disadvantages</a:t>
+              <a:rPr lang="de-CH" dirty="0" smtClean="0"/>
+              <a:t>Advantages</a:t>
             </a:r>
             <a:endParaRPr lang="de-CH" dirty="0"/>
           </a:p>
@@ -4705,11 +4707,17 @@
           <a:p>
             <a:r>
               <a:rPr lang="de-CH" dirty="0" smtClean="0"/>
-              <a:t>Multi-</a:t>
-            </a:r>
-            <a:r>
-              <a:rPr lang="de-CH" dirty="0" err="1" smtClean="0"/>
-              <a:t>Process</a:t>
+              <a:t>KISS, flexible </a:t>
+            </a:r>
+          </a:p>
+          <a:p>
+            <a:r>
+              <a:rPr lang="de-CH" dirty="0" err="1"/>
+              <a:t>E</a:t>
+            </a:r>
+            <a:r>
+              <a:rPr lang="de-CH" dirty="0" err="1" smtClean="0"/>
+              <a:t>xtensions</a:t>
             </a:r>
             <a:r>
               <a:rPr lang="de-CH" dirty="0" smtClean="0"/>
@@ -4717,7 +4725,7 @@
             </a:r>
             <a:r>
               <a:rPr lang="de-CH" dirty="0" err="1" smtClean="0"/>
-              <a:t>transactions</a:t>
+              <a:t>to</a:t>
             </a:r>
             <a:r>
               <a:rPr lang="de-CH" dirty="0" smtClean="0"/>
@@ -4725,24 +4733,56 @@
             </a:r>
             <a:r>
               <a:rPr lang="de-CH" dirty="0" err="1" smtClean="0"/>
-              <a:t>missing</a:t>
+              <a:t>the</a:t>
+            </a:r>
+            <a:r>
+              <a:rPr lang="de-CH" dirty="0" smtClean="0"/>
+              <a:t> </a:t>
+            </a:r>
+            <a:r>
+              <a:rPr lang="de-CH" dirty="0" err="1" smtClean="0"/>
+              <a:t>framework</a:t>
+            </a:r>
+            <a:r>
+              <a:rPr lang="de-CH" dirty="0" smtClean="0"/>
+              <a:t> </a:t>
+            </a:r>
+            <a:r>
+              <a:rPr lang="de-CH" dirty="0" err="1" smtClean="0"/>
+              <a:t>are</a:t>
+            </a:r>
+            <a:r>
+              <a:rPr lang="de-CH" dirty="0" smtClean="0"/>
+              <a:t> easy</a:t>
+            </a:r>
+          </a:p>
+          <a:p>
+            <a:r>
+              <a:rPr lang="de-CH" dirty="0" smtClean="0"/>
+              <a:t>Can </a:t>
+            </a:r>
+            <a:r>
+              <a:rPr lang="de-CH" dirty="0" err="1" smtClean="0"/>
+              <a:t>reach</a:t>
+            </a:r>
+            <a:r>
+              <a:rPr lang="de-CH" dirty="0" smtClean="0"/>
+              <a:t> all </a:t>
+            </a:r>
+            <a:r>
+              <a:rPr lang="de-CH" dirty="0" err="1" smtClean="0"/>
+              <a:t>clients</a:t>
             </a:r>
             <a:endParaRPr lang="de-CH" dirty="0" smtClean="0"/>
           </a:p>
           <a:p>
             <a:r>
-              <a:rPr lang="de-CH" dirty="0" err="1" smtClean="0"/>
-              <a:t>No</a:t>
-            </a:r>
-            <a:r>
-              <a:rPr lang="de-CH" dirty="0" smtClean="0"/>
-              <a:t> UDP</a:t>
-            </a:r>
-          </a:p>
-          <a:p>
-            <a:r>
-              <a:rPr lang="de-CH" dirty="0" err="1" smtClean="0"/>
-              <a:t>No</a:t>
+              <a:rPr lang="de-CH" dirty="0" smtClean="0"/>
+              <a:t>Fast, </a:t>
+            </a:r>
+            <a:r>
+              <a:rPr lang="de-CH" dirty="0" err="1" smtClean="0"/>
+              <a:t>no</a:t>
             </a:r>
             <a:r>
               <a:rPr lang="de-CH" dirty="0" smtClean="0"/>
@@ -4750,13 +4790,150 @@
             </a:r>
             <a:r>
               <a:rPr lang="de-CH" dirty="0" err="1" smtClean="0"/>
-              <a:t>full</a:t>
-            </a:r>
-            <a:r>
-              <a:rPr lang="de-CH" dirty="0" smtClean="0"/>
-              <a:t>-duplex</a:t>
-            </a:r>
-            <a:endParaRPr lang="de-CH" dirty="0"/>
+              <a:t>legacy</a:t>
+            </a:r>
+            <a:r>
+              <a:rPr lang="de-CH" dirty="0" smtClean="0"/>
+              <a:t> </a:t>
+            </a:r>
+            <a:r>
+              <a:rPr lang="de-CH" dirty="0" err="1" smtClean="0"/>
+              <a:t>components</a:t>
+            </a:r>
+            <a:endParaRPr lang="de-CH" dirty="0" smtClean="0"/>
+          </a:p>
+          <a:p>
+            <a:r>
+              <a:rPr lang="de-CH" dirty="0" smtClean="0"/>
+              <a:t>Can </a:t>
+            </a:r>
+            <a:r>
+              <a:rPr lang="de-CH" dirty="0" err="1" smtClean="0"/>
+              <a:t>be</a:t>
+            </a:r>
+            <a:r>
+              <a:rPr lang="de-CH" dirty="0" smtClean="0"/>
+              <a:t> </a:t>
+            </a:r>
+            <a:r>
+              <a:rPr lang="de-CH" dirty="0" err="1" smtClean="0"/>
+              <a:t>hosted</a:t>
+            </a:r>
+            <a:r>
+              <a:rPr lang="de-CH" dirty="0" smtClean="0"/>
+              <a:t> </a:t>
+            </a:r>
+            <a:r>
+              <a:rPr lang="de-CH" dirty="0" err="1" smtClean="0"/>
+              <a:t>anywhere</a:t>
+            </a:r>
+            <a:r>
+              <a:rPr lang="de-CH" dirty="0" smtClean="0"/>
+              <a:t> in .NET</a:t>
+            </a:r>
+          </a:p>
+          <a:p>
+            <a:r>
+              <a:rPr lang="de-CH" dirty="0" smtClean="0"/>
+              <a:t>ODATA</a:t>
+            </a:r>
+          </a:p>
+          <a:p>
+            <a:r>
+              <a:rPr lang="de-CH" dirty="0" smtClean="0"/>
+              <a:t>Support </a:t>
+            </a:r>
+            <a:r>
+              <a:rPr lang="de-CH" dirty="0" err="1" smtClean="0"/>
+              <a:t>for</a:t>
+            </a:r>
+            <a:r>
+              <a:rPr lang="de-CH" dirty="0" smtClean="0"/>
+              <a:t> </a:t>
+            </a:r>
+            <a:r>
+              <a:rPr lang="de-CH" dirty="0" err="1" smtClean="0"/>
+              <a:t>any</a:t>
+            </a:r>
+            <a:r>
+              <a:rPr lang="de-CH" dirty="0" smtClean="0"/>
+              <a:t> </a:t>
+            </a:r>
+            <a:r>
+              <a:rPr lang="de-CH" dirty="0" err="1" smtClean="0"/>
+              <a:t>serializations</a:t>
+            </a:r>
+            <a:endParaRPr lang="de-CH" dirty="0" smtClean="0"/>
+          </a:p>
+          <a:p>
+            <a:r>
+              <a:rPr lang="de-CH" dirty="0" smtClean="0"/>
+              <a:t>Open </a:t>
+            </a:r>
+            <a:r>
+              <a:rPr lang="de-CH" dirty="0" err="1" smtClean="0"/>
+              <a:t>source</a:t>
+            </a:r>
+            <a:r>
+              <a:rPr lang="de-CH" dirty="0" smtClean="0"/>
+              <a:t>, </a:t>
+            </a:r>
+            <a:r>
+              <a:rPr lang="de-CH" dirty="0" err="1" smtClean="0"/>
+              <a:t>very</a:t>
+            </a:r>
+            <a:r>
+              <a:rPr lang="de-CH" dirty="0" smtClean="0"/>
+              <a:t> large </a:t>
+            </a:r>
+            <a:r>
+              <a:rPr lang="de-CH" dirty="0" err="1" smtClean="0"/>
+              <a:t>community</a:t>
+            </a:r>
+            <a:endParaRPr lang="de-CH" dirty="0" smtClean="0"/>
+          </a:p>
+          <a:p>
+            <a:r>
+              <a:rPr lang="de-CH" dirty="0" smtClean="0"/>
+              <a:t>Regular </a:t>
+            </a:r>
+            <a:r>
+              <a:rPr lang="de-CH" dirty="0" err="1" smtClean="0"/>
+              <a:t>updates</a:t>
+            </a:r>
+            <a:r>
+              <a:rPr lang="de-CH" dirty="0" smtClean="0"/>
+              <a:t>, </a:t>
+            </a:r>
+            <a:r>
+              <a:rPr lang="de-CH" dirty="0" err="1" smtClean="0"/>
+              <a:t>free</a:t>
+            </a:r>
+            <a:r>
+              <a:rPr lang="de-CH" dirty="0" smtClean="0"/>
+              <a:t> </a:t>
+            </a:r>
+            <a:r>
+              <a:rPr lang="de-CH" dirty="0" err="1" smtClean="0"/>
+              <a:t>from</a:t>
+            </a:r>
+            <a:r>
+              <a:rPr lang="de-CH" dirty="0" smtClean="0"/>
+              <a:t> .NET </a:t>
+            </a:r>
+            <a:r>
+              <a:rPr lang="de-CH" dirty="0" err="1" smtClean="0"/>
+              <a:t>release</a:t>
+            </a:r>
+            <a:r>
+              <a:rPr lang="de-CH" dirty="0" smtClean="0"/>
+              <a:t> </a:t>
+            </a:r>
+            <a:r>
+              <a:rPr lang="de-CH" dirty="0" err="1" smtClean="0"/>
+              <a:t>cycle</a:t>
+            </a:r>
+            <a:endParaRPr lang="de-CH" dirty="0" smtClean="0"/>
           </a:p>
         </p:txBody>
       </p:sp>
@@ -4799,7 +4976,7 @@
     </p:spTree>
     <p:extLst>
       <p:ext uri="{BB962C8B-B14F-4D97-AF65-F5344CB8AC3E}">
-        <p14:creationId xmlns:p14="http://schemas.microsoft.com/office/powerpoint/2010/main" val="4254707714"/>
+        <p14:creationId xmlns:p14="http://schemas.microsoft.com/office/powerpoint/2010/main" val="2508772223"/>
       </p:ext>
     </p:extLst>
   </p:cSld>
@@ -4849,8 +5026,8 @@
           <a:lstStyle/>
           <a:p>
             <a:r>
-              <a:rPr lang="de-CH" dirty="0" smtClean="0"/>
-              <a:t>Resources, Links</a:t>
+              <a:rPr lang="de-CH" dirty="0" err="1"/>
+              <a:t>Disadvantages</a:t>
             </a:r>
             <a:endParaRPr lang="de-CH" dirty="0"/>
           </a:p>
@@ -4874,93 +5051,59 @@
           <a:lstStyle/>
           <a:p>
             <a:r>
-              <a:rPr lang="de-CH" dirty="0">
-                <a:hlinkClick r:id="rId2"/>
-              </a:rPr>
-              <a:t>https://</a:t>
-            </a:r>
-            <a:r>
-              <a:rPr lang="de-CH" dirty="0" smtClean="0">
-                <a:hlinkClick r:id="rId2"/>
-              </a:rPr>
-              <a:t>github.com/damienbod/WebAPIRestWithNest/tree/demoNoserPresentation</a:t>
+              <a:rPr lang="de-CH" dirty="0" smtClean="0"/>
+              <a:t>Multi-</a:t>
+            </a:r>
+            <a:r>
+              <a:rPr lang="de-CH" dirty="0" err="1" smtClean="0"/>
+              <a:t>Process</a:t>
+            </a:r>
+            <a:r>
+              <a:rPr lang="de-CH" dirty="0" smtClean="0"/>
+              <a:t> </a:t>
+            </a:r>
+            <a:r>
+              <a:rPr lang="de-CH" dirty="0" err="1" smtClean="0"/>
+              <a:t>transactions</a:t>
+            </a:r>
+            <a:r>
+              <a:rPr lang="de-CH" dirty="0" smtClean="0"/>
+              <a:t> </a:t>
+            </a:r>
+            <a:r>
+              <a:rPr lang="de-CH" dirty="0" err="1" smtClean="0"/>
+              <a:t>missing</a:t>
             </a:r>
             <a:endParaRPr lang="de-CH" dirty="0" smtClean="0"/>
           </a:p>
           <a:p>
-            <a:endParaRPr lang="de-CH" dirty="0" smtClean="0"/>
-          </a:p>
-          <a:p>
-            <a:r>
-              <a:rPr lang="de-CH" dirty="0">
-                <a:hlinkClick r:id="rId3"/>
-              </a:rPr>
-              <a:t>http://</a:t>
-            </a:r>
-            <a:r>
-              <a:rPr lang="de-CH" dirty="0" smtClean="0">
-                <a:hlinkClick r:id="rId3"/>
-              </a:rPr>
-              <a:t>aspnetwebstack.codeplex.com</a:t>
-            </a:r>
-            <a:endParaRPr lang="de-CH" dirty="0" smtClean="0"/>
-          </a:p>
-          <a:p>
-            <a:endParaRPr lang="de-CH" dirty="0" smtClean="0"/>
-          </a:p>
-          <a:p>
-            <a:r>
-              <a:rPr lang="de-CH" dirty="0" smtClean="0">
-                <a:hlinkClick r:id="rId4"/>
-              </a:rPr>
-              <a:t>http://damienbod.wordpress.com</a:t>
-            </a:r>
-            <a:endParaRPr lang="de-CH" dirty="0" smtClean="0"/>
-          </a:p>
-          <a:p>
-            <a:endParaRPr lang="de-CH" dirty="0" smtClean="0"/>
-          </a:p>
-          <a:p>
-            <a:r>
-              <a:rPr lang="de-CH" dirty="0">
-                <a:hlinkClick r:id="rId5"/>
-              </a:rPr>
-              <a:t>https://</a:t>
-            </a:r>
-            <a:r>
-              <a:rPr lang="de-CH" dirty="0" smtClean="0">
-                <a:hlinkClick r:id="rId5"/>
-              </a:rPr>
-              <a:t>github.com/WebApiContrib</a:t>
-            </a:r>
-            <a:endParaRPr lang="de-CH" dirty="0" smtClean="0"/>
-          </a:p>
-          <a:p>
-            <a:endParaRPr lang="de-CH" dirty="0" smtClean="0"/>
-          </a:p>
-          <a:p>
-            <a:r>
-              <a:rPr lang="de-CH" dirty="0">
-                <a:hlinkClick r:id="rId6"/>
-              </a:rPr>
-              <a:t>http://</a:t>
-            </a:r>
-            <a:r>
-              <a:rPr lang="de-CH" dirty="0" smtClean="0">
-                <a:hlinkClick r:id="rId6"/>
-              </a:rPr>
-              <a:t>www.asp.net/web-api</a:t>
-            </a:r>
-            <a:endParaRPr lang="de-CH" dirty="0" smtClean="0"/>
-          </a:p>
-          <a:p>
-            <a:endParaRPr lang="de-CH" dirty="0" smtClean="0"/>
-          </a:p>
-          <a:p>
-            <a:endParaRPr lang="de-CH" dirty="0" smtClean="0"/>
-          </a:p>
-          <a:p>
-            <a:endParaRPr lang="de-CH" dirty="0" smtClean="0"/>
+            <a:r>
+              <a:rPr lang="de-CH" dirty="0" err="1" smtClean="0"/>
+              <a:t>No</a:t>
+            </a:r>
+            <a:r>
+              <a:rPr lang="de-CH" dirty="0" smtClean="0"/>
+              <a:t> UDP</a:t>
+            </a:r>
+          </a:p>
+          <a:p>
+            <a:r>
+              <a:rPr lang="de-CH" dirty="0" err="1" smtClean="0"/>
+              <a:t>No</a:t>
+            </a:r>
+            <a:r>
+              <a:rPr lang="de-CH" dirty="0" smtClean="0"/>
+              <a:t> </a:t>
+            </a:r>
+            <a:r>
+              <a:rPr lang="de-CH" dirty="0" err="1" smtClean="0"/>
+              <a:t>full</a:t>
+            </a:r>
+            <a:r>
+              <a:rPr lang="de-CH" dirty="0" smtClean="0"/>
+              <a:t>-duplex</a:t>
+            </a:r>
+            <a:endParaRPr lang="de-CH" dirty="0"/>
           </a:p>
         </p:txBody>
       </p:sp>
@@ -5003,7 +5146,7 @@
     </p:spTree>
     <p:extLst>
       <p:ext uri="{BB962C8B-B14F-4D97-AF65-F5344CB8AC3E}">
-        <p14:creationId xmlns:p14="http://schemas.microsoft.com/office/powerpoint/2010/main" val="2693294116"/>
+        <p14:creationId xmlns:p14="http://schemas.microsoft.com/office/powerpoint/2010/main" val="4254707714"/>
       </p:ext>
     </p:extLst>
   </p:cSld>
@@ -5039,6 +5182,237 @@
       </p:grpSpPr>
       <p:sp>
         <p:nvSpPr>
+          <p:cNvPr id="2" name="Titel 1"/>
+          <p:cNvSpPr>
+            <a:spLocks noGrp="1"/>
+          </p:cNvSpPr>
+          <p:nvPr>
+            <p:ph type="title"/>
+          </p:nvPr>
+        </p:nvSpPr>
+        <p:spPr/>
+        <p:txBody>
+          <a:bodyPr/>
+          <a:lstStyle/>
+          <a:p>
+            <a:r>
+              <a:rPr lang="de-CH" dirty="0" smtClean="0"/>
+              <a:t>Live </a:t>
+            </a:r>
+            <a:r>
+              <a:rPr lang="de-CH" dirty="0" err="1" smtClean="0"/>
+              <a:t>Self-Hosted</a:t>
+            </a:r>
+            <a:r>
+              <a:rPr lang="de-CH" dirty="0" smtClean="0"/>
+              <a:t> Web API ODATA Demo</a:t>
+            </a:r>
+            <a:endParaRPr lang="de-CH" dirty="0"/>
+          </a:p>
+        </p:txBody>
+      </p:sp>
+      <p:sp>
+        <p:nvSpPr>
+          <p:cNvPr id="3" name="Textplatzhalter 2"/>
+          <p:cNvSpPr>
+            <a:spLocks noGrp="1"/>
+          </p:cNvSpPr>
+          <p:nvPr>
+            <p:ph type="body" sz="quarter" idx="16"/>
+          </p:nvPr>
+        </p:nvSpPr>
+        <p:spPr/>
+        <p:txBody>
+          <a:bodyPr/>
+          <a:lstStyle/>
+          <a:p>
+            <a:endParaRPr lang="de-CH" dirty="0"/>
+          </a:p>
+        </p:txBody>
+      </p:sp>
+      <p:sp>
+        <p:nvSpPr>
+          <p:cNvPr id="4" name="Fußzeilenplatzhalter 3"/>
+          <p:cNvSpPr>
+            <a:spLocks noGrp="1"/>
+          </p:cNvSpPr>
+          <p:nvPr>
+            <p:ph type="ftr" sz="quarter" idx="3"/>
+          </p:nvPr>
+        </p:nvSpPr>
+        <p:spPr/>
+        <p:txBody>
+          <a:bodyPr/>
+          <a:lstStyle/>
+          <a:p>
+            <a:r>
+              <a:rPr lang="de-CH" dirty="0" smtClean="0">
+                <a:solidFill>
+                  <a:srgbClr val="8B8D8E"/>
+                </a:solidFill>
+              </a:rPr>
+              <a:t>#</a:t>
+            </a:r>
+            <a:fld id="{FAF533A0-CC08-4AD3-B9FD-66E41B46AD42}" type="slidenum">
+              <a:rPr lang="de-CH" smtClean="0">
+                <a:solidFill>
+                  <a:srgbClr val="8B8D8E"/>
+                </a:solidFill>
+              </a:rPr>
+              <a:pPr/>
+              <a:t>12</a:t>
+            </a:fld>
+            <a:endParaRPr lang="de-CH" dirty="0"/>
+          </a:p>
+        </p:txBody>
+      </p:sp>
+    </p:spTree>
+    <p:extLst>
+      <p:ext uri="{BB962C8B-B14F-4D97-AF65-F5344CB8AC3E}">
+        <p14:creationId xmlns:p14="http://schemas.microsoft.com/office/powerpoint/2010/main" val="1225134508"/>
+      </p:ext>
+    </p:extLst>
+  </p:cSld>
+  <p:clrMapOvr>
+    <a:masterClrMapping/>
+  </p:clrMapOvr>
+</p:sld>
+</file>
+
+<file path=ppt/slides/slide13.xml><?xml version="1.0" encoding="utf-8"?>
+<p:sld xmlns:a="http://schemas.openxmlformats.org/drawingml/2006/main" xmlns:r="http://schemas.openxmlformats.org/officeDocument/2006/relationships" xmlns:p="http://schemas.openxmlformats.org/presentationml/2006/main">
+  <p:cSld>
+    <p:spTree>
+      <p:nvGrpSpPr>
+        <p:cNvPr id="1" name=""/>
+        <p:cNvGrpSpPr/>
+        <p:nvPr/>
+      </p:nvGrpSpPr>
+      <p:grpSpPr>
+        <a:xfrm>
+          <a:off x="0" y="0"/>
+          <a:ext cx="0" cy="0"/>
+          <a:chOff x="0" y="0"/>
+          <a:chExt cx="0" cy="0"/>
+        </a:xfrm>
+      </p:grpSpPr>
+      <p:sp>
+        <p:nvSpPr>
+          <p:cNvPr id="2" name="Titel 1"/>
+          <p:cNvSpPr>
+            <a:spLocks noGrp="1"/>
+          </p:cNvSpPr>
+          <p:nvPr>
+            <p:ph type="title"/>
+          </p:nvPr>
+        </p:nvSpPr>
+        <p:spPr/>
+        <p:txBody>
+          <a:bodyPr/>
+          <a:lstStyle/>
+          <a:p>
+            <a:r>
+              <a:rPr lang="de-CH" dirty="0" err="1" smtClean="0"/>
+              <a:t>Questions</a:t>
+            </a:r>
+            <a:r>
+              <a:rPr lang="de-CH" dirty="0" smtClean="0"/>
+              <a:t>?</a:t>
+            </a:r>
+            <a:endParaRPr lang="de-CH" dirty="0"/>
+          </a:p>
+        </p:txBody>
+      </p:sp>
+      <p:sp>
+        <p:nvSpPr>
+          <p:cNvPr id="3" name="Textplatzhalter 2"/>
+          <p:cNvSpPr>
+            <a:spLocks noGrp="1"/>
+          </p:cNvSpPr>
+          <p:nvPr>
+            <p:ph type="body" sz="quarter" idx="16"/>
+          </p:nvPr>
+        </p:nvSpPr>
+        <p:spPr/>
+        <p:txBody>
+          <a:bodyPr/>
+          <a:lstStyle/>
+          <a:p>
+            <a:pPr marL="0" indent="0">
+              <a:buNone/>
+            </a:pPr>
+            <a:endParaRPr lang="de-CH" dirty="0"/>
+          </a:p>
+        </p:txBody>
+      </p:sp>
+      <p:sp>
+        <p:nvSpPr>
+          <p:cNvPr id="4" name="Fußzeilenplatzhalter 3"/>
+          <p:cNvSpPr>
+            <a:spLocks noGrp="1"/>
+          </p:cNvSpPr>
+          <p:nvPr>
+            <p:ph type="ftr" sz="quarter" idx="3"/>
+          </p:nvPr>
+        </p:nvSpPr>
+        <p:spPr/>
+        <p:txBody>
+          <a:bodyPr/>
+          <a:lstStyle/>
+          <a:p>
+            <a:r>
+              <a:rPr lang="de-CH" smtClean="0">
+                <a:solidFill>
+                  <a:srgbClr val="8B8D8E"/>
+                </a:solidFill>
+              </a:rPr>
+              <a:t>Vorname Name, tt.mm.jjjj,  #</a:t>
+            </a:r>
+            <a:fld id="{FAF533A0-CC08-4AD3-B9FD-66E41B46AD42}" type="slidenum">
+              <a:rPr lang="de-CH" smtClean="0">
+                <a:solidFill>
+                  <a:srgbClr val="8B8D8E"/>
+                </a:solidFill>
+              </a:rPr>
+              <a:pPr/>
+              <a:t>13</a:t>
+            </a:fld>
+            <a:endParaRPr lang="de-CH" dirty="0"/>
+          </a:p>
+        </p:txBody>
+      </p:sp>
+    </p:spTree>
+    <p:extLst>
+      <p:ext uri="{BB962C8B-B14F-4D97-AF65-F5344CB8AC3E}">
+        <p14:creationId xmlns:p14="http://schemas.microsoft.com/office/powerpoint/2010/main" val="3156043169"/>
+      </p:ext>
+    </p:extLst>
+  </p:cSld>
+  <p:clrMapOvr>
+    <a:masterClrMapping/>
+  </p:clrMapOvr>
+</p:sld>
+</file>
+
+<file path=ppt/slides/slide14.xml><?xml version="1.0" encoding="utf-8"?>
+<p:sld xmlns:a="http://schemas.openxmlformats.org/drawingml/2006/main" xmlns:r="http://schemas.openxmlformats.org/officeDocument/2006/relationships" xmlns:p="http://schemas.openxmlformats.org/presentationml/2006/main">
+  <p:cSld>
+    <p:spTree>
+      <p:nvGrpSpPr>
+        <p:cNvPr id="1" name=""/>
+        <p:cNvGrpSpPr/>
+        <p:nvPr/>
+      </p:nvGrpSpPr>
+      <p:grpSpPr>
+        <a:xfrm>
+          <a:off x="0" y="0"/>
+          <a:ext cx="0" cy="0"/>
+          <a:chOff x="0" y="0"/>
+          <a:chExt cx="0" cy="0"/>
+        </a:xfrm>
+      </p:grpSpPr>
+      <p:sp>
+        <p:nvSpPr>
           <p:cNvPr id="3" name="Textfeld 2"/>
           <p:cNvSpPr txBox="1"/>
           <p:nvPr/>
@@ -5160,33 +5534,18 @@
             </a:r>
             <a:r>
               <a:rPr lang="de-CH" dirty="0" smtClean="0"/>
-              <a:t> Web API 2 in </a:t>
-            </a:r>
-            <a:r>
-              <a:rPr lang="de-CH" dirty="0" err="1" smtClean="0"/>
-              <a:t>one</a:t>
-            </a:r>
-            <a:r>
-              <a:rPr lang="de-CH" dirty="0" smtClean="0"/>
-              <a:t> </a:t>
-            </a:r>
-            <a:r>
-              <a:rPr lang="de-CH" dirty="0" err="1" smtClean="0"/>
-              <a:t>sentence</a:t>
-            </a:r>
-            <a:r>
-              <a:rPr lang="de-CH" dirty="0" smtClean="0"/>
-              <a:t>?</a:t>
-            </a:r>
-          </a:p>
-          <a:p>
-            <a:r>
-              <a:rPr lang="de-CH" dirty="0" smtClean="0"/>
-              <a:t>OWIN </a:t>
-            </a:r>
-            <a:r>
-              <a:rPr lang="de-CH" dirty="0" smtClean="0"/>
-              <a:t>Middleware</a:t>
+              <a:t> Web </a:t>
+            </a:r>
+            <a:r>
+              <a:rPr lang="de-CH" dirty="0" smtClean="0"/>
+              <a:t>API?</a:t>
+            </a:r>
+            <a:endParaRPr lang="de-CH" dirty="0" smtClean="0"/>
+          </a:p>
+          <a:p>
+            <a:r>
+              <a:rPr lang="de-CH" dirty="0" smtClean="0"/>
+              <a:t>OWIN Middleware</a:t>
             </a:r>
           </a:p>
           <a:p>
@@ -5232,11 +5591,25 @@
           <a:p>
             <a:r>
               <a:rPr lang="de-CH" dirty="0" smtClean="0"/>
+              <a:t>Other Features</a:t>
+            </a:r>
+            <a:endParaRPr lang="de-CH" dirty="0" smtClean="0"/>
+          </a:p>
+          <a:p>
+            <a:r>
+              <a:rPr lang="de-CH" dirty="0" smtClean="0"/>
               <a:t>Advantages/</a:t>
             </a:r>
             <a:r>
               <a:rPr lang="de-CH" dirty="0" err="1" smtClean="0"/>
               <a:t>Disadvantages</a:t>
+            </a:r>
+            <a:endParaRPr lang="de-CH" dirty="0" smtClean="0"/>
+          </a:p>
+          <a:p>
+            <a:r>
+              <a:rPr lang="de-CH" dirty="0" smtClean="0"/>
+              <a:t>Demo</a:t>
             </a:r>
             <a:endParaRPr lang="de-CH" dirty="0" smtClean="0"/>
           </a:p>
@@ -5339,23 +5712,11 @@
             </a:r>
             <a:r>
               <a:rPr lang="de-CH" dirty="0" smtClean="0"/>
-              <a:t> Web API 2 in </a:t>
-            </a:r>
-            <a:r>
-              <a:rPr lang="de-CH" dirty="0" err="1" smtClean="0"/>
-              <a:t>one</a:t>
-            </a:r>
-            <a:r>
-              <a:rPr lang="de-CH" dirty="0" smtClean="0"/>
-              <a:t> </a:t>
-            </a:r>
-            <a:r>
-              <a:rPr lang="de-CH" dirty="0" err="1" smtClean="0"/>
-              <a:t>sentence</a:t>
-            </a:r>
-            <a:r>
-              <a:rPr lang="de-CH" dirty="0" smtClean="0"/>
-              <a:t>?</a:t>
+              <a:t> Web </a:t>
+            </a:r>
+            <a:r>
+              <a:rPr lang="de-CH" dirty="0" smtClean="0"/>
+              <a:t>API?</a:t>
             </a:r>
             <a:endParaRPr lang="de-CH" dirty="0"/>
           </a:p>
@@ -5376,6 +5737,34 @@
           <a:bodyPr/>
           <a:lstStyle/>
           <a:p>
+            <a:r>
+              <a:rPr lang="en-US" dirty="0" smtClean="0"/>
+              <a:t>(ASP.NET) </a:t>
+            </a:r>
+            <a:r>
+              <a:rPr lang="en-US" dirty="0"/>
+              <a:t>Web API is a framework that makes it easy to build HTTP services that reach a broad range of clients, including browsers and mobile devices. </a:t>
+            </a:r>
+            <a:r>
+              <a:rPr lang="en-US" dirty="0" smtClean="0"/>
+              <a:t>Web </a:t>
+            </a:r>
+            <a:r>
+              <a:rPr lang="en-US" dirty="0"/>
+              <a:t>API is an ideal platform for building </a:t>
+            </a:r>
+            <a:r>
+              <a:rPr lang="en-US" dirty="0" err="1" smtClean="0"/>
+              <a:t>RESTful</a:t>
+            </a:r>
+            <a:r>
+              <a:rPr lang="en-US" dirty="0" smtClean="0"/>
+              <a:t> </a:t>
+            </a:r>
+            <a:r>
+              <a:rPr lang="en-US" dirty="0"/>
+              <a:t>applications on the .NET Framework.</a:t>
+            </a:r>
             <a:endParaRPr lang="de-CH" dirty="0"/>
           </a:p>
         </p:txBody>
@@ -5750,11 +6139,70 @@
           <a:lstStyle/>
           <a:p>
             <a:r>
-              <a:rPr lang="de-CH" dirty="0" smtClean="0"/>
+              <a:rPr lang="de-CH" dirty="0" err="1" smtClean="0"/>
+              <a:t>Self-Hosted</a:t>
+            </a:r>
+            <a:r>
+              <a:rPr lang="de-CH" dirty="0" smtClean="0"/>
+              <a:t> </a:t>
+            </a:r>
+            <a:r>
+              <a:rPr lang="de-CH" dirty="0" smtClean="0"/>
+              <a:t>(OWIN </a:t>
+            </a:r>
+            <a:r>
+              <a:rPr lang="de-CH" dirty="0" err="1" smtClean="0"/>
+              <a:t>with</a:t>
+            </a:r>
+            <a:r>
+              <a:rPr lang="de-CH" dirty="0" smtClean="0"/>
+              <a:t> </a:t>
+            </a:r>
+            <a:r>
+              <a:rPr lang="de-CH" dirty="0" err="1" smtClean="0"/>
+              <a:t>Katana</a:t>
+            </a:r>
+            <a:r>
+              <a:rPr lang="de-CH" dirty="0" smtClean="0"/>
+              <a:t>)</a:t>
+            </a:r>
+          </a:p>
+          <a:p>
+            <a:r>
+              <a:rPr lang="de-CH" dirty="0" err="1" smtClean="0"/>
+              <a:t>Azure</a:t>
+            </a:r>
+            <a:endParaRPr lang="de-CH" dirty="0"/>
+          </a:p>
+          <a:p>
+            <a:r>
+              <a:rPr lang="de-CH" dirty="0" smtClean="0"/>
+              <a:t>MVC, IIS Hosting (Update </a:t>
+            </a:r>
+            <a:r>
+              <a:rPr lang="de-CH" dirty="0" err="1" smtClean="0"/>
+              <a:t>NuGet</a:t>
+            </a:r>
+            <a:r>
+              <a:rPr lang="de-CH" dirty="0" smtClean="0"/>
+              <a:t> </a:t>
+            </a:r>
+            <a:r>
+              <a:rPr lang="de-CH" dirty="0" err="1" smtClean="0"/>
+              <a:t>packages</a:t>
+            </a:r>
+            <a:r>
+              <a:rPr lang="de-CH" dirty="0" smtClean="0"/>
+              <a:t>!)</a:t>
+            </a:r>
+          </a:p>
+          <a:p>
+            <a:r>
+              <a:rPr lang="de-CH" dirty="0"/>
               <a:t>IIS (</a:t>
             </a:r>
             <a:r>
-              <a:rPr lang="de-CH" dirty="0" err="1" smtClean="0">
+              <a:rPr lang="de-CH" dirty="0" err="1">
                 <a:solidFill>
                   <a:schemeClr val="bg1">
                     <a:lumMod val="75000"/>
@@ -5764,72 +6212,18 @@
               <a:t>System.Web</a:t>
             </a:r>
             <a:r>
-              <a:rPr lang="de-CH" dirty="0" smtClean="0"/>
+              <a:rPr lang="de-CH" dirty="0"/>
               <a:t>, Helios, OWIN </a:t>
             </a:r>
             <a:r>
-              <a:rPr lang="de-CH" dirty="0" err="1" smtClean="0"/>
+              <a:rPr lang="de-CH" dirty="0" err="1"/>
               <a:t>Adaptor</a:t>
             </a:r>
             <a:r>
               <a:rPr lang="de-CH" dirty="0" smtClean="0"/>
               <a:t>)</a:t>
             </a:r>
-          </a:p>
-          <a:p>
-            <a:r>
-              <a:rPr lang="de-CH" dirty="0" err="1" smtClean="0"/>
-              <a:t>Self-Hosted</a:t>
-            </a:r>
-            <a:r>
-              <a:rPr lang="de-CH" dirty="0" smtClean="0"/>
-              <a:t> (OWIN </a:t>
-            </a:r>
-            <a:r>
-              <a:rPr lang="de-CH" dirty="0" err="1" smtClean="0"/>
-              <a:t>with</a:t>
-            </a:r>
-            <a:r>
-              <a:rPr lang="de-CH" dirty="0" smtClean="0"/>
-              <a:t> </a:t>
-            </a:r>
-            <a:r>
-              <a:rPr lang="de-CH" dirty="0" err="1" smtClean="0"/>
-              <a:t>Katana</a:t>
-            </a:r>
-            <a:r>
-              <a:rPr lang="de-CH" dirty="0" smtClean="0"/>
-              <a:t>)</a:t>
-            </a:r>
-          </a:p>
-          <a:p>
-            <a:r>
-              <a:rPr lang="de-CH" dirty="0" err="1" smtClean="0"/>
-              <a:t>Azure</a:t>
-            </a:r>
-            <a:endParaRPr lang="de-CH" dirty="0"/>
-          </a:p>
-          <a:p>
-            <a:r>
-              <a:rPr lang="de-CH" dirty="0" smtClean="0"/>
-              <a:t>MVC, IIS Hosting (Update </a:t>
-            </a:r>
-            <a:r>
-              <a:rPr lang="de-CH" dirty="0" err="1" smtClean="0"/>
-              <a:t>NuGet</a:t>
-            </a:r>
-            <a:r>
-              <a:rPr lang="de-CH" dirty="0" smtClean="0"/>
-              <a:t> </a:t>
-            </a:r>
-            <a:r>
-              <a:rPr lang="de-CH" dirty="0" err="1" smtClean="0"/>
-              <a:t>packages</a:t>
-            </a:r>
-            <a:r>
-              <a:rPr lang="de-CH" dirty="0" smtClean="0"/>
-              <a:t>!)</a:t>
-            </a:r>
+            <a:endParaRPr lang="de-CH" dirty="0" smtClean="0"/>
           </a:p>
           <a:p>
             <a:r>
@@ -5963,20 +6357,41 @@
               <a:t>Global Routing </a:t>
             </a:r>
             <a:r>
-              <a:rPr lang="de-CH" dirty="0" err="1"/>
-              <a:t>C</a:t>
-            </a:r>
-            <a:r>
-              <a:rPr lang="de-CH" dirty="0" err="1" smtClean="0"/>
-              <a:t>onfiguration</a:t>
+              <a:rPr lang="de-CH" dirty="0" err="1" smtClean="0"/>
+              <a:t>Configuration</a:t>
             </a:r>
             <a:endParaRPr lang="de-CH" dirty="0" smtClean="0"/>
           </a:p>
           <a:p>
-            <a:r>
-              <a:rPr lang="de-CH" dirty="0" smtClean="0"/>
-              <a:t>Controller / Action Level</a:t>
-            </a:r>
+            <a:endParaRPr lang="de-CH" dirty="0" smtClean="0"/>
+          </a:p>
+          <a:p>
+            <a:endParaRPr lang="de-CH" dirty="0" smtClean="0"/>
+          </a:p>
+          <a:p>
+            <a:endParaRPr lang="de-CH" dirty="0"/>
+          </a:p>
+          <a:p>
+            <a:endParaRPr lang="de-CH" dirty="0" smtClean="0"/>
+          </a:p>
+          <a:p>
+            <a:endParaRPr lang="de-CH" dirty="0" smtClean="0"/>
+          </a:p>
+          <a:p>
+            <a:r>
+              <a:rPr lang="de-CH" dirty="0" smtClean="0"/>
+              <a:t>Controller / Action </a:t>
+            </a:r>
+            <a:r>
+              <a:rPr lang="de-CH" dirty="0" smtClean="0"/>
+              <a:t>Level</a:t>
+            </a:r>
+          </a:p>
+          <a:p>
+            <a:endParaRPr lang="de-CH" dirty="0"/>
+          </a:p>
+          <a:p>
+            <a:endParaRPr lang="de-CH" dirty="0" smtClean="0"/>
           </a:p>
           <a:p>
             <a:r>
@@ -6022,6 +6437,102 @@
           </a:p>
         </p:txBody>
       </p:sp>
+      <p:pic>
+        <p:nvPicPr>
+          <p:cNvPr id="5" name="Grafik 4"/>
+          <p:cNvPicPr>
+            <a:picLocks noChangeAspect="1"/>
+          </p:cNvPicPr>
+          <p:nvPr/>
+        </p:nvPicPr>
+        <p:blipFill>
+          <a:blip r:embed="rId2"/>
+          <a:stretch>
+            <a:fillRect/>
+          </a:stretch>
+        </p:blipFill>
+        <p:spPr>
+          <a:xfrm>
+            <a:off x="1418035" y="5130333"/>
+            <a:ext cx="3571875" cy="466725"/>
+          </a:xfrm>
+          <a:prstGeom prst="rect">
+            <a:avLst/>
+          </a:prstGeom>
+        </p:spPr>
+      </p:pic>
+      <p:pic>
+        <p:nvPicPr>
+          <p:cNvPr id="7" name="Grafik 6"/>
+          <p:cNvPicPr>
+            <a:picLocks noChangeAspect="1"/>
+          </p:cNvPicPr>
+          <p:nvPr/>
+        </p:nvPicPr>
+        <p:blipFill>
+          <a:blip r:embed="rId3"/>
+          <a:stretch>
+            <a:fillRect/>
+          </a:stretch>
+        </p:blipFill>
+        <p:spPr>
+          <a:xfrm>
+            <a:off x="1418035" y="1844824"/>
+            <a:ext cx="5448300" cy="1724025"/>
+          </a:xfrm>
+          <a:prstGeom prst="rect">
+            <a:avLst/>
+          </a:prstGeom>
+        </p:spPr>
+      </p:pic>
+      <p:pic>
+        <p:nvPicPr>
+          <p:cNvPr id="8" name="Grafik 7"/>
+          <p:cNvPicPr>
+            <a:picLocks noChangeAspect="1"/>
+          </p:cNvPicPr>
+          <p:nvPr/>
+        </p:nvPicPr>
+        <p:blipFill>
+          <a:blip r:embed="rId4"/>
+          <a:stretch>
+            <a:fillRect/>
+          </a:stretch>
+        </p:blipFill>
+        <p:spPr>
+          <a:xfrm>
+            <a:off x="1418035" y="4060249"/>
+            <a:ext cx="3124200" cy="457200"/>
+          </a:xfrm>
+          <a:prstGeom prst="rect">
+            <a:avLst/>
+          </a:prstGeom>
+        </p:spPr>
+      </p:pic>
+      <p:pic>
+        <p:nvPicPr>
+          <p:cNvPr id="10" name="Grafik 9"/>
+          <p:cNvPicPr>
+            <a:picLocks noChangeAspect="1"/>
+          </p:cNvPicPr>
+          <p:nvPr/>
+        </p:nvPicPr>
+        <p:blipFill>
+          <a:blip r:embed="rId5"/>
+          <a:stretch>
+            <a:fillRect/>
+          </a:stretch>
+        </p:blipFill>
+        <p:spPr>
+          <a:xfrm>
+            <a:off x="4875610" y="576000"/>
+            <a:ext cx="1990725" cy="342900"/>
+          </a:xfrm>
+          <a:prstGeom prst="rect">
+            <a:avLst/>
+          </a:prstGeom>
+        </p:spPr>
+      </p:pic>
     </p:spTree>
     <p:extLst>
       <p:ext uri="{BB962C8B-B14F-4D97-AF65-F5344CB8AC3E}">
@@ -6514,7 +7025,7 @@
           <a:p>
             <a:r>
               <a:rPr lang="de-CH" dirty="0" smtClean="0"/>
-              <a:t>Advantages</a:t>
+              <a:t>Other Features</a:t>
             </a:r>
             <a:endParaRPr lang="de-CH" dirty="0"/>
           </a:p>
@@ -6532,240 +7043,70 @@
         </p:nvSpPr>
         <p:spPr/>
         <p:txBody>
-          <a:bodyPr>
-            <a:normAutofit/>
-          </a:bodyPr>
+          <a:bodyPr/>
           <a:lstStyle/>
           <a:p>
             <a:r>
-              <a:rPr lang="de-CH" dirty="0" smtClean="0"/>
-              <a:t>KISS, flexible </a:t>
-            </a:r>
-          </a:p>
-          <a:p>
+              <a:rPr lang="de-CH" dirty="0"/>
+              <a:t>Group Targets</a:t>
+            </a:r>
+          </a:p>
+          <a:p>
+            <a:r>
+              <a:rPr lang="de-CH" dirty="0" err="1" smtClean="0"/>
+              <a:t>IoC</a:t>
+            </a:r>
+            <a:r>
+              <a:rPr lang="de-CH" dirty="0" smtClean="0"/>
+              <a:t> </a:t>
+            </a:r>
+            <a:r>
+              <a:rPr lang="de-CH" dirty="0"/>
+              <a:t>/ </a:t>
+            </a:r>
             <a:r>
               <a:rPr lang="de-CH" dirty="0" err="1"/>
-              <a:t>E</a:t>
-            </a:r>
-            <a:r>
-              <a:rPr lang="de-CH" dirty="0" err="1" smtClean="0"/>
-              <a:t>xtensions</a:t>
-            </a:r>
-            <a:r>
-              <a:rPr lang="de-CH" dirty="0" smtClean="0"/>
-              <a:t> </a:t>
-            </a:r>
-            <a:r>
-              <a:rPr lang="de-CH" dirty="0" err="1" smtClean="0"/>
-              <a:t>to</a:t>
-            </a:r>
-            <a:r>
-              <a:rPr lang="de-CH" dirty="0" smtClean="0"/>
-              <a:t> </a:t>
-            </a:r>
-            <a:r>
-              <a:rPr lang="de-CH" dirty="0" err="1" smtClean="0"/>
-              <a:t>the</a:t>
-            </a:r>
-            <a:r>
-              <a:rPr lang="de-CH" dirty="0" smtClean="0"/>
-              <a:t> </a:t>
-            </a:r>
-            <a:r>
-              <a:rPr lang="de-CH" dirty="0" err="1" smtClean="0"/>
-              <a:t>framework</a:t>
-            </a:r>
-            <a:r>
-              <a:rPr lang="de-CH" dirty="0" smtClean="0"/>
-              <a:t> </a:t>
-            </a:r>
-            <a:r>
-              <a:rPr lang="de-CH" dirty="0" err="1" smtClean="0"/>
-              <a:t>are</a:t>
-            </a:r>
-            <a:r>
-              <a:rPr lang="de-CH" dirty="0" smtClean="0"/>
-              <a:t> easy</a:t>
-            </a:r>
-          </a:p>
-          <a:p>
-            <a:r>
-              <a:rPr lang="de-CH" dirty="0" smtClean="0"/>
-              <a:t>Can </a:t>
-            </a:r>
-            <a:r>
-              <a:rPr lang="de-CH" dirty="0" err="1" smtClean="0"/>
-              <a:t>reach</a:t>
-            </a:r>
-            <a:r>
-              <a:rPr lang="de-CH" dirty="0" smtClean="0"/>
-              <a:t> all </a:t>
-            </a:r>
-            <a:r>
-              <a:rPr lang="de-CH" dirty="0" err="1" smtClean="0"/>
-              <a:t>clients</a:t>
-            </a:r>
-            <a:endParaRPr lang="de-CH" dirty="0" smtClean="0"/>
-          </a:p>
-          <a:p>
-            <a:r>
-              <a:rPr lang="de-CH" dirty="0" smtClean="0"/>
-              <a:t>Fast, </a:t>
-            </a:r>
-            <a:r>
-              <a:rPr lang="de-CH" dirty="0" err="1" smtClean="0"/>
-              <a:t>no</a:t>
-            </a:r>
-            <a:r>
-              <a:rPr lang="de-CH" dirty="0" smtClean="0"/>
-              <a:t> </a:t>
-            </a:r>
-            <a:r>
-              <a:rPr lang="de-CH" dirty="0" err="1" smtClean="0"/>
-              <a:t>legacy</a:t>
-            </a:r>
-            <a:r>
-              <a:rPr lang="de-CH" dirty="0" smtClean="0"/>
-              <a:t> </a:t>
-            </a:r>
-            <a:r>
-              <a:rPr lang="de-CH" dirty="0" err="1" smtClean="0"/>
-              <a:t>components</a:t>
-            </a:r>
-            <a:endParaRPr lang="de-CH" dirty="0" smtClean="0"/>
-          </a:p>
-          <a:p>
-            <a:r>
-              <a:rPr lang="de-CH" dirty="0" smtClean="0"/>
-              <a:t>Can </a:t>
-            </a:r>
-            <a:r>
-              <a:rPr lang="de-CH" dirty="0" err="1" smtClean="0"/>
-              <a:t>be</a:t>
-            </a:r>
-            <a:r>
-              <a:rPr lang="de-CH" dirty="0" smtClean="0"/>
-              <a:t> </a:t>
-            </a:r>
-            <a:r>
-              <a:rPr lang="de-CH" dirty="0" err="1" smtClean="0"/>
-              <a:t>hosted</a:t>
-            </a:r>
-            <a:r>
-              <a:rPr lang="de-CH" dirty="0" smtClean="0"/>
-              <a:t> </a:t>
-            </a:r>
-            <a:r>
-              <a:rPr lang="de-CH" dirty="0" err="1" smtClean="0"/>
-              <a:t>anywhere</a:t>
-            </a:r>
-            <a:r>
-              <a:rPr lang="de-CH" dirty="0" smtClean="0"/>
-              <a:t> in .NET</a:t>
-            </a:r>
-          </a:p>
-          <a:p>
-            <a:r>
-              <a:rPr lang="de-CH" dirty="0" smtClean="0"/>
-              <a:t>ODATA</a:t>
-            </a:r>
-          </a:p>
-          <a:p>
-            <a:r>
-              <a:rPr lang="de-CH" dirty="0" smtClean="0"/>
-              <a:t>Support </a:t>
-            </a:r>
-            <a:r>
-              <a:rPr lang="de-CH" dirty="0" err="1" smtClean="0"/>
-              <a:t>for</a:t>
-            </a:r>
-            <a:r>
-              <a:rPr lang="de-CH" dirty="0" smtClean="0"/>
-              <a:t> </a:t>
-            </a:r>
-            <a:r>
-              <a:rPr lang="de-CH" dirty="0" err="1" smtClean="0"/>
-              <a:t>any</a:t>
-            </a:r>
-            <a:r>
-              <a:rPr lang="de-CH" dirty="0" smtClean="0"/>
-              <a:t> </a:t>
-            </a:r>
-            <a:r>
-              <a:rPr lang="de-CH" dirty="0" err="1" smtClean="0"/>
-              <a:t>serializations</a:t>
-            </a:r>
-            <a:endParaRPr lang="de-CH" dirty="0" smtClean="0"/>
-          </a:p>
-          <a:p>
-            <a:r>
-              <a:rPr lang="de-CH" dirty="0" smtClean="0"/>
-              <a:t>Open </a:t>
-            </a:r>
-            <a:r>
-              <a:rPr lang="de-CH" dirty="0" err="1" smtClean="0"/>
-              <a:t>source</a:t>
-            </a:r>
-            <a:r>
-              <a:rPr lang="de-CH" dirty="0" smtClean="0"/>
-              <a:t>, </a:t>
-            </a:r>
-            <a:r>
-              <a:rPr lang="de-CH" dirty="0" err="1" smtClean="0"/>
-              <a:t>very</a:t>
-            </a:r>
-            <a:r>
-              <a:rPr lang="de-CH" dirty="0" smtClean="0"/>
-              <a:t> large </a:t>
-            </a:r>
-            <a:r>
-              <a:rPr lang="de-CH" dirty="0" err="1" smtClean="0"/>
-              <a:t>community</a:t>
-            </a:r>
-            <a:endParaRPr lang="de-CH" dirty="0" smtClean="0"/>
-          </a:p>
-          <a:p>
-            <a:r>
-              <a:rPr lang="de-CH" dirty="0" smtClean="0"/>
-              <a:t>Regular </a:t>
-            </a:r>
-            <a:r>
-              <a:rPr lang="de-CH" dirty="0" err="1" smtClean="0"/>
-              <a:t>updates</a:t>
-            </a:r>
-            <a:r>
-              <a:rPr lang="de-CH" dirty="0" smtClean="0"/>
-              <a:t>, </a:t>
-            </a:r>
-            <a:r>
-              <a:rPr lang="de-CH" dirty="0" err="1" smtClean="0"/>
-              <a:t>free</a:t>
-            </a:r>
-            <a:r>
-              <a:rPr lang="de-CH" dirty="0" smtClean="0"/>
-              <a:t> </a:t>
-            </a:r>
-            <a:r>
-              <a:rPr lang="de-CH" dirty="0" err="1" smtClean="0"/>
-              <a:t>from</a:t>
-            </a:r>
-            <a:r>
-              <a:rPr lang="de-CH" dirty="0" smtClean="0"/>
-              <a:t> .NET </a:t>
-            </a:r>
-            <a:r>
-              <a:rPr lang="de-CH" dirty="0" err="1" smtClean="0"/>
-              <a:t>release</a:t>
-            </a:r>
-            <a:r>
-              <a:rPr lang="de-CH" dirty="0" smtClean="0"/>
-              <a:t> </a:t>
-            </a:r>
-            <a:r>
-              <a:rPr lang="de-CH" dirty="0" err="1" smtClean="0"/>
-              <a:t>cycle</a:t>
-            </a:r>
-            <a:endParaRPr lang="de-CH" dirty="0" smtClean="0"/>
+              <a:t>Lifecycle</a:t>
+            </a:r>
+            <a:endParaRPr lang="de-CH" dirty="0"/>
+          </a:p>
+          <a:p>
+            <a:r>
+              <a:rPr lang="de-CH" dirty="0"/>
+              <a:t>Filters</a:t>
+            </a:r>
+          </a:p>
+          <a:p>
+            <a:r>
+              <a:rPr lang="de-CH" dirty="0" smtClean="0"/>
+              <a:t>Message </a:t>
+            </a:r>
+            <a:r>
+              <a:rPr lang="de-CH" dirty="0"/>
+              <a:t>Handlers</a:t>
+            </a:r>
+          </a:p>
+          <a:p>
+            <a:r>
+              <a:rPr lang="de-CH" dirty="0" err="1"/>
+              <a:t>Batching</a:t>
+            </a:r>
+            <a:r>
+              <a:rPr lang="de-CH" dirty="0"/>
+              <a:t> / e.g. Data </a:t>
+            </a:r>
+            <a:r>
+              <a:rPr lang="de-CH" dirty="0" err="1"/>
+              <a:t>Synchronization</a:t>
+            </a:r>
+            <a:endParaRPr lang="de-CH" dirty="0"/>
+          </a:p>
+          <a:p>
+            <a:r>
+              <a:rPr lang="de-CH" dirty="0" smtClean="0"/>
+              <a:t>Security</a:t>
+            </a:r>
+            <a:endParaRPr lang="de-CH" dirty="0"/>
           </a:p>
         </p:txBody>
       </p:sp>
@@ -6808,20 +7149,13 @@
     </p:spTree>
     <p:extLst>
       <p:ext uri="{BB962C8B-B14F-4D97-AF65-F5344CB8AC3E}">
-        <p14:creationId xmlns:p14="http://schemas.microsoft.com/office/powerpoint/2010/main" val="2508772223"/>
+        <p14:creationId xmlns:p14="http://schemas.microsoft.com/office/powerpoint/2010/main" val="2808493261"/>
       </p:ext>
     </p:extLst>
   </p:cSld>
   <p:clrMapOvr>
     <a:masterClrMapping/>
   </p:clrMapOvr>
-  <p:timing>
-    <p:tnLst>
-      <p:par>
-        <p:cTn id="1" dur="indefinite" restart="never" nodeType="tmRoot"/>
-      </p:par>
-    </p:tnLst>
-  </p:timing>
 </p:sld>
 </file>
 
@@ -7628,15 +7962,6 @@
 </file>
 
 <file path=customXml/item2.xml><?xml version="1.0" encoding="utf-8"?>
-<?mso-contentType ?>
-<FormTemplates xmlns="http://schemas.microsoft.com/sharepoint/v3/contenttype/forms">
-  <Display>DocumentLibraryForm</Display>
-  <Edit>DocumentLibraryForm</Edit>
-  <New>DocumentLibraryForm</New>
-</FormTemplates>
-</file>
-
-<file path=customXml/item3.xml><?xml version="1.0" encoding="utf-8"?>
 <ct:contentTypeSchema xmlns:ct="http://schemas.microsoft.com/office/2006/metadata/contentType" xmlns:ma="http://schemas.microsoft.com/office/2006/metadata/properties/metaAttributes" ct:_="" ma:_="" ma:contentTypeName="Document" ma:contentTypeID="0x0101009B1271BAB3BD97469364141CDC266217" ma:contentTypeVersion="18" ma:contentTypeDescription="Create a new document." ma:contentTypeScope="" ma:versionID="4ab34ffa81e4289ac366dd042dee0b44">
   <xsd:schema xmlns:xsd="http://www.w3.org/2001/XMLSchema" xmlns:p="http://schemas.microsoft.com/office/2006/metadata/properties" xmlns:ns2="0e489163-6afe-4c56-81b4-2fcc3441f0c8" xmlns:ns3="c4c7ba7a-6051-45d4-8501-79302ee9308f" targetNamespace="http://schemas.microsoft.com/office/2006/metadata/properties" ma:root="true" ma:fieldsID="fd4dc6e2fab02cfa8725ef4fd4332e68" ns2:_="" ns3:_="">
     <xsd:import namespace="0e489163-6afe-4c56-81b4-2fcc3441f0c8"/>
@@ -7718,6 +8043,15 @@
 </ct:contentTypeSchema>
 </file>
 
+<file path=customXml/item3.xml><?xml version="1.0" encoding="utf-8"?>
+<?mso-contentType ?>
+<FormTemplates xmlns="http://schemas.microsoft.com/sharepoint/v3/contenttype/forms">
+  <Display>DocumentLibraryForm</Display>
+  <Edit>DocumentLibraryForm</Edit>
+  <New>DocumentLibraryForm</New>
+</FormTemplates>
+</file>
+
 <file path=customXml/itemProps1.xml><?xml version="1.0" encoding="utf-8"?>
 <ds:datastoreItem xmlns:ds="http://schemas.openxmlformats.org/officeDocument/2006/customXml" ds:itemID="{522F6AE9-0EF6-425D-9073-DA80930CD1E5}">
   <ds:schemaRefs>
@@ -7735,14 +8069,6 @@
 </file>
 
 <file path=customXml/itemProps2.xml><?xml version="1.0" encoding="utf-8"?>
-<ds:datastoreItem xmlns:ds="http://schemas.openxmlformats.org/officeDocument/2006/customXml" ds:itemID="{9AFF41A3-1D4D-43FE-BB40-C98B0057EB79}">
-  <ds:schemaRefs>
-    <ds:schemaRef ds:uri="http://schemas.microsoft.com/sharepoint/v3/contenttype/forms"/>
-  </ds:schemaRefs>
-</ds:datastoreItem>
-</file>
-
-<file path=customXml/itemProps3.xml><?xml version="1.0" encoding="utf-8"?>
 <ds:datastoreItem xmlns:ds="http://schemas.openxmlformats.org/officeDocument/2006/customXml" ds:itemID="{B44422EC-4294-4942-AD7A-B87223D7FA2D}">
   <ds:schemaRefs>
     <ds:schemaRef ds:uri="http://schemas.microsoft.com/office/2006/metadata/contentType"/>
@@ -7758,4 +8084,12 @@
     <ds:schemaRef ds:uri="http://schemas.microsoft.com/office/internal/2005/internalDocumentation"/>
   </ds:schemaRefs>
 </ds:datastoreItem>
+</file>
+
+<file path=customXml/itemProps3.xml><?xml version="1.0" encoding="utf-8"?>
+<ds:datastoreItem xmlns:ds="http://schemas.openxmlformats.org/officeDocument/2006/customXml" ds:itemID="{9AFF41A3-1D4D-43FE-BB40-C98B0057EB79}">
+  <ds:schemaRefs>
+    <ds:schemaRef ds:uri="http://schemas.microsoft.com/sharepoint/v3/contenttype/forms"/>
+  </ds:schemaRefs>
+</ds:datastoreItem>
 </file>
</xml_diff>

<commit_message>
Changed: ODATA query in presentation
</commit_message>
<xml_diff>
--- a/WebAPI_Short.pptx
+++ b/WebAPI_Short.pptx
@@ -5534,84 +5534,77 @@
             </a:r>
             <a:r>
               <a:rPr lang="de-CH" dirty="0" smtClean="0"/>
-              <a:t> Web </a:t>
-            </a:r>
-            <a:r>
-              <a:rPr lang="de-CH" dirty="0" smtClean="0"/>
-              <a:t>API?</a:t>
+              <a:t> Web API?</a:t>
+            </a:r>
+          </a:p>
+          <a:p>
+            <a:r>
+              <a:rPr lang="de-CH" dirty="0" smtClean="0"/>
+              <a:t>OWIN Middleware</a:t>
+            </a:r>
+          </a:p>
+          <a:p>
+            <a:r>
+              <a:rPr lang="de-CH" dirty="0" smtClean="0"/>
+              <a:t>Hosting</a:t>
+            </a:r>
+          </a:p>
+          <a:p>
+            <a:r>
+              <a:rPr lang="de-CH" dirty="0" smtClean="0"/>
+              <a:t>Attribute Routing</a:t>
+            </a:r>
+          </a:p>
+          <a:p>
+            <a:r>
+              <a:rPr lang="de-CH" dirty="0" smtClean="0"/>
+              <a:t>Media </a:t>
+            </a:r>
+            <a:r>
+              <a:rPr lang="de-CH" dirty="0" err="1" smtClean="0"/>
+              <a:t>Formatters</a:t>
+            </a:r>
+            <a:r>
+              <a:rPr lang="de-CH" dirty="0" smtClean="0"/>
+              <a:t> / e.g. File </a:t>
+            </a:r>
+            <a:r>
+              <a:rPr lang="de-CH" dirty="0" err="1" smtClean="0"/>
+              <a:t>Up</a:t>
+            </a:r>
+            <a:r>
+              <a:rPr lang="de-CH" dirty="0" smtClean="0"/>
+              <a:t>-/Download</a:t>
+            </a:r>
+          </a:p>
+          <a:p>
+            <a:r>
+              <a:rPr lang="de-CH" dirty="0" smtClean="0"/>
+              <a:t>ODATA</a:t>
+            </a:r>
+          </a:p>
+          <a:p>
+            <a:r>
+              <a:rPr lang="de-CH" dirty="0" smtClean="0"/>
+              <a:t>Other Features</a:t>
+            </a:r>
+          </a:p>
+          <a:p>
+            <a:r>
+              <a:rPr lang="de-CH" dirty="0" smtClean="0"/>
+              <a:t>Advantages/</a:t>
+            </a:r>
+            <a:r>
+              <a:rPr lang="de-CH" dirty="0" err="1" smtClean="0"/>
+              <a:t>Disadvantages</a:t>
             </a:r>
             <a:endParaRPr lang="de-CH" dirty="0" smtClean="0"/>
           </a:p>
           <a:p>
             <a:r>
               <a:rPr lang="de-CH" dirty="0" smtClean="0"/>
-              <a:t>OWIN Middleware</a:t>
-            </a:r>
-          </a:p>
-          <a:p>
-            <a:r>
-              <a:rPr lang="de-CH" dirty="0" smtClean="0"/>
-              <a:t>Hosting</a:t>
-            </a:r>
-          </a:p>
-          <a:p>
-            <a:r>
-              <a:rPr lang="de-CH" dirty="0" smtClean="0"/>
-              <a:t>Attribute Routing</a:t>
-            </a:r>
-          </a:p>
-          <a:p>
-            <a:r>
-              <a:rPr lang="de-CH" dirty="0" smtClean="0"/>
-              <a:t>Media </a:t>
-            </a:r>
-            <a:r>
-              <a:rPr lang="de-CH" dirty="0" err="1" smtClean="0"/>
-              <a:t>Formatters</a:t>
-            </a:r>
-            <a:r>
-              <a:rPr lang="de-CH" dirty="0" smtClean="0"/>
-              <a:t> / e.g. File </a:t>
-            </a:r>
-            <a:r>
-              <a:rPr lang="de-CH" dirty="0" err="1" smtClean="0"/>
-              <a:t>Up</a:t>
-            </a:r>
-            <a:r>
-              <a:rPr lang="de-CH" dirty="0" smtClean="0"/>
-              <a:t>-/Download</a:t>
-            </a:r>
-          </a:p>
-          <a:p>
-            <a:r>
-              <a:rPr lang="de-CH" dirty="0" smtClean="0"/>
-              <a:t>ODATA</a:t>
-            </a:r>
-          </a:p>
-          <a:p>
-            <a:r>
-              <a:rPr lang="de-CH" dirty="0" smtClean="0"/>
-              <a:t>Other Features</a:t>
-            </a:r>
-            <a:endParaRPr lang="de-CH" dirty="0" smtClean="0"/>
-          </a:p>
-          <a:p>
-            <a:r>
-              <a:rPr lang="de-CH" dirty="0" smtClean="0"/>
-              <a:t>Advantages/</a:t>
-            </a:r>
-            <a:r>
-              <a:rPr lang="de-CH" dirty="0" err="1" smtClean="0"/>
-              <a:t>Disadvantages</a:t>
-            </a:r>
-            <a:endParaRPr lang="de-CH" dirty="0" smtClean="0"/>
-          </a:p>
-          <a:p>
-            <a:r>
-              <a:rPr lang="de-CH" dirty="0" smtClean="0"/>
               <a:t>Demo</a:t>
             </a:r>
-            <a:endParaRPr lang="de-CH" dirty="0" smtClean="0"/>
           </a:p>
         </p:txBody>
       </p:sp>
@@ -5712,11 +5705,7 @@
             </a:r>
             <a:r>
               <a:rPr lang="de-CH" dirty="0" smtClean="0"/>
-              <a:t> Web </a:t>
-            </a:r>
-            <a:r>
-              <a:rPr lang="de-CH" dirty="0" smtClean="0"/>
-              <a:t>API?</a:t>
+              <a:t> Web API?</a:t>
             </a:r>
             <a:endParaRPr lang="de-CH" dirty="0"/>
           </a:p>
@@ -6144,11 +6133,7 @@
             </a:r>
             <a:r>
               <a:rPr lang="de-CH" dirty="0" smtClean="0"/>
-              <a:t> </a:t>
-            </a:r>
-            <a:r>
-              <a:rPr lang="de-CH" dirty="0" smtClean="0"/>
-              <a:t>(OWIN </a:t>
+              <a:t> (OWIN </a:t>
             </a:r>
             <a:r>
               <a:rPr lang="de-CH" dirty="0" err="1" smtClean="0"/>
@@ -6223,7 +6208,6 @@
               <a:rPr lang="de-CH" dirty="0" smtClean="0"/>
               <a:t>)</a:t>
             </a:r>
-            <a:endParaRPr lang="de-CH" dirty="0" smtClean="0"/>
           </a:p>
           <a:p>
             <a:r>
@@ -6380,11 +6364,7 @@
           <a:p>
             <a:r>
               <a:rPr lang="de-CH" dirty="0" smtClean="0"/>
-              <a:t>Controller / Action </a:t>
-            </a:r>
-            <a:r>
-              <a:rPr lang="de-CH" dirty="0" smtClean="0"/>
-              <a:t>Level</a:t>
+              <a:t>Controller / Action Level</a:t>
             </a:r>
           </a:p>
           <a:p>
@@ -6944,27 +6924,22 @@
       </p:sp>
       <p:pic>
         <p:nvPicPr>
-          <p:cNvPr id="5" name="Grafik 4"/>
+          <p:cNvPr id="6" name="Grafik 5"/>
           <p:cNvPicPr>
             <a:picLocks noChangeAspect="1"/>
           </p:cNvPicPr>
           <p:nvPr/>
         </p:nvPicPr>
-        <p:blipFill rotWithShape="1">
-          <a:blip r:embed="rId2">
-            <a:extLst>
-              <a:ext uri="{28A0092B-C50C-407E-A947-70E740481C1C}">
-                <a14:useLocalDpi xmlns:a14="http://schemas.microsoft.com/office/drawing/2010/main" val="0"/>
-              </a:ext>
-            </a:extLst>
-          </a:blip>
-          <a:srcRect b="92909"/>
-          <a:stretch/>
+        <p:blipFill>
+          <a:blip r:embed="rId2"/>
+          <a:stretch>
+            <a:fillRect/>
+          </a:stretch>
         </p:blipFill>
         <p:spPr>
           <a:xfrm>
-            <a:off x="395536" y="3284984"/>
-            <a:ext cx="8344103" cy="693096"/>
+            <a:off x="1080000" y="3786834"/>
+            <a:ext cx="6885913" cy="512440"/>
           </a:xfrm>
           <a:prstGeom prst="rect">
             <a:avLst/>
@@ -7962,6 +7937,15 @@
 </file>
 
 <file path=customXml/item2.xml><?xml version="1.0" encoding="utf-8"?>
+<?mso-contentType ?>
+<FormTemplates xmlns="http://schemas.microsoft.com/sharepoint/v3/contenttype/forms">
+  <Display>DocumentLibraryForm</Display>
+  <Edit>DocumentLibraryForm</Edit>
+  <New>DocumentLibraryForm</New>
+</FormTemplates>
+</file>
+
+<file path=customXml/item3.xml><?xml version="1.0" encoding="utf-8"?>
 <ct:contentTypeSchema xmlns:ct="http://schemas.microsoft.com/office/2006/metadata/contentType" xmlns:ma="http://schemas.microsoft.com/office/2006/metadata/properties/metaAttributes" ct:_="" ma:_="" ma:contentTypeName="Document" ma:contentTypeID="0x0101009B1271BAB3BD97469364141CDC266217" ma:contentTypeVersion="18" ma:contentTypeDescription="Create a new document." ma:contentTypeScope="" ma:versionID="4ab34ffa81e4289ac366dd042dee0b44">
   <xsd:schema xmlns:xsd="http://www.w3.org/2001/XMLSchema" xmlns:p="http://schemas.microsoft.com/office/2006/metadata/properties" xmlns:ns2="0e489163-6afe-4c56-81b4-2fcc3441f0c8" xmlns:ns3="c4c7ba7a-6051-45d4-8501-79302ee9308f" targetNamespace="http://schemas.microsoft.com/office/2006/metadata/properties" ma:root="true" ma:fieldsID="fd4dc6e2fab02cfa8725ef4fd4332e68" ns2:_="" ns3:_="">
     <xsd:import namespace="0e489163-6afe-4c56-81b4-2fcc3441f0c8"/>
@@ -8043,15 +8027,6 @@
 </ct:contentTypeSchema>
 </file>
 
-<file path=customXml/item3.xml><?xml version="1.0" encoding="utf-8"?>
-<?mso-contentType ?>
-<FormTemplates xmlns="http://schemas.microsoft.com/sharepoint/v3/contenttype/forms">
-  <Display>DocumentLibraryForm</Display>
-  <Edit>DocumentLibraryForm</Edit>
-  <New>DocumentLibraryForm</New>
-</FormTemplates>
-</file>
-
 <file path=customXml/itemProps1.xml><?xml version="1.0" encoding="utf-8"?>
 <ds:datastoreItem xmlns:ds="http://schemas.openxmlformats.org/officeDocument/2006/customXml" ds:itemID="{522F6AE9-0EF6-425D-9073-DA80930CD1E5}">
   <ds:schemaRefs>
@@ -8069,6 +8044,14 @@
 </file>
 
 <file path=customXml/itemProps2.xml><?xml version="1.0" encoding="utf-8"?>
+<ds:datastoreItem xmlns:ds="http://schemas.openxmlformats.org/officeDocument/2006/customXml" ds:itemID="{9AFF41A3-1D4D-43FE-BB40-C98B0057EB79}">
+  <ds:schemaRefs>
+    <ds:schemaRef ds:uri="http://schemas.microsoft.com/sharepoint/v3/contenttype/forms"/>
+  </ds:schemaRefs>
+</ds:datastoreItem>
+</file>
+
+<file path=customXml/itemProps3.xml><?xml version="1.0" encoding="utf-8"?>
 <ds:datastoreItem xmlns:ds="http://schemas.openxmlformats.org/officeDocument/2006/customXml" ds:itemID="{B44422EC-4294-4942-AD7A-B87223D7FA2D}">
   <ds:schemaRefs>
     <ds:schemaRef ds:uri="http://schemas.microsoft.com/office/2006/metadata/contentType"/>
@@ -8084,12 +8067,4 @@
     <ds:schemaRef ds:uri="http://schemas.microsoft.com/office/internal/2005/internalDocumentation"/>
   </ds:schemaRefs>
 </ds:datastoreItem>
-</file>
-
-<file path=customXml/itemProps3.xml><?xml version="1.0" encoding="utf-8"?>
-<ds:datastoreItem xmlns:ds="http://schemas.openxmlformats.org/officeDocument/2006/customXml" ds:itemID="{9AFF41A3-1D4D-43FE-BB40-C98B0057EB79}">
-  <ds:schemaRefs>
-    <ds:schemaRef ds:uri="http://schemas.microsoft.com/sharepoint/v3/contenttype/forms"/>
-  </ds:schemaRefs>
-</ds:datastoreItem>
 </file>
</xml_diff>

<commit_message>
Changed: WebAPI Presentation by Damien
</commit_message>
<xml_diff>
--- a/WebAPI_Short.pptx
+++ b/WebAPI_Short.pptx
@@ -4701,7 +4701,7 @@
         <p:spPr/>
         <p:txBody>
           <a:bodyPr>
-            <a:normAutofit/>
+            <a:normAutofit lnSpcReduction="10000"/>
           </a:bodyPr>
           <a:lstStyle/>
           <a:p>
@@ -4834,9 +4834,14 @@
           </a:p>
           <a:p>
             <a:r>
-              <a:rPr lang="de-CH" dirty="0" smtClean="0"/>
-              <a:t>ODATA</a:t>
-            </a:r>
+              <a:rPr lang="de-CH" dirty="0" err="1" smtClean="0"/>
+              <a:t>OData</a:t>
+            </a:r>
+            <a:r>
+              <a:rPr lang="de-CH" dirty="0" smtClean="0"/>
+              <a:t> V4</a:t>
+            </a:r>
+            <a:endParaRPr lang="de-CH" dirty="0" smtClean="0"/>
           </a:p>
           <a:p>
             <a:r>
@@ -4932,6 +4937,83 @@
             <a:r>
               <a:rPr lang="de-CH" dirty="0" err="1" smtClean="0"/>
               <a:t>cycle</a:t>
+            </a:r>
+            <a:endParaRPr lang="de-CH" dirty="0" smtClean="0"/>
+          </a:p>
+          <a:p>
+            <a:r>
+              <a:rPr lang="de-CH" dirty="0" err="1" smtClean="0"/>
+              <a:t>vNext</a:t>
+            </a:r>
+            <a:r>
+              <a:rPr lang="de-CH" dirty="0" smtClean="0"/>
+              <a:t> MVC </a:t>
+            </a:r>
+            <a:r>
+              <a:rPr lang="de-CH" dirty="0" err="1" smtClean="0"/>
+              <a:t>and</a:t>
+            </a:r>
+            <a:r>
+              <a:rPr lang="de-CH" dirty="0" smtClean="0"/>
+              <a:t> Web API </a:t>
+            </a:r>
+            <a:r>
+              <a:rPr lang="de-CH" dirty="0" err="1" smtClean="0"/>
+              <a:t>come</a:t>
+            </a:r>
+            <a:r>
+              <a:rPr lang="de-CH" dirty="0" smtClean="0"/>
+              <a:t> </a:t>
+            </a:r>
+            <a:r>
+              <a:rPr lang="de-CH" dirty="0" err="1" smtClean="0"/>
+              <a:t>together</a:t>
+            </a:r>
+            <a:endParaRPr lang="de-CH" dirty="0" smtClean="0"/>
+          </a:p>
+          <a:p>
+            <a:r>
+              <a:rPr lang="de-CH" dirty="0" err="1" smtClean="0"/>
+              <a:t>WebAPiContrib</a:t>
+            </a:r>
+            <a:endParaRPr lang="de-CH" dirty="0" smtClean="0"/>
+          </a:p>
+          <a:p>
+            <a:r>
+              <a:rPr lang="de-CH" dirty="0" smtClean="0"/>
+              <a:t>Lots </a:t>
+            </a:r>
+            <a:r>
+              <a:rPr lang="de-CH" dirty="0" err="1" smtClean="0"/>
+              <a:t>of</a:t>
+            </a:r>
+            <a:r>
+              <a:rPr lang="de-CH" dirty="0" smtClean="0"/>
+              <a:t> cool </a:t>
+            </a:r>
+            <a:r>
+              <a:rPr lang="de-CH" dirty="0" err="1" smtClean="0"/>
+              <a:t>NuGet</a:t>
+            </a:r>
+            <a:r>
+              <a:rPr lang="de-CH" dirty="0" smtClean="0"/>
+              <a:t> </a:t>
+            </a:r>
+            <a:r>
+              <a:rPr lang="de-CH" dirty="0" err="1" smtClean="0"/>
+              <a:t>packages</a:t>
+            </a:r>
+            <a:r>
+              <a:rPr lang="de-CH" dirty="0" smtClean="0"/>
+              <a:t> </a:t>
+            </a:r>
+            <a:r>
+              <a:rPr lang="de-CH" dirty="0" err="1" smtClean="0"/>
+              <a:t>for</a:t>
+            </a:r>
+            <a:r>
+              <a:rPr lang="de-CH" dirty="0" smtClean="0"/>
+              <a:t> Web API</a:t>
             </a:r>
             <a:endParaRPr lang="de-CH" dirty="0" smtClean="0"/>
           </a:p>
@@ -5579,9 +5661,10 @@
           </a:p>
           <a:p>
             <a:r>
-              <a:rPr lang="de-CH" dirty="0" smtClean="0"/>
-              <a:t>ODATA</a:t>
-            </a:r>
+              <a:rPr lang="de-CH" dirty="0" err="1" smtClean="0"/>
+              <a:t>OData</a:t>
+            </a:r>
+            <a:endParaRPr lang="de-CH" dirty="0" smtClean="0"/>
           </a:p>
           <a:p>
             <a:r>
@@ -5804,6 +5887,13 @@
   <p:clrMapOvr>
     <a:masterClrMapping/>
   </p:clrMapOvr>
+  <p:timing>
+    <p:tnLst>
+      <p:par>
+        <p:cTn id="1" dur="indefinite" restart="never" nodeType="tmRoot"/>
+      </p:par>
+    </p:tnLst>
+  </p:timing>
 </p:sld>
 </file>
 
@@ -6222,6 +6312,9 @@
               <a:rPr lang="de-CH" dirty="0" smtClean="0"/>
               <a:t>)</a:t>
             </a:r>
+          </a:p>
+          <a:p>
+            <a:endParaRPr lang="de-CH" dirty="0" smtClean="0"/>
           </a:p>
         </p:txBody>
       </p:sp>
@@ -6742,8 +6835,8 @@
           <a:lstStyle/>
           <a:p>
             <a:r>
-              <a:rPr lang="de-CH" dirty="0" smtClean="0"/>
-              <a:t>ODATA</a:t>
+              <a:rPr lang="de-CH" dirty="0" err="1" smtClean="0"/>
+              <a:t>OData</a:t>
             </a:r>
             <a:endParaRPr lang="de-CH" dirty="0"/>
           </a:p>
@@ -6881,6 +6974,122 @@
             <a:r>
               <a:rPr lang="de-CH" dirty="0" err="1" smtClean="0"/>
               <a:t>filter</a:t>
+            </a:r>
+            <a:r>
+              <a:rPr lang="de-CH" dirty="0" smtClean="0"/>
+              <a:t> (</a:t>
+            </a:r>
+            <a:r>
+              <a:rPr lang="de-CH" dirty="0" err="1" smtClean="0"/>
+              <a:t>OData</a:t>
+            </a:r>
+            <a:r>
+              <a:rPr lang="de-CH" dirty="0" smtClean="0"/>
+              <a:t> V3)</a:t>
+            </a:r>
+          </a:p>
+          <a:p>
+            <a:r>
+              <a:rPr lang="de-CH" dirty="0" err="1" smtClean="0"/>
+              <a:t>OData</a:t>
+            </a:r>
+            <a:r>
+              <a:rPr lang="de-CH" dirty="0" smtClean="0"/>
+              <a:t> V4 </a:t>
+            </a:r>
+            <a:r>
+              <a:rPr lang="de-CH" dirty="0" err="1" smtClean="0"/>
+              <a:t>standard</a:t>
+            </a:r>
+            <a:r>
+              <a:rPr lang="de-CH" dirty="0" smtClean="0"/>
+              <a:t> also </a:t>
+            </a:r>
+            <a:r>
+              <a:rPr lang="de-CH" dirty="0" err="1" smtClean="0"/>
+              <a:t>supported</a:t>
+            </a:r>
+            <a:r>
+              <a:rPr lang="de-CH" dirty="0" smtClean="0"/>
+              <a:t> (</a:t>
+            </a:r>
+            <a:r>
+              <a:rPr lang="de-CH" dirty="0" err="1" smtClean="0"/>
+              <a:t>much</a:t>
+            </a:r>
+            <a:r>
+              <a:rPr lang="de-CH" dirty="0" smtClean="0"/>
+              <a:t> </a:t>
+            </a:r>
+            <a:r>
+              <a:rPr lang="de-CH" dirty="0" err="1" smtClean="0"/>
+              <a:t>more</a:t>
+            </a:r>
+            <a:r>
+              <a:rPr lang="de-CH" dirty="0" smtClean="0"/>
+              <a:t> </a:t>
+            </a:r>
+            <a:r>
+              <a:rPr lang="de-CH" dirty="0" err="1" smtClean="0"/>
+              <a:t>functionality</a:t>
+            </a:r>
+            <a:r>
+              <a:rPr lang="de-CH" dirty="0" smtClean="0"/>
+              <a:t>)</a:t>
+            </a:r>
+          </a:p>
+          <a:p>
+            <a:r>
+              <a:rPr lang="de-CH" dirty="0" smtClean="0"/>
+              <a:t>Can </a:t>
+            </a:r>
+            <a:r>
+              <a:rPr lang="de-CH" dirty="0" err="1" smtClean="0"/>
+              <a:t>inherit</a:t>
+            </a:r>
+            <a:r>
+              <a:rPr lang="de-CH" dirty="0" smtClean="0"/>
+              <a:t> </a:t>
+            </a:r>
+            <a:r>
+              <a:rPr lang="de-CH" dirty="0" err="1" smtClean="0"/>
+              <a:t>from</a:t>
+            </a:r>
+            <a:r>
+              <a:rPr lang="de-CH" dirty="0" smtClean="0"/>
+              <a:t> </a:t>
+            </a:r>
+            <a:r>
+              <a:rPr lang="de-CH" dirty="0" err="1" smtClean="0"/>
+              <a:t>the</a:t>
+            </a:r>
+            <a:r>
+              <a:rPr lang="de-CH" dirty="0" smtClean="0"/>
+              <a:t> </a:t>
+            </a:r>
+            <a:r>
+              <a:rPr lang="de-CH" dirty="0" err="1" smtClean="0"/>
+              <a:t>ODataControll</a:t>
+            </a:r>
+            <a:r>
+              <a:rPr lang="de-CH" dirty="0" err="1" smtClean="0"/>
+              <a:t>er</a:t>
+            </a:r>
+            <a:r>
+              <a:rPr lang="de-CH" dirty="0" smtClean="0"/>
+              <a:t> </a:t>
+            </a:r>
+            <a:r>
+              <a:rPr lang="de-CH" dirty="0" err="1" smtClean="0"/>
+              <a:t>or</a:t>
+            </a:r>
+            <a:r>
+              <a:rPr lang="de-CH" dirty="0" smtClean="0"/>
+              <a:t> </a:t>
+            </a:r>
+            <a:r>
+              <a:rPr lang="de-CH" dirty="0" err="1" smtClean="0"/>
+              <a:t>ApiController</a:t>
             </a:r>
             <a:endParaRPr lang="de-CH" dirty="0" smtClean="0"/>
           </a:p>
@@ -6938,7 +7147,7 @@
         </p:blipFill>
         <p:spPr>
           <a:xfrm>
-            <a:off x="1080000" y="3786834"/>
+            <a:off x="1080000" y="4149080"/>
             <a:ext cx="6885913" cy="512440"/>
           </a:xfrm>
           <a:prstGeom prst="rect">
@@ -7022,12 +7231,6 @@
           <a:lstStyle/>
           <a:p>
             <a:r>
-              <a:rPr lang="de-CH" dirty="0"/>
-              <a:t>Group Targets</a:t>
-            </a:r>
-          </a:p>
-          <a:p>
-            <a:r>
               <a:rPr lang="de-CH" dirty="0" err="1" smtClean="0"/>
               <a:t>IoC</a:t>
             </a:r>
@@ -7071,15 +7274,147 @@
               <a:t> / e.g. Data </a:t>
             </a:r>
             <a:r>
-              <a:rPr lang="de-CH" dirty="0" err="1"/>
+              <a:rPr lang="de-CH" dirty="0" err="1" smtClean="0"/>
               <a:t>Synchronization</a:t>
             </a:r>
+            <a:r>
+              <a:rPr lang="de-CH" dirty="0" smtClean="0"/>
+              <a:t> </a:t>
+            </a:r>
+            <a:r>
+              <a:rPr lang="de-CH" dirty="0" err="1" smtClean="0"/>
+              <a:t>works</a:t>
+            </a:r>
+            <a:r>
+              <a:rPr lang="de-CH" dirty="0" smtClean="0"/>
+              <a:t>, </a:t>
+            </a:r>
+            <a:r>
+              <a:rPr lang="de-CH" dirty="0" err="1" smtClean="0"/>
+              <a:t>for</a:t>
+            </a:r>
+            <a:r>
+              <a:rPr lang="de-CH" dirty="0" smtClean="0"/>
+              <a:t> Web API </a:t>
+            </a:r>
+            <a:r>
+              <a:rPr lang="de-CH" dirty="0" err="1" smtClean="0"/>
+              <a:t>or</a:t>
+            </a:r>
+            <a:r>
+              <a:rPr lang="de-CH" dirty="0" smtClean="0"/>
+              <a:t> Web API </a:t>
+            </a:r>
+            <a:r>
+              <a:rPr lang="de-CH" dirty="0" err="1" smtClean="0"/>
+              <a:t>OData</a:t>
+            </a:r>
+            <a:r>
+              <a:rPr lang="de-CH" dirty="0" smtClean="0"/>
+              <a:t>, </a:t>
+            </a:r>
+            <a:r>
+              <a:rPr lang="de-CH" dirty="0" err="1" smtClean="0"/>
+              <a:t>single</a:t>
+            </a:r>
+            <a:r>
+              <a:rPr lang="de-CH" dirty="0" smtClean="0"/>
+              <a:t> </a:t>
+            </a:r>
+            <a:r>
+              <a:rPr lang="de-CH" dirty="0" err="1" smtClean="0"/>
+              <a:t>transaction</a:t>
+            </a:r>
+            <a:r>
+              <a:rPr lang="de-CH" dirty="0" smtClean="0"/>
+              <a:t> </a:t>
+            </a:r>
+            <a:r>
+              <a:rPr lang="de-CH" dirty="0" err="1" smtClean="0"/>
+              <a:t>possible</a:t>
+            </a:r>
+            <a:r>
+              <a:rPr lang="de-CH" dirty="0" smtClean="0"/>
+              <a:t> </a:t>
+            </a:r>
+            <a:r>
+              <a:rPr lang="de-CH" dirty="0" err="1" smtClean="0"/>
+              <a:t>for</a:t>
+            </a:r>
+            <a:r>
+              <a:rPr lang="de-CH" dirty="0" smtClean="0"/>
+              <a:t> all </a:t>
+            </a:r>
+            <a:r>
+              <a:rPr lang="de-CH" dirty="0" err="1" smtClean="0"/>
+              <a:t>batch</a:t>
+            </a:r>
+            <a:r>
+              <a:rPr lang="de-CH" dirty="0" smtClean="0"/>
+              <a:t> </a:t>
+            </a:r>
+            <a:r>
+              <a:rPr lang="de-CH" dirty="0" err="1" smtClean="0"/>
+              <a:t>requests</a:t>
+            </a:r>
+            <a:r>
+              <a:rPr lang="de-CH" dirty="0" smtClean="0"/>
+              <a:t>, </a:t>
+            </a:r>
+            <a:r>
+              <a:rPr lang="de-CH" dirty="0" err="1" smtClean="0"/>
+              <a:t>or</a:t>
+            </a:r>
+            <a:r>
+              <a:rPr lang="de-CH" dirty="0" smtClean="0"/>
+              <a:t> </a:t>
+            </a:r>
+            <a:r>
+              <a:rPr lang="de-CH" dirty="0" err="1" smtClean="0"/>
+              <a:t>each</a:t>
+            </a:r>
+            <a:r>
+              <a:rPr lang="de-CH" dirty="0" smtClean="0"/>
+              <a:t> </a:t>
+            </a:r>
+            <a:r>
+              <a:rPr lang="de-CH" dirty="0" err="1" smtClean="0"/>
+              <a:t>request</a:t>
+            </a:r>
+            <a:r>
+              <a:rPr lang="de-CH" dirty="0"/>
+              <a:t>.</a:t>
+            </a:r>
             <a:endParaRPr lang="de-CH" dirty="0"/>
           </a:p>
           <a:p>
             <a:r>
               <a:rPr lang="de-CH" dirty="0" smtClean="0"/>
-              <a:t>Security</a:t>
+              <a:t>Security; </a:t>
+            </a:r>
+            <a:r>
+              <a:rPr lang="de-CH" dirty="0" err="1" smtClean="0"/>
+              <a:t>uses</a:t>
+            </a:r>
+            <a:r>
+              <a:rPr lang="de-CH" dirty="0" smtClean="0"/>
+              <a:t> OWIN </a:t>
+            </a:r>
+            <a:r>
+              <a:rPr lang="de-CH" dirty="0" err="1" smtClean="0"/>
+              <a:t>security</a:t>
+            </a:r>
+            <a:r>
+              <a:rPr lang="de-CH" dirty="0"/>
+              <a:t> </a:t>
+            </a:r>
+            <a:r>
+              <a:rPr lang="de-CH" dirty="0" err="1" smtClean="0"/>
+              <a:t>model</a:t>
+            </a:r>
+            <a:r>
+              <a:rPr lang="de-CH" dirty="0" smtClean="0"/>
+              <a:t> </a:t>
             </a:r>
             <a:endParaRPr lang="de-CH" dirty="0"/>
           </a:p>
@@ -7131,6 +7466,13 @@
   <p:clrMapOvr>
     <a:masterClrMapping/>
   </p:clrMapOvr>
+  <p:timing>
+    <p:tnLst>
+      <p:par>
+        <p:cTn id="1" dur="indefinite" restart="never" nodeType="tmRoot"/>
+      </p:par>
+    </p:tnLst>
+  </p:timing>
 </p:sld>
 </file>
 
@@ -7937,15 +8279,6 @@
 </file>
 
 <file path=customXml/item2.xml><?xml version="1.0" encoding="utf-8"?>
-<?mso-contentType ?>
-<FormTemplates xmlns="http://schemas.microsoft.com/sharepoint/v3/contenttype/forms">
-  <Display>DocumentLibraryForm</Display>
-  <Edit>DocumentLibraryForm</Edit>
-  <New>DocumentLibraryForm</New>
-</FormTemplates>
-</file>
-
-<file path=customXml/item3.xml><?xml version="1.0" encoding="utf-8"?>
 <ct:contentTypeSchema xmlns:ct="http://schemas.microsoft.com/office/2006/metadata/contentType" xmlns:ma="http://schemas.microsoft.com/office/2006/metadata/properties/metaAttributes" ct:_="" ma:_="" ma:contentTypeName="Document" ma:contentTypeID="0x0101009B1271BAB3BD97469364141CDC266217" ma:contentTypeVersion="18" ma:contentTypeDescription="Create a new document." ma:contentTypeScope="" ma:versionID="4ab34ffa81e4289ac366dd042dee0b44">
   <xsd:schema xmlns:xsd="http://www.w3.org/2001/XMLSchema" xmlns:p="http://schemas.microsoft.com/office/2006/metadata/properties" xmlns:ns2="0e489163-6afe-4c56-81b4-2fcc3441f0c8" xmlns:ns3="c4c7ba7a-6051-45d4-8501-79302ee9308f" targetNamespace="http://schemas.microsoft.com/office/2006/metadata/properties" ma:root="true" ma:fieldsID="fd4dc6e2fab02cfa8725ef4fd4332e68" ns2:_="" ns3:_="">
     <xsd:import namespace="0e489163-6afe-4c56-81b4-2fcc3441f0c8"/>
@@ -8027,6 +8360,15 @@
 </ct:contentTypeSchema>
 </file>
 
+<file path=customXml/item3.xml><?xml version="1.0" encoding="utf-8"?>
+<?mso-contentType ?>
+<FormTemplates xmlns="http://schemas.microsoft.com/sharepoint/v3/contenttype/forms">
+  <Display>DocumentLibraryForm</Display>
+  <Edit>DocumentLibraryForm</Edit>
+  <New>DocumentLibraryForm</New>
+</FormTemplates>
+</file>
+
 <file path=customXml/itemProps1.xml><?xml version="1.0" encoding="utf-8"?>
 <ds:datastoreItem xmlns:ds="http://schemas.openxmlformats.org/officeDocument/2006/customXml" ds:itemID="{522F6AE9-0EF6-425D-9073-DA80930CD1E5}">
   <ds:schemaRefs>
@@ -8044,14 +8386,6 @@
 </file>
 
 <file path=customXml/itemProps2.xml><?xml version="1.0" encoding="utf-8"?>
-<ds:datastoreItem xmlns:ds="http://schemas.openxmlformats.org/officeDocument/2006/customXml" ds:itemID="{9AFF41A3-1D4D-43FE-BB40-C98B0057EB79}">
-  <ds:schemaRefs>
-    <ds:schemaRef ds:uri="http://schemas.microsoft.com/sharepoint/v3/contenttype/forms"/>
-  </ds:schemaRefs>
-</ds:datastoreItem>
-</file>
-
-<file path=customXml/itemProps3.xml><?xml version="1.0" encoding="utf-8"?>
 <ds:datastoreItem xmlns:ds="http://schemas.openxmlformats.org/officeDocument/2006/customXml" ds:itemID="{B44422EC-4294-4942-AD7A-B87223D7FA2D}">
   <ds:schemaRefs>
     <ds:schemaRef ds:uri="http://schemas.microsoft.com/office/2006/metadata/contentType"/>
@@ -8067,4 +8401,12 @@
     <ds:schemaRef ds:uri="http://schemas.microsoft.com/office/internal/2005/internalDocumentation"/>
   </ds:schemaRefs>
 </ds:datastoreItem>
+</file>
+
+<file path=customXml/itemProps3.xml><?xml version="1.0" encoding="utf-8"?>
+<ds:datastoreItem xmlns:ds="http://schemas.openxmlformats.org/officeDocument/2006/customXml" ds:itemID="{9AFF41A3-1D4D-43FE-BB40-C98B0057EB79}">
+  <ds:schemaRefs>
+    <ds:schemaRef ds:uri="http://schemas.microsoft.com/sharepoint/v3/contenttype/forms"/>
+  </ds:schemaRefs>
+</ds:datastoreItem>
 </file>
</xml_diff>

<commit_message>
Changed: Short Presentation and removed the route prefix of ASP app because it would conflict with the global config
</commit_message>
<xml_diff>
--- a/WebAPI_Short.pptx
+++ b/WebAPI_Short.pptx
@@ -5,10 +5,10 @@
     <p:sldMasterId id="2147483672" r:id="rId4"/>
   </p:sldMasterIdLst>
   <p:notesMasterIdLst>
-    <p:notesMasterId r:id="rId19"/>
+    <p:notesMasterId r:id="rId20"/>
   </p:notesMasterIdLst>
   <p:handoutMasterIdLst>
-    <p:handoutMasterId r:id="rId20"/>
+    <p:handoutMasterId r:id="rId21"/>
   </p:handoutMasterIdLst>
   <p:sldIdLst>
     <p:sldId id="256" r:id="rId5"/>
@@ -17,14 +17,15 @@
     <p:sldId id="282" r:id="rId8"/>
     <p:sldId id="263" r:id="rId9"/>
     <p:sldId id="267" r:id="rId10"/>
-    <p:sldId id="268" r:id="rId11"/>
-    <p:sldId id="269" r:id="rId12"/>
-    <p:sldId id="289" r:id="rId13"/>
-    <p:sldId id="273" r:id="rId14"/>
-    <p:sldId id="287" r:id="rId15"/>
-    <p:sldId id="290" r:id="rId16"/>
-    <p:sldId id="291" r:id="rId17"/>
-    <p:sldId id="258" r:id="rId18"/>
+    <p:sldId id="292" r:id="rId11"/>
+    <p:sldId id="268" r:id="rId12"/>
+    <p:sldId id="269" r:id="rId13"/>
+    <p:sldId id="289" r:id="rId14"/>
+    <p:sldId id="273" r:id="rId15"/>
+    <p:sldId id="287" r:id="rId16"/>
+    <p:sldId id="290" r:id="rId17"/>
+    <p:sldId id="291" r:id="rId18"/>
+    <p:sldId id="258" r:id="rId19"/>
   </p:sldIdLst>
   <p:sldSz cx="9144000" cy="6858000" type="screen4x3"/>
   <p:notesSz cx="6858000" cy="9144000"/>
@@ -4682,7 +4683,7 @@
           <a:p>
             <a:r>
               <a:rPr lang="de-CH" dirty="0" smtClean="0"/>
-              <a:t>Advantages</a:t>
+              <a:t>Other Features</a:t>
             </a:r>
             <a:endParaRPr lang="de-CH" dirty="0"/>
           </a:p>
@@ -4700,24 +4701,55 @@
         </p:nvSpPr>
         <p:spPr/>
         <p:txBody>
-          <a:bodyPr>
-            <a:normAutofit lnSpcReduction="10000"/>
-          </a:bodyPr>
+          <a:bodyPr/>
           <a:lstStyle/>
           <a:p>
             <a:r>
-              <a:rPr lang="de-CH" dirty="0" smtClean="0"/>
-              <a:t>KISS, flexible </a:t>
-            </a:r>
-          </a:p>
-          <a:p>
+              <a:rPr lang="de-CH" dirty="0" err="1" smtClean="0"/>
+              <a:t>IoC</a:t>
+            </a:r>
+            <a:r>
+              <a:rPr lang="de-CH" dirty="0" smtClean="0"/>
+              <a:t> </a:t>
+            </a:r>
+            <a:r>
+              <a:rPr lang="de-CH" dirty="0"/>
+              <a:t>/ </a:t>
+            </a:r>
             <a:r>
               <a:rPr lang="de-CH" dirty="0" err="1"/>
-              <a:t>E</a:t>
-            </a:r>
-            <a:r>
-              <a:rPr lang="de-CH" dirty="0" err="1" smtClean="0"/>
-              <a:t>xtensions</a:t>
+              <a:t>Lifecycle</a:t>
+            </a:r>
+            <a:endParaRPr lang="de-CH" dirty="0"/>
+          </a:p>
+          <a:p>
+            <a:r>
+              <a:rPr lang="de-CH" dirty="0"/>
+              <a:t>Filters</a:t>
+            </a:r>
+          </a:p>
+          <a:p>
+            <a:r>
+              <a:rPr lang="de-CH" dirty="0" smtClean="0"/>
+              <a:t>Message </a:t>
+            </a:r>
+            <a:r>
+              <a:rPr lang="de-CH" dirty="0"/>
+              <a:t>Handlers</a:t>
+            </a:r>
+          </a:p>
+          <a:p>
+            <a:r>
+              <a:rPr lang="de-CH" dirty="0" err="1"/>
+              <a:t>Batching</a:t>
+            </a:r>
+            <a:r>
+              <a:rPr lang="de-CH" dirty="0"/>
+              <a:t> / e.g. Data </a:t>
+            </a:r>
+            <a:r>
+              <a:rPr lang="de-CH" dirty="0" err="1" smtClean="0"/>
+              <a:t>Synchronization</a:t>
             </a:r>
             <a:r>
               <a:rPr lang="de-CH" dirty="0" smtClean="0"/>
@@ -4725,7 +4757,39 @@
             </a:r>
             <a:r>
               <a:rPr lang="de-CH" dirty="0" err="1" smtClean="0"/>
-              <a:t>to</a:t>
+              <a:t>works</a:t>
+            </a:r>
+            <a:r>
+              <a:rPr lang="de-CH" dirty="0" smtClean="0"/>
+              <a:t>, </a:t>
+            </a:r>
+            <a:r>
+              <a:rPr lang="de-CH" dirty="0" err="1" smtClean="0"/>
+              <a:t>for</a:t>
+            </a:r>
+            <a:r>
+              <a:rPr lang="de-CH" dirty="0" smtClean="0"/>
+              <a:t> Web API </a:t>
+            </a:r>
+            <a:r>
+              <a:rPr lang="de-CH" dirty="0" err="1" smtClean="0"/>
+              <a:t>or</a:t>
+            </a:r>
+            <a:r>
+              <a:rPr lang="de-CH" dirty="0" smtClean="0"/>
+              <a:t> Web API </a:t>
+            </a:r>
+            <a:r>
+              <a:rPr lang="de-CH" dirty="0" err="1" smtClean="0"/>
+              <a:t>OData</a:t>
+            </a:r>
+            <a:r>
+              <a:rPr lang="de-CH" dirty="0" smtClean="0"/>
+              <a:t>, </a:t>
+            </a:r>
+            <a:r>
+              <a:rPr lang="de-CH" dirty="0" err="1" smtClean="0"/>
+              <a:t>single</a:t>
             </a:r>
             <a:r>
               <a:rPr lang="de-CH" dirty="0" smtClean="0"/>
@@ -4733,7 +4797,7 @@
             </a:r>
             <a:r>
               <a:rPr lang="de-CH" dirty="0" err="1" smtClean="0"/>
-              <a:t>the</a:t>
+              <a:t>transaction</a:t>
             </a:r>
             <a:r>
               <a:rPr lang="de-CH" dirty="0" smtClean="0"/>
@@ -4741,7 +4805,7 @@
             </a:r>
             <a:r>
               <a:rPr lang="de-CH" dirty="0" err="1" smtClean="0"/>
-              <a:t>framework</a:t>
+              <a:t>possible</a:t>
             </a:r>
             <a:r>
               <a:rPr lang="de-CH" dirty="0" smtClean="0"/>
@@ -4749,21 +4813,7 @@
             </a:r>
             <a:r>
               <a:rPr lang="de-CH" dirty="0" err="1" smtClean="0"/>
-              <a:t>are</a:t>
-            </a:r>
-            <a:r>
-              <a:rPr lang="de-CH" dirty="0" smtClean="0"/>
-              <a:t> easy</a:t>
-            </a:r>
-          </a:p>
-          <a:p>
-            <a:r>
-              <a:rPr lang="de-CH" dirty="0" smtClean="0"/>
-              <a:t>Can </a:t>
-            </a:r>
-            <a:r>
-              <a:rPr lang="de-CH" dirty="0" err="1" smtClean="0"/>
-              <a:t>reach</a:t>
+              <a:t>for</a:t>
             </a:r>
             <a:r>
               <a:rPr lang="de-CH" dirty="0" smtClean="0"/>
@@ -4771,18 +4821,7 @@
             </a:r>
             <a:r>
               <a:rPr lang="de-CH" dirty="0" err="1" smtClean="0"/>
-              <a:t>clients</a:t>
-            </a:r>
-            <a:endParaRPr lang="de-CH" dirty="0" smtClean="0"/>
-          </a:p>
-          <a:p>
-            <a:r>
-              <a:rPr lang="de-CH" dirty="0" smtClean="0"/>
-              <a:t>Fast, </a:t>
-            </a:r>
-            <a:r>
-              <a:rPr lang="de-CH" dirty="0" err="1" smtClean="0"/>
-              <a:t>no</a:t>
+              <a:t>batch</a:t>
             </a:r>
             <a:r>
               <a:rPr lang="de-CH" dirty="0" smtClean="0"/>
@@ -4790,7 +4829,15 @@
             </a:r>
             <a:r>
               <a:rPr lang="de-CH" dirty="0" err="1" smtClean="0"/>
-              <a:t>legacy</a:t>
+              <a:t>requests</a:t>
+            </a:r>
+            <a:r>
+              <a:rPr lang="de-CH" dirty="0" smtClean="0"/>
+              <a:t>, </a:t>
+            </a:r>
+            <a:r>
+              <a:rPr lang="de-CH" dirty="0" err="1" smtClean="0"/>
+              <a:t>or</a:t>
             </a:r>
             <a:r>
               <a:rPr lang="de-CH" dirty="0" smtClean="0"/>
@@ -4798,18 +4845,7 @@
             </a:r>
             <a:r>
               <a:rPr lang="de-CH" dirty="0" err="1" smtClean="0"/>
-              <a:t>components</a:t>
-            </a:r>
-            <a:endParaRPr lang="de-CH" dirty="0" smtClean="0"/>
-          </a:p>
-          <a:p>
-            <a:r>
-              <a:rPr lang="de-CH" dirty="0" smtClean="0"/>
-              <a:t>Can </a:t>
-            </a:r>
-            <a:r>
-              <a:rPr lang="de-CH" dirty="0" err="1" smtClean="0"/>
-              <a:t>be</a:t>
+              <a:t>each</a:t>
             </a:r>
             <a:r>
               <a:rPr lang="de-CH" dirty="0" smtClean="0"/>
@@ -4817,205 +4853,43 @@
             </a:r>
             <a:r>
               <a:rPr lang="de-CH" dirty="0" err="1" smtClean="0"/>
-              <a:t>hosted</a:t>
-            </a:r>
-            <a:r>
-              <a:rPr lang="de-CH" dirty="0" smtClean="0"/>
+              <a:t>request</a:t>
+            </a:r>
+            <a:r>
+              <a:rPr lang="de-CH" dirty="0"/>
+              <a:t>.</a:t>
+            </a:r>
+          </a:p>
+          <a:p>
+            <a:r>
+              <a:rPr lang="de-CH" dirty="0" smtClean="0"/>
+              <a:t>Security; </a:t>
+            </a:r>
+            <a:r>
+              <a:rPr lang="de-CH" dirty="0" err="1" smtClean="0"/>
+              <a:t>uses</a:t>
+            </a:r>
+            <a:r>
+              <a:rPr lang="de-CH" dirty="0" smtClean="0"/>
+              <a:t> OWIN </a:t>
+            </a:r>
+            <a:r>
+              <a:rPr lang="de-CH" dirty="0" err="1" smtClean="0"/>
+              <a:t>security</a:t>
+            </a:r>
+            <a:r>
+              <a:rPr lang="de-CH" dirty="0"/>
               <a:t> </a:t>
             </a:r>
             <a:r>
               <a:rPr lang="de-CH" dirty="0" err="1" smtClean="0"/>
-              <a:t>anywhere</a:t>
-            </a:r>
-            <a:r>
-              <a:rPr lang="de-CH" dirty="0" smtClean="0"/>
-              <a:t> in .NET</a:t>
-            </a:r>
-          </a:p>
-          <a:p>
-            <a:r>
-              <a:rPr lang="de-CH" dirty="0" err="1" smtClean="0"/>
-              <a:t>OData</a:t>
-            </a:r>
-            <a:r>
-              <a:rPr lang="de-CH" dirty="0" smtClean="0"/>
-              <a:t> V4</a:t>
-            </a:r>
-            <a:endParaRPr lang="de-CH" dirty="0" smtClean="0"/>
-          </a:p>
-          <a:p>
-            <a:r>
-              <a:rPr lang="de-CH" dirty="0" smtClean="0"/>
-              <a:t>Support </a:t>
-            </a:r>
-            <a:r>
-              <a:rPr lang="de-CH" dirty="0" err="1" smtClean="0"/>
-              <a:t>for</a:t>
+              <a:t>model</a:t>
             </a:r>
             <a:r>
               <a:rPr lang="de-CH" dirty="0" smtClean="0"/>
               <a:t> </a:t>
             </a:r>
-            <a:r>
-              <a:rPr lang="de-CH" dirty="0" err="1" smtClean="0"/>
-              <a:t>any</a:t>
-            </a:r>
-            <a:r>
-              <a:rPr lang="de-CH" dirty="0" smtClean="0"/>
-              <a:t> </a:t>
-            </a:r>
-            <a:r>
-              <a:rPr lang="de-CH" dirty="0" err="1" smtClean="0"/>
-              <a:t>serializations</a:t>
-            </a:r>
-            <a:endParaRPr lang="de-CH" dirty="0" smtClean="0"/>
-          </a:p>
-          <a:p>
-            <a:r>
-              <a:rPr lang="de-CH" dirty="0" smtClean="0"/>
-              <a:t>Open </a:t>
-            </a:r>
-            <a:r>
-              <a:rPr lang="de-CH" dirty="0" err="1" smtClean="0"/>
-              <a:t>source</a:t>
-            </a:r>
-            <a:r>
-              <a:rPr lang="de-CH" dirty="0" smtClean="0"/>
-              <a:t>, </a:t>
-            </a:r>
-            <a:r>
-              <a:rPr lang="de-CH" dirty="0" err="1" smtClean="0"/>
-              <a:t>very</a:t>
-            </a:r>
-            <a:r>
-              <a:rPr lang="de-CH" dirty="0" smtClean="0"/>
-              <a:t> large </a:t>
-            </a:r>
-            <a:r>
-              <a:rPr lang="de-CH" dirty="0" err="1" smtClean="0"/>
-              <a:t>community</a:t>
-            </a:r>
-            <a:endParaRPr lang="de-CH" dirty="0" smtClean="0"/>
-          </a:p>
-          <a:p>
-            <a:r>
-              <a:rPr lang="de-CH" dirty="0" smtClean="0"/>
-              <a:t>Regular </a:t>
-            </a:r>
-            <a:r>
-              <a:rPr lang="de-CH" dirty="0" err="1" smtClean="0"/>
-              <a:t>updates</a:t>
-            </a:r>
-            <a:r>
-              <a:rPr lang="de-CH" dirty="0" smtClean="0"/>
-              <a:t>, </a:t>
-            </a:r>
-            <a:r>
-              <a:rPr lang="de-CH" dirty="0" err="1" smtClean="0"/>
-              <a:t>free</a:t>
-            </a:r>
-            <a:r>
-              <a:rPr lang="de-CH" dirty="0" smtClean="0"/>
-              <a:t> </a:t>
-            </a:r>
-            <a:r>
-              <a:rPr lang="de-CH" dirty="0" err="1" smtClean="0"/>
-              <a:t>from</a:t>
-            </a:r>
-            <a:r>
-              <a:rPr lang="de-CH" dirty="0" smtClean="0"/>
-              <a:t> .NET </a:t>
-            </a:r>
-            <a:r>
-              <a:rPr lang="de-CH" dirty="0" err="1" smtClean="0"/>
-              <a:t>release</a:t>
-            </a:r>
-            <a:r>
-              <a:rPr lang="de-CH" dirty="0" smtClean="0"/>
-              <a:t> </a:t>
-            </a:r>
-            <a:r>
-              <a:rPr lang="de-CH" dirty="0" err="1" smtClean="0"/>
-              <a:t>cycle</a:t>
-            </a:r>
-            <a:endParaRPr lang="de-CH" dirty="0" smtClean="0"/>
-          </a:p>
-          <a:p>
-            <a:r>
-              <a:rPr lang="de-CH" dirty="0" err="1" smtClean="0"/>
-              <a:t>vNext</a:t>
-            </a:r>
-            <a:r>
-              <a:rPr lang="de-CH" dirty="0" smtClean="0"/>
-              <a:t> MVC </a:t>
-            </a:r>
-            <a:r>
-              <a:rPr lang="de-CH" dirty="0" err="1" smtClean="0"/>
-              <a:t>and</a:t>
-            </a:r>
-            <a:r>
-              <a:rPr lang="de-CH" dirty="0" smtClean="0"/>
-              <a:t> Web API </a:t>
-            </a:r>
-            <a:r>
-              <a:rPr lang="de-CH" dirty="0" err="1" smtClean="0"/>
-              <a:t>come</a:t>
-            </a:r>
-            <a:r>
-              <a:rPr lang="de-CH" dirty="0" smtClean="0"/>
-              <a:t> </a:t>
-            </a:r>
-            <a:r>
-              <a:rPr lang="de-CH" dirty="0" err="1" smtClean="0"/>
-              <a:t>together</a:t>
-            </a:r>
-            <a:endParaRPr lang="de-CH" dirty="0" smtClean="0"/>
-          </a:p>
-          <a:p>
-            <a:r>
-              <a:rPr lang="de-CH" dirty="0" err="1" smtClean="0"/>
-              <a:t>WebAPiContrib</a:t>
-            </a:r>
-            <a:endParaRPr lang="de-CH" dirty="0" smtClean="0"/>
-          </a:p>
-          <a:p>
-            <a:r>
-              <a:rPr lang="de-CH" dirty="0" smtClean="0"/>
-              <a:t>Lots </a:t>
-            </a:r>
-            <a:r>
-              <a:rPr lang="de-CH" dirty="0" err="1" smtClean="0"/>
-              <a:t>of</a:t>
-            </a:r>
-            <a:r>
-              <a:rPr lang="de-CH" dirty="0" smtClean="0"/>
-              <a:t> cool </a:t>
-            </a:r>
-            <a:r>
-              <a:rPr lang="de-CH" dirty="0" err="1" smtClean="0"/>
-              <a:t>NuGet</a:t>
-            </a:r>
-            <a:r>
-              <a:rPr lang="de-CH" dirty="0" smtClean="0"/>
-              <a:t> </a:t>
-            </a:r>
-            <a:r>
-              <a:rPr lang="de-CH" dirty="0" err="1" smtClean="0"/>
-              <a:t>packages</a:t>
-            </a:r>
-            <a:r>
-              <a:rPr lang="de-CH" dirty="0" smtClean="0"/>
-              <a:t> </a:t>
-            </a:r>
-            <a:r>
-              <a:rPr lang="de-CH" dirty="0" err="1" smtClean="0"/>
-              <a:t>for</a:t>
-            </a:r>
-            <a:r>
-              <a:rPr lang="de-CH" dirty="0" smtClean="0"/>
-              <a:t> Web API</a:t>
-            </a:r>
-            <a:endParaRPr lang="de-CH" dirty="0" smtClean="0"/>
+            <a:endParaRPr lang="de-CH" dirty="0"/>
           </a:p>
         </p:txBody>
       </p:sp>
@@ -5058,7 +4932,7 @@
     </p:spTree>
     <p:extLst>
       <p:ext uri="{BB962C8B-B14F-4D97-AF65-F5344CB8AC3E}">
-        <p14:creationId xmlns:p14="http://schemas.microsoft.com/office/powerpoint/2010/main" val="2508772223"/>
+        <p14:creationId xmlns:p14="http://schemas.microsoft.com/office/powerpoint/2010/main" val="2808493261"/>
       </p:ext>
     </p:extLst>
   </p:cSld>
@@ -5108,8 +4982,8 @@
           <a:lstStyle/>
           <a:p>
             <a:r>
-              <a:rPr lang="de-CH" dirty="0" err="1"/>
-              <a:t>Disadvantages</a:t>
+              <a:rPr lang="de-CH" dirty="0" smtClean="0"/>
+              <a:t>Advantages</a:t>
             </a:r>
             <a:endParaRPr lang="de-CH" dirty="0"/>
           </a:p>
@@ -5128,17 +5002,23 @@
         <p:spPr/>
         <p:txBody>
           <a:bodyPr>
-            <a:normAutofit/>
+            <a:normAutofit lnSpcReduction="10000"/>
           </a:bodyPr>
           <a:lstStyle/>
           <a:p>
             <a:r>
               <a:rPr lang="de-CH" dirty="0" smtClean="0"/>
-              <a:t>Multi-</a:t>
-            </a:r>
-            <a:r>
-              <a:rPr lang="de-CH" dirty="0" err="1" smtClean="0"/>
-              <a:t>Process</a:t>
+              <a:t>KISS, flexible </a:t>
+            </a:r>
+          </a:p>
+          <a:p>
+            <a:r>
+              <a:rPr lang="de-CH" dirty="0" err="1"/>
+              <a:t>E</a:t>
+            </a:r>
+            <a:r>
+              <a:rPr lang="de-CH" dirty="0" err="1" smtClean="0"/>
+              <a:t>xtensions</a:t>
             </a:r>
             <a:r>
               <a:rPr lang="de-CH" dirty="0" smtClean="0"/>
@@ -5146,7 +5026,7 @@
             </a:r>
             <a:r>
               <a:rPr lang="de-CH" dirty="0" err="1" smtClean="0"/>
-              <a:t>transactions</a:t>
+              <a:t>to</a:t>
             </a:r>
             <a:r>
               <a:rPr lang="de-CH" dirty="0" smtClean="0"/>
@@ -5154,24 +5034,56 @@
             </a:r>
             <a:r>
               <a:rPr lang="de-CH" dirty="0" err="1" smtClean="0"/>
-              <a:t>missing</a:t>
+              <a:t>the</a:t>
+            </a:r>
+            <a:r>
+              <a:rPr lang="de-CH" dirty="0" smtClean="0"/>
+              <a:t> </a:t>
+            </a:r>
+            <a:r>
+              <a:rPr lang="de-CH" dirty="0" err="1" smtClean="0"/>
+              <a:t>framework</a:t>
+            </a:r>
+            <a:r>
+              <a:rPr lang="de-CH" dirty="0" smtClean="0"/>
+              <a:t> </a:t>
+            </a:r>
+            <a:r>
+              <a:rPr lang="de-CH" dirty="0" err="1" smtClean="0"/>
+              <a:t>are</a:t>
+            </a:r>
+            <a:r>
+              <a:rPr lang="de-CH" dirty="0" smtClean="0"/>
+              <a:t> easy</a:t>
+            </a:r>
+          </a:p>
+          <a:p>
+            <a:r>
+              <a:rPr lang="de-CH" dirty="0" smtClean="0"/>
+              <a:t>Can </a:t>
+            </a:r>
+            <a:r>
+              <a:rPr lang="de-CH" dirty="0" err="1" smtClean="0"/>
+              <a:t>reach</a:t>
+            </a:r>
+            <a:r>
+              <a:rPr lang="de-CH" dirty="0" smtClean="0"/>
+              <a:t> all </a:t>
+            </a:r>
+            <a:r>
+              <a:rPr lang="de-CH" dirty="0" err="1" smtClean="0"/>
+              <a:t>clients</a:t>
             </a:r>
             <a:endParaRPr lang="de-CH" dirty="0" smtClean="0"/>
           </a:p>
           <a:p>
             <a:r>
-              <a:rPr lang="de-CH" dirty="0" err="1" smtClean="0"/>
-              <a:t>No</a:t>
-            </a:r>
-            <a:r>
-              <a:rPr lang="de-CH" dirty="0" smtClean="0"/>
-              <a:t> UDP</a:t>
-            </a:r>
-          </a:p>
-          <a:p>
-            <a:r>
-              <a:rPr lang="de-CH" dirty="0" err="1" smtClean="0"/>
-              <a:t>No</a:t>
+              <a:rPr lang="de-CH" dirty="0" smtClean="0"/>
+              <a:t>Fast, </a:t>
+            </a:r>
+            <a:r>
+              <a:rPr lang="de-CH" dirty="0" err="1" smtClean="0"/>
+              <a:t>no</a:t>
             </a:r>
             <a:r>
               <a:rPr lang="de-CH" dirty="0" smtClean="0"/>
@@ -5179,13 +5091,230 @@
             </a:r>
             <a:r>
               <a:rPr lang="de-CH" dirty="0" err="1" smtClean="0"/>
-              <a:t>full</a:t>
-            </a:r>
-            <a:r>
-              <a:rPr lang="de-CH" dirty="0" smtClean="0"/>
-              <a:t>-duplex</a:t>
-            </a:r>
-            <a:endParaRPr lang="de-CH" dirty="0"/>
+              <a:t>legacy</a:t>
+            </a:r>
+            <a:r>
+              <a:rPr lang="de-CH" dirty="0" smtClean="0"/>
+              <a:t> </a:t>
+            </a:r>
+            <a:r>
+              <a:rPr lang="de-CH" dirty="0" err="1" smtClean="0"/>
+              <a:t>components</a:t>
+            </a:r>
+            <a:endParaRPr lang="de-CH" dirty="0" smtClean="0"/>
+          </a:p>
+          <a:p>
+            <a:r>
+              <a:rPr lang="de-CH" dirty="0" smtClean="0"/>
+              <a:t>Can </a:t>
+            </a:r>
+            <a:r>
+              <a:rPr lang="de-CH" dirty="0" err="1" smtClean="0"/>
+              <a:t>be</a:t>
+            </a:r>
+            <a:r>
+              <a:rPr lang="de-CH" dirty="0" smtClean="0"/>
+              <a:t> </a:t>
+            </a:r>
+            <a:r>
+              <a:rPr lang="de-CH" dirty="0" err="1" smtClean="0"/>
+              <a:t>hosted</a:t>
+            </a:r>
+            <a:r>
+              <a:rPr lang="de-CH" dirty="0" smtClean="0"/>
+              <a:t> </a:t>
+            </a:r>
+            <a:r>
+              <a:rPr lang="de-CH" dirty="0" err="1" smtClean="0"/>
+              <a:t>anywhere</a:t>
+            </a:r>
+            <a:r>
+              <a:rPr lang="de-CH" dirty="0" smtClean="0"/>
+              <a:t> in .NET</a:t>
+            </a:r>
+          </a:p>
+          <a:p>
+            <a:r>
+              <a:rPr lang="de-CH" dirty="0" err="1" smtClean="0"/>
+              <a:t>OData</a:t>
+            </a:r>
+            <a:r>
+              <a:rPr lang="de-CH" dirty="0" smtClean="0"/>
+              <a:t> V4</a:t>
+            </a:r>
+          </a:p>
+          <a:p>
+            <a:r>
+              <a:rPr lang="de-CH" dirty="0" smtClean="0"/>
+              <a:t>Support </a:t>
+            </a:r>
+            <a:r>
+              <a:rPr lang="de-CH" dirty="0" err="1" smtClean="0"/>
+              <a:t>for</a:t>
+            </a:r>
+            <a:r>
+              <a:rPr lang="de-CH" dirty="0" smtClean="0"/>
+              <a:t> </a:t>
+            </a:r>
+            <a:r>
+              <a:rPr lang="de-CH" dirty="0" err="1" smtClean="0"/>
+              <a:t>any</a:t>
+            </a:r>
+            <a:r>
+              <a:rPr lang="de-CH" dirty="0" smtClean="0"/>
+              <a:t> </a:t>
+            </a:r>
+            <a:r>
+              <a:rPr lang="de-CH" dirty="0" err="1" smtClean="0"/>
+              <a:t>serializations</a:t>
+            </a:r>
+            <a:endParaRPr lang="de-CH" dirty="0" smtClean="0"/>
+          </a:p>
+          <a:p>
+            <a:r>
+              <a:rPr lang="de-CH" dirty="0" smtClean="0"/>
+              <a:t>Open </a:t>
+            </a:r>
+            <a:r>
+              <a:rPr lang="de-CH" dirty="0" err="1" smtClean="0"/>
+              <a:t>source</a:t>
+            </a:r>
+            <a:r>
+              <a:rPr lang="de-CH" dirty="0" smtClean="0"/>
+              <a:t>, </a:t>
+            </a:r>
+            <a:r>
+              <a:rPr lang="de-CH" dirty="0" err="1" smtClean="0"/>
+              <a:t>very</a:t>
+            </a:r>
+            <a:r>
+              <a:rPr lang="de-CH" dirty="0" smtClean="0"/>
+              <a:t> large </a:t>
+            </a:r>
+            <a:r>
+              <a:rPr lang="de-CH" dirty="0" err="1" smtClean="0"/>
+              <a:t>community</a:t>
+            </a:r>
+            <a:endParaRPr lang="de-CH" dirty="0" smtClean="0"/>
+          </a:p>
+          <a:p>
+            <a:r>
+              <a:rPr lang="de-CH" dirty="0" smtClean="0"/>
+              <a:t>Regular </a:t>
+            </a:r>
+            <a:r>
+              <a:rPr lang="de-CH" dirty="0" err="1" smtClean="0"/>
+              <a:t>updates</a:t>
+            </a:r>
+            <a:r>
+              <a:rPr lang="de-CH" dirty="0" smtClean="0"/>
+              <a:t>, </a:t>
+            </a:r>
+            <a:r>
+              <a:rPr lang="de-CH" dirty="0" err="1" smtClean="0"/>
+              <a:t>free</a:t>
+            </a:r>
+            <a:r>
+              <a:rPr lang="de-CH" dirty="0" smtClean="0"/>
+              <a:t> </a:t>
+            </a:r>
+            <a:r>
+              <a:rPr lang="de-CH" dirty="0" err="1" smtClean="0"/>
+              <a:t>from</a:t>
+            </a:r>
+            <a:r>
+              <a:rPr lang="de-CH" dirty="0" smtClean="0"/>
+              <a:t> .NET </a:t>
+            </a:r>
+            <a:r>
+              <a:rPr lang="de-CH" dirty="0" err="1" smtClean="0"/>
+              <a:t>release</a:t>
+            </a:r>
+            <a:r>
+              <a:rPr lang="de-CH" dirty="0" smtClean="0"/>
+              <a:t> </a:t>
+            </a:r>
+            <a:r>
+              <a:rPr lang="de-CH" dirty="0" err="1" smtClean="0"/>
+              <a:t>cycle</a:t>
+            </a:r>
+            <a:endParaRPr lang="de-CH" dirty="0" smtClean="0"/>
+          </a:p>
+          <a:p>
+            <a:r>
+              <a:rPr lang="de-CH" dirty="0" err="1" smtClean="0"/>
+              <a:t>vNext</a:t>
+            </a:r>
+            <a:r>
+              <a:rPr lang="de-CH" dirty="0" smtClean="0"/>
+              <a:t> MVC </a:t>
+            </a:r>
+            <a:r>
+              <a:rPr lang="de-CH" dirty="0" err="1" smtClean="0"/>
+              <a:t>and</a:t>
+            </a:r>
+            <a:r>
+              <a:rPr lang="de-CH" dirty="0" smtClean="0"/>
+              <a:t> Web API </a:t>
+            </a:r>
+            <a:r>
+              <a:rPr lang="de-CH" dirty="0" err="1" smtClean="0"/>
+              <a:t>come</a:t>
+            </a:r>
+            <a:r>
+              <a:rPr lang="de-CH" dirty="0" smtClean="0"/>
+              <a:t> </a:t>
+            </a:r>
+            <a:r>
+              <a:rPr lang="de-CH" dirty="0" err="1" smtClean="0"/>
+              <a:t>together</a:t>
+            </a:r>
+            <a:endParaRPr lang="de-CH" dirty="0" smtClean="0"/>
+          </a:p>
+          <a:p>
+            <a:r>
+              <a:rPr lang="de-CH" dirty="0" err="1" smtClean="0"/>
+              <a:t>WebAPiContrib</a:t>
+            </a:r>
+            <a:endParaRPr lang="de-CH" dirty="0" smtClean="0"/>
+          </a:p>
+          <a:p>
+            <a:r>
+              <a:rPr lang="de-CH" dirty="0" smtClean="0"/>
+              <a:t>Lots </a:t>
+            </a:r>
+            <a:r>
+              <a:rPr lang="de-CH" dirty="0" err="1" smtClean="0"/>
+              <a:t>of</a:t>
+            </a:r>
+            <a:r>
+              <a:rPr lang="de-CH" dirty="0" smtClean="0"/>
+              <a:t> cool </a:t>
+            </a:r>
+            <a:r>
+              <a:rPr lang="de-CH" dirty="0" err="1" smtClean="0"/>
+              <a:t>NuGet</a:t>
+            </a:r>
+            <a:r>
+              <a:rPr lang="de-CH" dirty="0" smtClean="0"/>
+              <a:t> </a:t>
+            </a:r>
+            <a:r>
+              <a:rPr lang="de-CH" dirty="0" err="1" smtClean="0"/>
+              <a:t>packages</a:t>
+            </a:r>
+            <a:r>
+              <a:rPr lang="de-CH" dirty="0" smtClean="0"/>
+              <a:t> </a:t>
+            </a:r>
+            <a:r>
+              <a:rPr lang="de-CH" dirty="0" err="1" smtClean="0"/>
+              <a:t>for</a:t>
+            </a:r>
+            <a:r>
+              <a:rPr lang="de-CH" dirty="0" smtClean="0"/>
+              <a:t> Web API</a:t>
+            </a:r>
           </a:p>
         </p:txBody>
       </p:sp>
@@ -5228,7 +5357,7 @@
     </p:spTree>
     <p:extLst>
       <p:ext uri="{BB962C8B-B14F-4D97-AF65-F5344CB8AC3E}">
-        <p14:creationId xmlns:p14="http://schemas.microsoft.com/office/powerpoint/2010/main" val="4254707714"/>
+        <p14:creationId xmlns:p14="http://schemas.microsoft.com/office/powerpoint/2010/main" val="2508772223"/>
       </p:ext>
     </p:extLst>
   </p:cSld>
@@ -5278,16 +5407,8 @@
           <a:lstStyle/>
           <a:p>
             <a:r>
-              <a:rPr lang="de-CH" dirty="0" smtClean="0"/>
-              <a:t>Live </a:t>
-            </a:r>
-            <a:r>
-              <a:rPr lang="de-CH" dirty="0" err="1" smtClean="0"/>
-              <a:t>Self-Hosted</a:t>
-            </a:r>
-            <a:r>
-              <a:rPr lang="de-CH" dirty="0" smtClean="0"/>
-              <a:t> Web API ODATA Demo</a:t>
+              <a:rPr lang="de-CH" dirty="0" err="1"/>
+              <a:t>Disadvantages</a:t>
             </a:r>
             <a:endParaRPr lang="de-CH" dirty="0"/>
           </a:p>
@@ -5305,9 +5426,64 @@
         </p:nvSpPr>
         <p:spPr/>
         <p:txBody>
-          <a:bodyPr/>
+          <a:bodyPr>
+            <a:normAutofit/>
+          </a:bodyPr>
           <a:lstStyle/>
           <a:p>
+            <a:r>
+              <a:rPr lang="de-CH" dirty="0" smtClean="0"/>
+              <a:t>Multi-</a:t>
+            </a:r>
+            <a:r>
+              <a:rPr lang="de-CH" dirty="0" err="1" smtClean="0"/>
+              <a:t>Process</a:t>
+            </a:r>
+            <a:r>
+              <a:rPr lang="de-CH" dirty="0" smtClean="0"/>
+              <a:t> </a:t>
+            </a:r>
+            <a:r>
+              <a:rPr lang="de-CH" dirty="0" err="1" smtClean="0"/>
+              <a:t>transactions</a:t>
+            </a:r>
+            <a:r>
+              <a:rPr lang="de-CH" dirty="0" smtClean="0"/>
+              <a:t> </a:t>
+            </a:r>
+            <a:r>
+              <a:rPr lang="de-CH" dirty="0" err="1" smtClean="0"/>
+              <a:t>missing</a:t>
+            </a:r>
+            <a:endParaRPr lang="de-CH" dirty="0" smtClean="0"/>
+          </a:p>
+          <a:p>
+            <a:r>
+              <a:rPr lang="de-CH" dirty="0" err="1" smtClean="0"/>
+              <a:t>No</a:t>
+            </a:r>
+            <a:r>
+              <a:rPr lang="de-CH" dirty="0" smtClean="0"/>
+              <a:t> UDP</a:t>
+            </a:r>
+          </a:p>
+          <a:p>
+            <a:r>
+              <a:rPr lang="de-CH" dirty="0" err="1" smtClean="0"/>
+              <a:t>No</a:t>
+            </a:r>
+            <a:r>
+              <a:rPr lang="de-CH" dirty="0" smtClean="0"/>
+              <a:t> </a:t>
+            </a:r>
+            <a:r>
+              <a:rPr lang="de-CH" dirty="0" err="1" smtClean="0"/>
+              <a:t>full</a:t>
+            </a:r>
+            <a:r>
+              <a:rPr lang="de-CH" dirty="0" smtClean="0"/>
+              <a:t>-duplex</a:t>
+            </a:r>
             <a:endParaRPr lang="de-CH" dirty="0"/>
           </a:p>
         </p:txBody>
@@ -5351,13 +5527,20 @@
     </p:spTree>
     <p:extLst>
       <p:ext uri="{BB962C8B-B14F-4D97-AF65-F5344CB8AC3E}">
-        <p14:creationId xmlns:p14="http://schemas.microsoft.com/office/powerpoint/2010/main" val="1225134508"/>
+        <p14:creationId xmlns:p14="http://schemas.microsoft.com/office/powerpoint/2010/main" val="4254707714"/>
       </p:ext>
     </p:extLst>
   </p:cSld>
   <p:clrMapOvr>
     <a:masterClrMapping/>
   </p:clrMapOvr>
+  <p:timing>
+    <p:tnLst>
+      <p:par>
+        <p:cTn id="1" dur="indefinite" restart="never" nodeType="tmRoot"/>
+      </p:par>
+    </p:tnLst>
+  </p:timing>
 </p:sld>
 </file>
 
@@ -5394,6 +5577,122 @@
           <a:lstStyle/>
           <a:p>
             <a:r>
+              <a:rPr lang="de-CH" dirty="0" smtClean="0"/>
+              <a:t>Live </a:t>
+            </a:r>
+            <a:r>
+              <a:rPr lang="de-CH" dirty="0" err="1" smtClean="0"/>
+              <a:t>Self-Hosted</a:t>
+            </a:r>
+            <a:r>
+              <a:rPr lang="de-CH" dirty="0" smtClean="0"/>
+              <a:t> Web API ODATA Demo</a:t>
+            </a:r>
+            <a:endParaRPr lang="de-CH" dirty="0"/>
+          </a:p>
+        </p:txBody>
+      </p:sp>
+      <p:sp>
+        <p:nvSpPr>
+          <p:cNvPr id="3" name="Textplatzhalter 2"/>
+          <p:cNvSpPr>
+            <a:spLocks noGrp="1"/>
+          </p:cNvSpPr>
+          <p:nvPr>
+            <p:ph type="body" sz="quarter" idx="16"/>
+          </p:nvPr>
+        </p:nvSpPr>
+        <p:spPr/>
+        <p:txBody>
+          <a:bodyPr/>
+          <a:lstStyle/>
+          <a:p>
+            <a:endParaRPr lang="de-CH" dirty="0"/>
+          </a:p>
+        </p:txBody>
+      </p:sp>
+      <p:sp>
+        <p:nvSpPr>
+          <p:cNvPr id="4" name="Fußzeilenplatzhalter 3"/>
+          <p:cNvSpPr>
+            <a:spLocks noGrp="1"/>
+          </p:cNvSpPr>
+          <p:nvPr>
+            <p:ph type="ftr" sz="quarter" idx="3"/>
+          </p:nvPr>
+        </p:nvSpPr>
+        <p:spPr/>
+        <p:txBody>
+          <a:bodyPr/>
+          <a:lstStyle/>
+          <a:p>
+            <a:r>
+              <a:rPr lang="de-CH" dirty="0" smtClean="0">
+                <a:solidFill>
+                  <a:srgbClr val="8B8D8E"/>
+                </a:solidFill>
+              </a:rPr>
+              <a:t>#</a:t>
+            </a:r>
+            <a:fld id="{FAF533A0-CC08-4AD3-B9FD-66E41B46AD42}" type="slidenum">
+              <a:rPr lang="de-CH" smtClean="0">
+                <a:solidFill>
+                  <a:srgbClr val="8B8D8E"/>
+                </a:solidFill>
+              </a:rPr>
+              <a:pPr/>
+              <a:t>13</a:t>
+            </a:fld>
+            <a:endParaRPr lang="de-CH" dirty="0"/>
+          </a:p>
+        </p:txBody>
+      </p:sp>
+    </p:spTree>
+    <p:extLst>
+      <p:ext uri="{BB962C8B-B14F-4D97-AF65-F5344CB8AC3E}">
+        <p14:creationId xmlns:p14="http://schemas.microsoft.com/office/powerpoint/2010/main" val="1225134508"/>
+      </p:ext>
+    </p:extLst>
+  </p:cSld>
+  <p:clrMapOvr>
+    <a:masterClrMapping/>
+  </p:clrMapOvr>
+</p:sld>
+</file>
+
+<file path=ppt/slides/slide14.xml><?xml version="1.0" encoding="utf-8"?>
+<p:sld xmlns:a="http://schemas.openxmlformats.org/drawingml/2006/main" xmlns:r="http://schemas.openxmlformats.org/officeDocument/2006/relationships" xmlns:p="http://schemas.openxmlformats.org/presentationml/2006/main">
+  <p:cSld>
+    <p:spTree>
+      <p:nvGrpSpPr>
+        <p:cNvPr id="1" name=""/>
+        <p:cNvGrpSpPr/>
+        <p:nvPr/>
+      </p:nvGrpSpPr>
+      <p:grpSpPr>
+        <a:xfrm>
+          <a:off x="0" y="0"/>
+          <a:ext cx="0" cy="0"/>
+          <a:chOff x="0" y="0"/>
+          <a:chExt cx="0" cy="0"/>
+        </a:xfrm>
+      </p:grpSpPr>
+      <p:sp>
+        <p:nvSpPr>
+          <p:cNvPr id="2" name="Titel 1"/>
+          <p:cNvSpPr>
+            <a:spLocks noGrp="1"/>
+          </p:cNvSpPr>
+          <p:nvPr>
+            <p:ph type="title"/>
+          </p:nvPr>
+        </p:nvSpPr>
+        <p:spPr/>
+        <p:txBody>
+          <a:bodyPr/>
+          <a:lstStyle/>
+          <a:p>
+            <a:r>
               <a:rPr lang="de-CH" dirty="0" err="1" smtClean="0"/>
               <a:t>Questions</a:t>
             </a:r>
@@ -5457,7 +5756,7 @@
                 </a:solidFill>
               </a:rPr>
               <a:pPr/>
-              <a:t>13</a:t>
+              <a:t>14</a:t>
             </a:fld>
             <a:endParaRPr lang="de-CH" dirty="0"/>
           </a:p>
@@ -5476,7 +5775,7 @@
 </p:sld>
 </file>
 
-<file path=ppt/slides/slide14.xml><?xml version="1.0" encoding="utf-8"?>
+<file path=ppt/slides/slide15.xml><?xml version="1.0" encoding="utf-8"?>
 <p:sld xmlns:a="http://schemas.openxmlformats.org/drawingml/2006/main" xmlns:r="http://schemas.openxmlformats.org/officeDocument/2006/relationships" xmlns:p="http://schemas.openxmlformats.org/presentationml/2006/main">
   <p:cSld>
     <p:spTree>
@@ -6598,7 +6897,7 @@
         </p:blipFill>
         <p:spPr>
           <a:xfrm>
-            <a:off x="4875610" y="576000"/>
+            <a:off x="5364088" y="576000"/>
             <a:ext cx="1990725" cy="342900"/>
           </a:xfrm>
           <a:prstGeom prst="rect">
@@ -6659,33 +6958,37 @@
           <a:lstStyle/>
           <a:p>
             <a:r>
-              <a:rPr lang="de-CH" dirty="0"/>
-              <a:t>Media </a:t>
-            </a:r>
-            <a:r>
-              <a:rPr lang="de-CH" dirty="0" err="1"/>
-              <a:t>Formatters</a:t>
-            </a:r>
-            <a:r>
-              <a:rPr lang="de-CH" dirty="0"/>
-              <a:t> / e.g. File </a:t>
-            </a:r>
-            <a:r>
-              <a:rPr lang="de-CH" dirty="0" err="1"/>
-              <a:t>Up</a:t>
-            </a:r>
-            <a:r>
-              <a:rPr lang="de-CH" dirty="0"/>
-              <a:t>-/</a:t>
-            </a:r>
-            <a:r>
-              <a:rPr lang="de-CH" dirty="0" smtClean="0"/>
-              <a:t>Download</a:t>
+              <a:rPr lang="de-CH" dirty="0" smtClean="0"/>
+              <a:t>Attribute Routing</a:t>
             </a:r>
             <a:endParaRPr lang="de-CH" dirty="0"/>
           </a:p>
         </p:txBody>
       </p:sp>
+      <p:pic>
+        <p:nvPicPr>
+          <p:cNvPr id="5" name="Grafik 4"/>
+          <p:cNvPicPr>
+            <a:picLocks noChangeAspect="1"/>
+          </p:cNvPicPr>
+          <p:nvPr/>
+        </p:nvPicPr>
+        <p:blipFill>
+          <a:blip r:embed="rId2"/>
+          <a:stretch>
+            <a:fillRect/>
+          </a:stretch>
+        </p:blipFill>
+        <p:spPr>
+          <a:xfrm>
+            <a:off x="1403648" y="1976625"/>
+            <a:ext cx="4038600" cy="2762250"/>
+          </a:xfrm>
+          <a:prstGeom prst="rect">
+            <a:avLst/>
+          </a:prstGeom>
+        </p:spPr>
+      </p:pic>
       <p:sp>
         <p:nvSpPr>
           <p:cNvPr id="3" name="Textplatzhalter 2"/>
@@ -6702,47 +7005,10 @@
           <a:lstStyle/>
           <a:p>
             <a:r>
-              <a:rPr lang="de-CH" dirty="0" err="1" smtClean="0"/>
-              <a:t>Xml</a:t>
+              <a:rPr lang="de-CH" dirty="0" smtClean="0"/>
+              <a:t>Alternative</a:t>
             </a:r>
             <a:endParaRPr lang="de-CH" dirty="0"/>
-          </a:p>
-          <a:p>
-            <a:r>
-              <a:rPr lang="de-CH" dirty="0" err="1" smtClean="0"/>
-              <a:t>Json</a:t>
-            </a:r>
-            <a:endParaRPr lang="de-CH" dirty="0" smtClean="0"/>
-          </a:p>
-          <a:p>
-            <a:r>
-              <a:rPr lang="de-CH" dirty="0" err="1" smtClean="0"/>
-              <a:t>Xlsx</a:t>
-            </a:r>
-            <a:endParaRPr lang="de-CH" dirty="0" smtClean="0"/>
-          </a:p>
-          <a:p>
-            <a:r>
-              <a:rPr lang="de-CH" dirty="0" err="1" smtClean="0"/>
-              <a:t>Csv</a:t>
-            </a:r>
-            <a:endParaRPr lang="de-CH" dirty="0" smtClean="0"/>
-          </a:p>
-          <a:p>
-            <a:r>
-              <a:rPr lang="de-CH" dirty="0" err="1" smtClean="0"/>
-              <a:t>Protobuf</a:t>
-            </a:r>
-            <a:r>
-              <a:rPr lang="de-CH" dirty="0" smtClean="0"/>
-              <a:t>-Net</a:t>
-            </a:r>
-          </a:p>
-          <a:p>
-            <a:r>
-              <a:rPr lang="de-CH" dirty="0" smtClean="0"/>
-              <a:t>Custom</a:t>
-            </a:r>
           </a:p>
         </p:txBody>
       </p:sp>
@@ -6762,12 +7028,12 @@
           <a:lstStyle/>
           <a:p>
             <a:r>
-              <a:rPr lang="de-CH" dirty="0" smtClean="0">
+              <a:rPr lang="de-CH" smtClean="0">
                 <a:solidFill>
                   <a:srgbClr val="8B8D8E"/>
                 </a:solidFill>
               </a:rPr>
-              <a:t>#</a:t>
+              <a:t>Vorname Name, tt.mm.jjjj,  #</a:t>
             </a:r>
             <a:fld id="{FAF533A0-CC08-4AD3-B9FD-66E41B46AD42}" type="slidenum">
               <a:rPr lang="de-CH" smtClean="0">
@@ -6782,23 +7048,40 @@
           </a:p>
         </p:txBody>
       </p:sp>
+      <p:pic>
+        <p:nvPicPr>
+          <p:cNvPr id="6" name="Grafik 5"/>
+          <p:cNvPicPr>
+            <a:picLocks noChangeAspect="1"/>
+          </p:cNvPicPr>
+          <p:nvPr/>
+        </p:nvPicPr>
+        <p:blipFill>
+          <a:blip r:embed="rId3"/>
+          <a:stretch>
+            <a:fillRect/>
+          </a:stretch>
+        </p:blipFill>
+        <p:spPr>
+          <a:xfrm>
+            <a:off x="5472111" y="576824"/>
+            <a:ext cx="1800225" cy="295275"/>
+          </a:xfrm>
+          <a:prstGeom prst="rect">
+            <a:avLst/>
+          </a:prstGeom>
+        </p:spPr>
+      </p:pic>
     </p:spTree>
     <p:extLst>
       <p:ext uri="{BB962C8B-B14F-4D97-AF65-F5344CB8AC3E}">
-        <p14:creationId xmlns:p14="http://schemas.microsoft.com/office/powerpoint/2010/main" val="3313734200"/>
+        <p14:creationId xmlns:p14="http://schemas.microsoft.com/office/powerpoint/2010/main" val="1350069252"/>
       </p:ext>
     </p:extLst>
   </p:cSld>
   <p:clrMapOvr>
     <a:masterClrMapping/>
   </p:clrMapOvr>
-  <p:timing>
-    <p:tnLst>
-      <p:par>
-        <p:cTn id="1" dur="indefinite" restart="never" nodeType="tmRoot"/>
-      </p:par>
-    </p:tnLst>
-  </p:timing>
 </p:sld>
 </file>
 
@@ -6835,8 +7118,28 @@
           <a:lstStyle/>
           <a:p>
             <a:r>
-              <a:rPr lang="de-CH" dirty="0" err="1" smtClean="0"/>
-              <a:t>OData</a:t>
+              <a:rPr lang="de-CH" dirty="0"/>
+              <a:t>Media </a:t>
+            </a:r>
+            <a:r>
+              <a:rPr lang="de-CH" dirty="0" err="1"/>
+              <a:t>Formatters</a:t>
+            </a:r>
+            <a:r>
+              <a:rPr lang="de-CH" dirty="0"/>
+              <a:t> / e.g. File </a:t>
+            </a:r>
+            <a:r>
+              <a:rPr lang="de-CH" dirty="0" err="1"/>
+              <a:t>Up</a:t>
+            </a:r>
+            <a:r>
+              <a:rPr lang="de-CH" dirty="0"/>
+              <a:t>-/</a:t>
+            </a:r>
+            <a:r>
+              <a:rPr lang="de-CH" dirty="0" smtClean="0"/>
+              <a:t>Download</a:t>
             </a:r>
             <a:endParaRPr lang="de-CH" dirty="0"/>
           </a:p>
@@ -6859,239 +7162,46 @@
           <a:p>
             <a:r>
               <a:rPr lang="de-CH" dirty="0" err="1" smtClean="0"/>
-              <a:t>Allows</a:t>
-            </a:r>
-            <a:r>
-              <a:rPr lang="de-CH" dirty="0" smtClean="0"/>
-              <a:t> </a:t>
-            </a:r>
-            <a:r>
-              <a:rPr lang="de-CH" dirty="0" err="1" smtClean="0"/>
-              <a:t>for</a:t>
-            </a:r>
-            <a:r>
-              <a:rPr lang="de-CH" dirty="0" smtClean="0"/>
-              <a:t> </a:t>
-            </a:r>
-            <a:r>
-              <a:rPr lang="de-CH" dirty="0" err="1" smtClean="0"/>
-              <a:t>very</a:t>
-            </a:r>
-            <a:r>
-              <a:rPr lang="de-CH" dirty="0" smtClean="0"/>
-              <a:t> flexible </a:t>
-            </a:r>
-            <a:r>
-              <a:rPr lang="de-CH" dirty="0" err="1" smtClean="0"/>
-              <a:t>client</a:t>
-            </a:r>
-            <a:r>
-              <a:rPr lang="de-CH" dirty="0" smtClean="0"/>
-              <a:t> </a:t>
-            </a:r>
-            <a:r>
-              <a:rPr lang="de-CH" dirty="0" err="1" smtClean="0"/>
-              <a:t>queries</a:t>
+              <a:t>Xml</a:t>
+            </a:r>
+            <a:endParaRPr lang="de-CH" dirty="0"/>
+          </a:p>
+          <a:p>
+            <a:r>
+              <a:rPr lang="de-CH" dirty="0" err="1" smtClean="0"/>
+              <a:t>Json</a:t>
             </a:r>
             <a:endParaRPr lang="de-CH" dirty="0" smtClean="0"/>
           </a:p>
           <a:p>
             <a:r>
               <a:rPr lang="de-CH" dirty="0" err="1" smtClean="0"/>
-              <a:t>Exposes</a:t>
-            </a:r>
-            <a:r>
-              <a:rPr lang="de-CH" dirty="0" smtClean="0"/>
-              <a:t> </a:t>
-            </a:r>
-            <a:r>
-              <a:rPr lang="de-CH" dirty="0" err="1" smtClean="0"/>
-              <a:t>the</a:t>
-            </a:r>
-            <a:r>
-              <a:rPr lang="de-CH" dirty="0" smtClean="0"/>
-              <a:t> </a:t>
-            </a:r>
-            <a:r>
-              <a:rPr lang="de-CH" dirty="0" err="1" smtClean="0"/>
-              <a:t>IQueryable</a:t>
-            </a:r>
-            <a:r>
-              <a:rPr lang="de-CH" dirty="0" smtClean="0"/>
-              <a:t> </a:t>
-            </a:r>
-            <a:r>
-              <a:rPr lang="de-CH" dirty="0" err="1" smtClean="0"/>
-              <a:t>interface</a:t>
+              <a:t>Xlsx</a:t>
             </a:r>
             <a:endParaRPr lang="de-CH" dirty="0" smtClean="0"/>
           </a:p>
           <a:p>
             <a:r>
-              <a:rPr lang="de-CH" dirty="0" smtClean="0"/>
-              <a:t>$</a:t>
-            </a:r>
-            <a:r>
-              <a:rPr lang="de-CH" dirty="0" err="1" smtClean="0"/>
-              <a:t>stop</a:t>
-            </a:r>
-            <a:r>
-              <a:rPr lang="de-CH" dirty="0" smtClean="0"/>
-              <a:t>, $</a:t>
-            </a:r>
-            <a:r>
-              <a:rPr lang="de-CH" dirty="0" err="1" smtClean="0"/>
-              <a:t>skip</a:t>
-            </a:r>
-            <a:r>
-              <a:rPr lang="de-CH" dirty="0" smtClean="0"/>
-              <a:t>, $</a:t>
-            </a:r>
-            <a:r>
-              <a:rPr lang="de-CH" dirty="0" err="1" smtClean="0"/>
-              <a:t>expand</a:t>
-            </a:r>
-            <a:r>
-              <a:rPr lang="de-CH" dirty="0" smtClean="0"/>
-              <a:t>, $</a:t>
-            </a:r>
-            <a:r>
-              <a:rPr lang="de-CH" dirty="0" err="1" smtClean="0"/>
-              <a:t>select</a:t>
-            </a:r>
-            <a:r>
-              <a:rPr lang="de-CH" dirty="0" smtClean="0"/>
-              <a:t>, $</a:t>
-            </a:r>
-            <a:r>
-              <a:rPr lang="de-CH" dirty="0" err="1" smtClean="0"/>
-              <a:t>orderby</a:t>
-            </a:r>
-            <a:r>
-              <a:rPr lang="de-CH" dirty="0" smtClean="0"/>
-              <a:t>, $</a:t>
-            </a:r>
-            <a:r>
-              <a:rPr lang="de-CH" dirty="0" err="1" smtClean="0"/>
-              <a:t>filter</a:t>
-            </a:r>
-            <a:r>
-              <a:rPr lang="de-CH" dirty="0" smtClean="0"/>
-              <a:t> (</a:t>
-            </a:r>
-            <a:r>
-              <a:rPr lang="de-CH" dirty="0" err="1" smtClean="0"/>
-              <a:t>OData</a:t>
-            </a:r>
-            <a:r>
-              <a:rPr lang="de-CH" dirty="0" smtClean="0"/>
-              <a:t> V3)</a:t>
-            </a:r>
-          </a:p>
-          <a:p>
-            <a:r>
-              <a:rPr lang="de-CH" dirty="0" err="1" smtClean="0"/>
-              <a:t>OData</a:t>
-            </a:r>
-            <a:r>
-              <a:rPr lang="de-CH" dirty="0" smtClean="0"/>
-              <a:t> V4 </a:t>
-            </a:r>
-            <a:r>
-              <a:rPr lang="de-CH" dirty="0" err="1" smtClean="0"/>
-              <a:t>standard</a:t>
-            </a:r>
-            <a:r>
-              <a:rPr lang="de-CH" dirty="0" smtClean="0"/>
-              <a:t> also </a:t>
-            </a:r>
-            <a:r>
-              <a:rPr lang="de-CH" dirty="0" err="1" smtClean="0"/>
-              <a:t>supported</a:t>
-            </a:r>
-            <a:r>
-              <a:rPr lang="de-CH" dirty="0" smtClean="0"/>
-              <a:t> (</a:t>
-            </a:r>
-            <a:r>
-              <a:rPr lang="de-CH" dirty="0" err="1" smtClean="0"/>
-              <a:t>much</a:t>
-            </a:r>
-            <a:r>
-              <a:rPr lang="de-CH" dirty="0" smtClean="0"/>
-              <a:t> </a:t>
-            </a:r>
-            <a:r>
-              <a:rPr lang="de-CH" dirty="0" err="1" smtClean="0"/>
-              <a:t>more</a:t>
-            </a:r>
-            <a:r>
-              <a:rPr lang="de-CH" dirty="0" smtClean="0"/>
-              <a:t> </a:t>
-            </a:r>
-            <a:r>
-              <a:rPr lang="de-CH" dirty="0" err="1" smtClean="0"/>
-              <a:t>functionality</a:t>
-            </a:r>
-            <a:r>
-              <a:rPr lang="de-CH" dirty="0" smtClean="0"/>
-              <a:t>)</a:t>
-            </a:r>
-          </a:p>
-          <a:p>
-            <a:r>
-              <a:rPr lang="de-CH" dirty="0" smtClean="0"/>
-              <a:t>Can </a:t>
-            </a:r>
-            <a:r>
-              <a:rPr lang="de-CH" dirty="0" err="1" smtClean="0"/>
-              <a:t>inherit</a:t>
-            </a:r>
-            <a:r>
-              <a:rPr lang="de-CH" dirty="0" smtClean="0"/>
-              <a:t> </a:t>
-            </a:r>
-            <a:r>
-              <a:rPr lang="de-CH" dirty="0" err="1" smtClean="0"/>
-              <a:t>from</a:t>
-            </a:r>
-            <a:r>
-              <a:rPr lang="de-CH" dirty="0" smtClean="0"/>
-              <a:t> </a:t>
-            </a:r>
-            <a:r>
-              <a:rPr lang="de-CH" dirty="0" err="1" smtClean="0"/>
-              <a:t>the</a:t>
-            </a:r>
-            <a:r>
-              <a:rPr lang="de-CH" dirty="0" smtClean="0"/>
-              <a:t> </a:t>
-            </a:r>
-            <a:r>
-              <a:rPr lang="de-CH" dirty="0" err="1" smtClean="0"/>
-              <a:t>ODataControll</a:t>
-            </a:r>
-            <a:r>
-              <a:rPr lang="de-CH" dirty="0" err="1" smtClean="0"/>
-              <a:t>er</a:t>
-            </a:r>
-            <a:r>
-              <a:rPr lang="de-CH" dirty="0" smtClean="0"/>
-              <a:t> </a:t>
-            </a:r>
-            <a:r>
-              <a:rPr lang="de-CH" dirty="0" err="1" smtClean="0"/>
-              <a:t>or</a:t>
-            </a:r>
-            <a:r>
-              <a:rPr lang="de-CH" dirty="0" smtClean="0"/>
-              <a:t> </a:t>
-            </a:r>
-            <a:r>
-              <a:rPr lang="de-CH" dirty="0" err="1" smtClean="0"/>
-              <a:t>ApiController</a:t>
+              <a:rPr lang="de-CH" dirty="0" err="1" smtClean="0"/>
+              <a:t>Csv</a:t>
             </a:r>
             <a:endParaRPr lang="de-CH" dirty="0" smtClean="0"/>
+          </a:p>
+          <a:p>
+            <a:r>
+              <a:rPr lang="de-CH" dirty="0" err="1" smtClean="0"/>
+              <a:t>Protobuf</a:t>
+            </a:r>
+            <a:r>
+              <a:rPr lang="de-CH" dirty="0" smtClean="0"/>
+              <a:t>-Net</a:t>
+            </a:r>
+          </a:p>
+          <a:p>
+            <a:r>
+              <a:rPr lang="de-CH" dirty="0" smtClean="0"/>
+              <a:t>Custom</a:t>
+            </a:r>
           </a:p>
         </p:txBody>
       </p:sp>
@@ -7131,34 +7241,10 @@
           </a:p>
         </p:txBody>
       </p:sp>
-      <p:pic>
-        <p:nvPicPr>
-          <p:cNvPr id="6" name="Grafik 5"/>
-          <p:cNvPicPr>
-            <a:picLocks noChangeAspect="1"/>
-          </p:cNvPicPr>
-          <p:nvPr/>
-        </p:nvPicPr>
-        <p:blipFill>
-          <a:blip r:embed="rId2"/>
-          <a:stretch>
-            <a:fillRect/>
-          </a:stretch>
-        </p:blipFill>
-        <p:spPr>
-          <a:xfrm>
-            <a:off x="1080000" y="4149080"/>
-            <a:ext cx="6885913" cy="512440"/>
-          </a:xfrm>
-          <a:prstGeom prst="rect">
-            <a:avLst/>
-          </a:prstGeom>
-        </p:spPr>
-      </p:pic>
     </p:spTree>
     <p:extLst>
       <p:ext uri="{BB962C8B-B14F-4D97-AF65-F5344CB8AC3E}">
-        <p14:creationId xmlns:p14="http://schemas.microsoft.com/office/powerpoint/2010/main" val="2227694890"/>
+        <p14:creationId xmlns:p14="http://schemas.microsoft.com/office/powerpoint/2010/main" val="3313734200"/>
       </p:ext>
     </p:extLst>
   </p:cSld>
@@ -7208,8 +7294,8 @@
           <a:lstStyle/>
           <a:p>
             <a:r>
-              <a:rPr lang="de-CH" dirty="0" smtClean="0"/>
-              <a:t>Other Features</a:t>
+              <a:rPr lang="de-CH" dirty="0" err="1" smtClean="0"/>
+              <a:t>OData</a:t>
             </a:r>
             <a:endParaRPr lang="de-CH" dirty="0"/>
           </a:p>
@@ -7232,50 +7318,15 @@
           <a:p>
             <a:r>
               <a:rPr lang="de-CH" dirty="0" err="1" smtClean="0"/>
-              <a:t>IoC</a:t>
+              <a:t>Allows</a:t>
             </a:r>
             <a:r>
               <a:rPr lang="de-CH" dirty="0" smtClean="0"/>
               <a:t> </a:t>
             </a:r>
             <a:r>
-              <a:rPr lang="de-CH" dirty="0"/>
-              <a:t>/ </a:t>
-            </a:r>
-            <a:r>
-              <a:rPr lang="de-CH" dirty="0" err="1"/>
-              <a:t>Lifecycle</a:t>
-            </a:r>
-            <a:endParaRPr lang="de-CH" dirty="0"/>
-          </a:p>
-          <a:p>
-            <a:r>
-              <a:rPr lang="de-CH" dirty="0"/>
-              <a:t>Filters</a:t>
-            </a:r>
-          </a:p>
-          <a:p>
-            <a:r>
-              <a:rPr lang="de-CH" dirty="0" smtClean="0"/>
-              <a:t>Message </a:t>
-            </a:r>
-            <a:r>
-              <a:rPr lang="de-CH" dirty="0"/>
-              <a:t>Handlers</a:t>
-            </a:r>
-          </a:p>
-          <a:p>
-            <a:r>
-              <a:rPr lang="de-CH" dirty="0" err="1"/>
-              <a:t>Batching</a:t>
-            </a:r>
-            <a:r>
-              <a:rPr lang="de-CH" dirty="0"/>
-              <a:t> / e.g. Data </a:t>
-            </a:r>
-            <a:r>
-              <a:rPr lang="de-CH" dirty="0" err="1" smtClean="0"/>
-              <a:t>Synchronization</a:t>
+              <a:rPr lang="de-CH" dirty="0" err="1" smtClean="0"/>
+              <a:t>for</a:t>
             </a:r>
             <a:r>
               <a:rPr lang="de-CH" dirty="0" smtClean="0"/>
@@ -7283,19 +7334,205 @@
             </a:r>
             <a:r>
               <a:rPr lang="de-CH" dirty="0" err="1" smtClean="0"/>
-              <a:t>works</a:t>
-            </a:r>
-            <a:r>
-              <a:rPr lang="de-CH" dirty="0" smtClean="0"/>
-              <a:t>, </a:t>
-            </a:r>
-            <a:r>
-              <a:rPr lang="de-CH" dirty="0" err="1" smtClean="0"/>
-              <a:t>for</a:t>
-            </a:r>
-            <a:r>
-              <a:rPr lang="de-CH" dirty="0" smtClean="0"/>
-              <a:t> Web API </a:t>
+              <a:t>very</a:t>
+            </a:r>
+            <a:r>
+              <a:rPr lang="de-CH" dirty="0" smtClean="0"/>
+              <a:t> flexible </a:t>
+            </a:r>
+            <a:r>
+              <a:rPr lang="de-CH" dirty="0" err="1" smtClean="0"/>
+              <a:t>client</a:t>
+            </a:r>
+            <a:r>
+              <a:rPr lang="de-CH" dirty="0" smtClean="0"/>
+              <a:t> </a:t>
+            </a:r>
+            <a:r>
+              <a:rPr lang="de-CH" dirty="0" err="1" smtClean="0"/>
+              <a:t>queries</a:t>
+            </a:r>
+            <a:endParaRPr lang="de-CH" dirty="0" smtClean="0"/>
+          </a:p>
+          <a:p>
+            <a:r>
+              <a:rPr lang="de-CH" dirty="0" err="1" smtClean="0"/>
+              <a:t>Exposes</a:t>
+            </a:r>
+            <a:r>
+              <a:rPr lang="de-CH" dirty="0" smtClean="0"/>
+              <a:t> </a:t>
+            </a:r>
+            <a:r>
+              <a:rPr lang="de-CH" dirty="0" err="1" smtClean="0"/>
+              <a:t>the</a:t>
+            </a:r>
+            <a:r>
+              <a:rPr lang="de-CH" dirty="0" smtClean="0"/>
+              <a:t> </a:t>
+            </a:r>
+            <a:r>
+              <a:rPr lang="de-CH" dirty="0" err="1" smtClean="0"/>
+              <a:t>IQueryable</a:t>
+            </a:r>
+            <a:r>
+              <a:rPr lang="de-CH" dirty="0" smtClean="0"/>
+              <a:t> </a:t>
+            </a:r>
+            <a:r>
+              <a:rPr lang="de-CH" dirty="0" err="1" smtClean="0"/>
+              <a:t>interface</a:t>
+            </a:r>
+            <a:endParaRPr lang="de-CH" dirty="0" smtClean="0"/>
+          </a:p>
+          <a:p>
+            <a:r>
+              <a:rPr lang="de-CH" dirty="0" smtClean="0"/>
+              <a:t>$</a:t>
+            </a:r>
+            <a:r>
+              <a:rPr lang="de-CH" dirty="0" err="1" smtClean="0"/>
+              <a:t>stop</a:t>
+            </a:r>
+            <a:r>
+              <a:rPr lang="de-CH" dirty="0" smtClean="0"/>
+              <a:t>, $</a:t>
+            </a:r>
+            <a:r>
+              <a:rPr lang="de-CH" dirty="0" err="1" smtClean="0"/>
+              <a:t>skip</a:t>
+            </a:r>
+            <a:r>
+              <a:rPr lang="de-CH" dirty="0" smtClean="0"/>
+              <a:t>, $</a:t>
+            </a:r>
+            <a:r>
+              <a:rPr lang="de-CH" dirty="0" err="1" smtClean="0"/>
+              <a:t>expand</a:t>
+            </a:r>
+            <a:r>
+              <a:rPr lang="de-CH" dirty="0" smtClean="0"/>
+              <a:t>, $</a:t>
+            </a:r>
+            <a:r>
+              <a:rPr lang="de-CH" dirty="0" err="1" smtClean="0"/>
+              <a:t>select</a:t>
+            </a:r>
+            <a:r>
+              <a:rPr lang="de-CH" dirty="0" smtClean="0"/>
+              <a:t>, $</a:t>
+            </a:r>
+            <a:r>
+              <a:rPr lang="de-CH" dirty="0" err="1" smtClean="0"/>
+              <a:t>orderby</a:t>
+            </a:r>
+            <a:r>
+              <a:rPr lang="de-CH" dirty="0" smtClean="0"/>
+              <a:t>, $</a:t>
+            </a:r>
+            <a:r>
+              <a:rPr lang="de-CH" dirty="0" err="1" smtClean="0"/>
+              <a:t>filter</a:t>
+            </a:r>
+            <a:r>
+              <a:rPr lang="de-CH" dirty="0" smtClean="0"/>
+              <a:t> (</a:t>
+            </a:r>
+            <a:r>
+              <a:rPr lang="de-CH" dirty="0" err="1" smtClean="0"/>
+              <a:t>OData</a:t>
+            </a:r>
+            <a:r>
+              <a:rPr lang="de-CH" dirty="0" smtClean="0"/>
+              <a:t> V3)</a:t>
+            </a:r>
+          </a:p>
+          <a:p>
+            <a:r>
+              <a:rPr lang="de-CH" dirty="0" err="1" smtClean="0"/>
+              <a:t>OData</a:t>
+            </a:r>
+            <a:r>
+              <a:rPr lang="de-CH" dirty="0" smtClean="0"/>
+              <a:t> V4 </a:t>
+            </a:r>
+            <a:r>
+              <a:rPr lang="de-CH" dirty="0" err="1" smtClean="0"/>
+              <a:t>standard</a:t>
+            </a:r>
+            <a:r>
+              <a:rPr lang="de-CH" dirty="0" smtClean="0"/>
+              <a:t> also </a:t>
+            </a:r>
+            <a:r>
+              <a:rPr lang="de-CH" dirty="0" err="1" smtClean="0"/>
+              <a:t>supported</a:t>
+            </a:r>
+            <a:r>
+              <a:rPr lang="de-CH" dirty="0" smtClean="0"/>
+              <a:t> (</a:t>
+            </a:r>
+            <a:r>
+              <a:rPr lang="de-CH" dirty="0" err="1" smtClean="0"/>
+              <a:t>much</a:t>
+            </a:r>
+            <a:r>
+              <a:rPr lang="de-CH" dirty="0" smtClean="0"/>
+              <a:t> </a:t>
+            </a:r>
+            <a:r>
+              <a:rPr lang="de-CH" dirty="0" err="1" smtClean="0"/>
+              <a:t>more</a:t>
+            </a:r>
+            <a:r>
+              <a:rPr lang="de-CH" dirty="0" smtClean="0"/>
+              <a:t> </a:t>
+            </a:r>
+            <a:r>
+              <a:rPr lang="de-CH" dirty="0" err="1" smtClean="0"/>
+              <a:t>functionality</a:t>
+            </a:r>
+            <a:r>
+              <a:rPr lang="de-CH" dirty="0" smtClean="0"/>
+              <a:t>)</a:t>
+            </a:r>
+          </a:p>
+          <a:p>
+            <a:r>
+              <a:rPr lang="de-CH" dirty="0" smtClean="0"/>
+              <a:t>Can </a:t>
+            </a:r>
+            <a:r>
+              <a:rPr lang="de-CH" dirty="0" err="1" smtClean="0"/>
+              <a:t>inherit</a:t>
+            </a:r>
+            <a:r>
+              <a:rPr lang="de-CH" dirty="0" smtClean="0"/>
+              <a:t> </a:t>
+            </a:r>
+            <a:r>
+              <a:rPr lang="de-CH" dirty="0" err="1" smtClean="0"/>
+              <a:t>from</a:t>
+            </a:r>
+            <a:r>
+              <a:rPr lang="de-CH" dirty="0" smtClean="0"/>
+              <a:t> </a:t>
+            </a:r>
+            <a:r>
+              <a:rPr lang="de-CH" dirty="0" err="1" smtClean="0"/>
+              <a:t>the</a:t>
+            </a:r>
+            <a:r>
+              <a:rPr lang="de-CH" dirty="0" smtClean="0"/>
+              <a:t> </a:t>
+            </a:r>
+            <a:r>
+              <a:rPr lang="de-CH" dirty="0" err="1" smtClean="0"/>
+              <a:t>ODataController</a:t>
+            </a:r>
+            <a:r>
+              <a:rPr lang="de-CH" dirty="0" smtClean="0"/>
+              <a:t> </a:t>
             </a:r>
             <a:r>
               <a:rPr lang="de-CH" dirty="0" err="1" smtClean="0"/>
@@ -7303,120 +7540,13 @@
             </a:r>
             <a:r>
               <a:rPr lang="de-CH" dirty="0" smtClean="0"/>
-              <a:t> Web API </a:t>
-            </a:r>
-            <a:r>
-              <a:rPr lang="de-CH" dirty="0" err="1" smtClean="0"/>
-              <a:t>OData</a:t>
-            </a:r>
-            <a:r>
-              <a:rPr lang="de-CH" dirty="0" smtClean="0"/>
-              <a:t>, </a:t>
-            </a:r>
-            <a:r>
-              <a:rPr lang="de-CH" dirty="0" err="1" smtClean="0"/>
-              <a:t>single</a:t>
-            </a:r>
-            <a:r>
-              <a:rPr lang="de-CH" dirty="0" smtClean="0"/>
               <a:t> </a:t>
             </a:r>
             <a:r>
               <a:rPr lang="de-CH" dirty="0" err="1" smtClean="0"/>
-              <a:t>transaction</a:t>
-            </a:r>
-            <a:r>
-              <a:rPr lang="de-CH" dirty="0" smtClean="0"/>
-              <a:t> </a:t>
-            </a:r>
-            <a:r>
-              <a:rPr lang="de-CH" dirty="0" err="1" smtClean="0"/>
-              <a:t>possible</a:t>
-            </a:r>
-            <a:r>
-              <a:rPr lang="de-CH" dirty="0" smtClean="0"/>
-              <a:t> </a:t>
-            </a:r>
-            <a:r>
-              <a:rPr lang="de-CH" dirty="0" err="1" smtClean="0"/>
-              <a:t>for</a:t>
-            </a:r>
-            <a:r>
-              <a:rPr lang="de-CH" dirty="0" smtClean="0"/>
-              <a:t> all </a:t>
-            </a:r>
-            <a:r>
-              <a:rPr lang="de-CH" dirty="0" err="1" smtClean="0"/>
-              <a:t>batch</a:t>
-            </a:r>
-            <a:r>
-              <a:rPr lang="de-CH" dirty="0" smtClean="0"/>
-              <a:t> </a:t>
-            </a:r>
-            <a:r>
-              <a:rPr lang="de-CH" dirty="0" err="1" smtClean="0"/>
-              <a:t>requests</a:t>
-            </a:r>
-            <a:r>
-              <a:rPr lang="de-CH" dirty="0" smtClean="0"/>
-              <a:t>, </a:t>
-            </a:r>
-            <a:r>
-              <a:rPr lang="de-CH" dirty="0" err="1" smtClean="0"/>
-              <a:t>or</a:t>
-            </a:r>
-            <a:r>
-              <a:rPr lang="de-CH" dirty="0" smtClean="0"/>
-              <a:t> </a:t>
-            </a:r>
-            <a:r>
-              <a:rPr lang="de-CH" dirty="0" err="1" smtClean="0"/>
-              <a:t>each</a:t>
-            </a:r>
-            <a:r>
-              <a:rPr lang="de-CH" dirty="0" smtClean="0"/>
-              <a:t> </a:t>
-            </a:r>
-            <a:r>
-              <a:rPr lang="de-CH" dirty="0" err="1" smtClean="0"/>
-              <a:t>request</a:t>
-            </a:r>
-            <a:r>
-              <a:rPr lang="de-CH" dirty="0"/>
-              <a:t>.</a:t>
-            </a:r>
-            <a:endParaRPr lang="de-CH" dirty="0"/>
-          </a:p>
-          <a:p>
-            <a:r>
-              <a:rPr lang="de-CH" dirty="0" smtClean="0"/>
-              <a:t>Security; </a:t>
-            </a:r>
-            <a:r>
-              <a:rPr lang="de-CH" dirty="0" err="1" smtClean="0"/>
-              <a:t>uses</a:t>
-            </a:r>
-            <a:r>
-              <a:rPr lang="de-CH" dirty="0" smtClean="0"/>
-              <a:t> OWIN </a:t>
-            </a:r>
-            <a:r>
-              <a:rPr lang="de-CH" dirty="0" err="1" smtClean="0"/>
-              <a:t>security</a:t>
-            </a:r>
-            <a:r>
-              <a:rPr lang="de-CH" dirty="0"/>
-              <a:t> </a:t>
-            </a:r>
-            <a:r>
-              <a:rPr lang="de-CH" dirty="0" err="1" smtClean="0"/>
-              <a:t>model</a:t>
-            </a:r>
-            <a:r>
-              <a:rPr lang="de-CH" dirty="0" smtClean="0"/>
-              <a:t> </a:t>
-            </a:r>
-            <a:endParaRPr lang="de-CH" dirty="0"/>
+              <a:t>ApiController</a:t>
+            </a:r>
+            <a:endParaRPr lang="de-CH" dirty="0" smtClean="0"/>
           </a:p>
         </p:txBody>
       </p:sp>
@@ -7456,10 +7586,34 @@
           </a:p>
         </p:txBody>
       </p:sp>
+      <p:pic>
+        <p:nvPicPr>
+          <p:cNvPr id="6" name="Grafik 5"/>
+          <p:cNvPicPr>
+            <a:picLocks noChangeAspect="1"/>
+          </p:cNvPicPr>
+          <p:nvPr/>
+        </p:nvPicPr>
+        <p:blipFill>
+          <a:blip r:embed="rId2"/>
+          <a:stretch>
+            <a:fillRect/>
+          </a:stretch>
+        </p:blipFill>
+        <p:spPr>
+          <a:xfrm>
+            <a:off x="1080000" y="4149080"/>
+            <a:ext cx="6885913" cy="512440"/>
+          </a:xfrm>
+          <a:prstGeom prst="rect">
+            <a:avLst/>
+          </a:prstGeom>
+        </p:spPr>
+      </p:pic>
     </p:spTree>
     <p:extLst>
       <p:ext uri="{BB962C8B-B14F-4D97-AF65-F5344CB8AC3E}">
-        <p14:creationId xmlns:p14="http://schemas.microsoft.com/office/powerpoint/2010/main" val="2808493261"/>
+        <p14:creationId xmlns:p14="http://schemas.microsoft.com/office/powerpoint/2010/main" val="2227694890"/>
       </p:ext>
     </p:extLst>
   </p:cSld>
@@ -8279,6 +8433,15 @@
 </file>
 
 <file path=customXml/item2.xml><?xml version="1.0" encoding="utf-8"?>
+<?mso-contentType ?>
+<FormTemplates xmlns="http://schemas.microsoft.com/sharepoint/v3/contenttype/forms">
+  <Display>DocumentLibraryForm</Display>
+  <Edit>DocumentLibraryForm</Edit>
+  <New>DocumentLibraryForm</New>
+</FormTemplates>
+</file>
+
+<file path=customXml/item3.xml><?xml version="1.0" encoding="utf-8"?>
 <ct:contentTypeSchema xmlns:ct="http://schemas.microsoft.com/office/2006/metadata/contentType" xmlns:ma="http://schemas.microsoft.com/office/2006/metadata/properties/metaAttributes" ct:_="" ma:_="" ma:contentTypeName="Document" ma:contentTypeID="0x0101009B1271BAB3BD97469364141CDC266217" ma:contentTypeVersion="18" ma:contentTypeDescription="Create a new document." ma:contentTypeScope="" ma:versionID="4ab34ffa81e4289ac366dd042dee0b44">
   <xsd:schema xmlns:xsd="http://www.w3.org/2001/XMLSchema" xmlns:p="http://schemas.microsoft.com/office/2006/metadata/properties" xmlns:ns2="0e489163-6afe-4c56-81b4-2fcc3441f0c8" xmlns:ns3="c4c7ba7a-6051-45d4-8501-79302ee9308f" targetNamespace="http://schemas.microsoft.com/office/2006/metadata/properties" ma:root="true" ma:fieldsID="fd4dc6e2fab02cfa8725ef4fd4332e68" ns2:_="" ns3:_="">
     <xsd:import namespace="0e489163-6afe-4c56-81b4-2fcc3441f0c8"/>
@@ -8360,15 +8523,6 @@
 </ct:contentTypeSchema>
 </file>
 
-<file path=customXml/item3.xml><?xml version="1.0" encoding="utf-8"?>
-<?mso-contentType ?>
-<FormTemplates xmlns="http://schemas.microsoft.com/sharepoint/v3/contenttype/forms">
-  <Display>DocumentLibraryForm</Display>
-  <Edit>DocumentLibraryForm</Edit>
-  <New>DocumentLibraryForm</New>
-</FormTemplates>
-</file>
-
 <file path=customXml/itemProps1.xml><?xml version="1.0" encoding="utf-8"?>
 <ds:datastoreItem xmlns:ds="http://schemas.openxmlformats.org/officeDocument/2006/customXml" ds:itemID="{522F6AE9-0EF6-425D-9073-DA80930CD1E5}">
   <ds:schemaRefs>
@@ -8386,6 +8540,14 @@
 </file>
 
 <file path=customXml/itemProps2.xml><?xml version="1.0" encoding="utf-8"?>
+<ds:datastoreItem xmlns:ds="http://schemas.openxmlformats.org/officeDocument/2006/customXml" ds:itemID="{9AFF41A3-1D4D-43FE-BB40-C98B0057EB79}">
+  <ds:schemaRefs>
+    <ds:schemaRef ds:uri="http://schemas.microsoft.com/sharepoint/v3/contenttype/forms"/>
+  </ds:schemaRefs>
+</ds:datastoreItem>
+</file>
+
+<file path=customXml/itemProps3.xml><?xml version="1.0" encoding="utf-8"?>
 <ds:datastoreItem xmlns:ds="http://schemas.openxmlformats.org/officeDocument/2006/customXml" ds:itemID="{B44422EC-4294-4942-AD7A-B87223D7FA2D}">
   <ds:schemaRefs>
     <ds:schemaRef ds:uri="http://schemas.microsoft.com/office/2006/metadata/contentType"/>
@@ -8401,12 +8563,4 @@
     <ds:schemaRef ds:uri="http://schemas.microsoft.com/office/internal/2005/internalDocumentation"/>
   </ds:schemaRefs>
 </ds:datastoreItem>
-</file>
-
-<file path=customXml/itemProps3.xml><?xml version="1.0" encoding="utf-8"?>
-<ds:datastoreItem xmlns:ds="http://schemas.openxmlformats.org/officeDocument/2006/customXml" ds:itemID="{9AFF41A3-1D4D-43FE-BB40-C98B0057EB79}">
-  <ds:schemaRefs>
-    <ds:schemaRef ds:uri="http://schemas.microsoft.com/sharepoint/v3/contenttype/forms"/>
-  </ds:schemaRefs>
-</ds:datastoreItem>
 </file>
</xml_diff>

<commit_message>
Changed: Small Short Presentation Fix
</commit_message>
<xml_diff>
--- a/WebAPI_Short.pptx
+++ b/WebAPI_Short.pptx
@@ -5742,12 +5742,12 @@
           <a:lstStyle/>
           <a:p>
             <a:r>
-              <a:rPr lang="de-CH" smtClean="0">
+              <a:rPr lang="de-CH" dirty="0" smtClean="0">
                 <a:solidFill>
                   <a:srgbClr val="8B8D8E"/>
                 </a:solidFill>
               </a:rPr>
-              <a:t>Vorname Name, tt.mm.jjjj,  #</a:t>
+              <a:t>#</a:t>
             </a:r>
             <a:fld id="{FAF533A0-CC08-4AD3-B9FD-66E41B46AD42}" type="slidenum">
               <a:rPr lang="de-CH" smtClean="0">

</xml_diff>

<commit_message>
Changed: Short WebAPI presentation
</commit_message>
<xml_diff>
--- a/WebAPI_Short.pptx
+++ b/WebAPI_Short.pptx
@@ -226,7 +226,7 @@
             <a:fld id="{078357F8-8E28-43D5-BF07-FC29592C940A}" type="datetimeFigureOut">
               <a:rPr lang="de-CH" smtClean="0"/>
               <a:pPr/>
-              <a:t>09.09.2014</a:t>
+              <a:t>10.09.2014</a:t>
             </a:fld>
             <a:endParaRPr lang="de-CH"/>
           </a:p>
@@ -394,7 +394,7 @@
             <a:fld id="{3ACFD632-2497-48A7-92DA-4BE68FDDCD20}" type="datetimeFigureOut">
               <a:rPr lang="de-CH" smtClean="0"/>
               <a:pPr/>
-              <a:t>09.09.2014</a:t>
+              <a:t>10.09.2014</a:t>
             </a:fld>
             <a:endParaRPr lang="de-CH"/>
           </a:p>
@@ -4709,6 +4709,14 @@
               <a:t>IoC</a:t>
             </a:r>
             <a:r>
+              <a:rPr lang="de-CH" dirty="0"/>
+              <a:t> </a:t>
+            </a:r>
+            <a:r>
+              <a:rPr lang="de-CH" dirty="0" smtClean="0"/>
+              <a:t>/ DI</a:t>
+            </a:r>
+            <a:r>
               <a:rPr lang="de-CH" dirty="0" smtClean="0"/>
               <a:t> </a:t>
             </a:r>
@@ -4724,9 +4732,38 @@
           </a:p>
           <a:p>
             <a:r>
-              <a:rPr lang="de-CH" dirty="0"/>
-              <a:t>Filters</a:t>
-            </a:r>
+              <a:rPr lang="de-CH" dirty="0" smtClean="0"/>
+              <a:t>Filters (Action, </a:t>
+            </a:r>
+            <a:r>
+              <a:rPr lang="de-CH" dirty="0" err="1" smtClean="0"/>
+              <a:t>Authorisation</a:t>
+            </a:r>
+            <a:r>
+              <a:rPr lang="de-CH" dirty="0" smtClean="0"/>
+              <a:t>, </a:t>
+            </a:r>
+            <a:r>
+              <a:rPr lang="de-CH" dirty="0" err="1" smtClean="0"/>
+              <a:t>Exception</a:t>
+            </a:r>
+            <a:r>
+              <a:rPr lang="de-CH" dirty="0" smtClean="0"/>
+              <a:t>…) -&gt; per Attributes, </a:t>
+            </a:r>
+            <a:r>
+              <a:rPr lang="de-CH" dirty="0" err="1" smtClean="0"/>
+              <a:t>Aspect</a:t>
+            </a:r>
+            <a:r>
+              <a:rPr lang="de-CH" dirty="0" smtClean="0"/>
+              <a:t> </a:t>
+            </a:r>
+            <a:r>
+              <a:rPr lang="de-CH" dirty="0" err="1" smtClean="0"/>
+              <a:t>Oriented</a:t>
+            </a:r>
+            <a:endParaRPr lang="de-CH" dirty="0"/>
           </a:p>
           <a:p>
             <a:r>
@@ -7315,6 +7352,41 @@
         <p:txBody>
           <a:bodyPr/>
           <a:lstStyle/>
+          <a:p>
+            <a:r>
+              <a:rPr lang="de-CH" dirty="0" smtClean="0"/>
+              <a:t>Open Data Protocol </a:t>
+            </a:r>
+            <a:r>
+              <a:rPr lang="de-CH" dirty="0" err="1" smtClean="0"/>
+              <a:t>based</a:t>
+            </a:r>
+            <a:r>
+              <a:rPr lang="de-CH" dirty="0" smtClean="0"/>
+              <a:t> on http </a:t>
+            </a:r>
+            <a:r>
+              <a:rPr lang="de-CH" dirty="0" err="1" smtClean="0"/>
+              <a:t>and</a:t>
+            </a:r>
+            <a:r>
+              <a:rPr lang="de-CH" dirty="0" smtClean="0"/>
+              <a:t> </a:t>
+            </a:r>
+            <a:r>
+              <a:rPr lang="de-CH" dirty="0" err="1" smtClean="0"/>
+              <a:t>using</a:t>
+            </a:r>
+            <a:r>
+              <a:rPr lang="de-CH" dirty="0" smtClean="0"/>
+              <a:t> REST </a:t>
+            </a:r>
+            <a:r>
+              <a:rPr lang="de-CH" dirty="0" err="1" smtClean="0"/>
+              <a:t>methodology</a:t>
+            </a:r>
+            <a:endParaRPr lang="de-CH" dirty="0" smtClean="0"/>
+          </a:p>
           <a:p>
             <a:r>
               <a:rPr lang="de-CH" dirty="0" err="1" smtClean="0"/>
@@ -8422,6 +8494,15 @@
 </file>
 
 <file path=customXml/item1.xml><?xml version="1.0" encoding="utf-8"?>
+<?mso-contentType ?>
+<FormTemplates xmlns="http://schemas.microsoft.com/sharepoint/v3/contenttype/forms">
+  <Display>DocumentLibraryForm</Display>
+  <Edit>DocumentLibraryForm</Edit>
+  <New>DocumentLibraryForm</New>
+</FormTemplates>
+</file>
+
+<file path=customXml/item2.xml><?xml version="1.0" encoding="utf-8"?>
 <p:properties xmlns:p="http://schemas.microsoft.com/office/2006/metadata/properties" xmlns:xsi="http://www.w3.org/2001/XMLSchema-instance">
   <documentManagement>
     <Prozess-Gruppe xmlns="0e489163-6afe-4c56-81b4-2fcc3441f0c8">4</Prozess-Gruppe>
@@ -8430,15 +8511,6 @@
     <_x00c4_nderrungsdatum xmlns="c4c7ba7a-6051-45d4-8501-79302ee9308f" xsi:nil="true"/>
   </documentManagement>
 </p:properties>
-</file>
-
-<file path=customXml/item2.xml><?xml version="1.0" encoding="utf-8"?>
-<?mso-contentType ?>
-<FormTemplates xmlns="http://schemas.microsoft.com/sharepoint/v3/contenttype/forms">
-  <Display>DocumentLibraryForm</Display>
-  <Edit>DocumentLibraryForm</Edit>
-  <New>DocumentLibraryForm</New>
-</FormTemplates>
 </file>
 
 <file path=customXml/item3.xml><?xml version="1.0" encoding="utf-8"?>
@@ -8524,6 +8596,14 @@
 </file>
 
 <file path=customXml/itemProps1.xml><?xml version="1.0" encoding="utf-8"?>
+<ds:datastoreItem xmlns:ds="http://schemas.openxmlformats.org/officeDocument/2006/customXml" ds:itemID="{9AFF41A3-1D4D-43FE-BB40-C98B0057EB79}">
+  <ds:schemaRefs>
+    <ds:schemaRef ds:uri="http://schemas.microsoft.com/sharepoint/v3/contenttype/forms"/>
+  </ds:schemaRefs>
+</ds:datastoreItem>
+</file>
+
+<file path=customXml/itemProps2.xml><?xml version="1.0" encoding="utf-8"?>
 <ds:datastoreItem xmlns:ds="http://schemas.openxmlformats.org/officeDocument/2006/customXml" ds:itemID="{522F6AE9-0EF6-425D-9073-DA80930CD1E5}">
   <ds:schemaRefs>
     <ds:schemaRef ds:uri="http://purl.org/dc/elements/1.1/"/>
@@ -8535,14 +8615,6 @@
     <ds:schemaRef ds:uri="http://schemas.openxmlformats.org/package/2006/metadata/core-properties"/>
     <ds:schemaRef ds:uri="0e489163-6afe-4c56-81b4-2fcc3441f0c8"/>
     <ds:schemaRef ds:uri="http://schemas.microsoft.com/office/2006/metadata/properties"/>
-  </ds:schemaRefs>
-</ds:datastoreItem>
-</file>
-
-<file path=customXml/itemProps2.xml><?xml version="1.0" encoding="utf-8"?>
-<ds:datastoreItem xmlns:ds="http://schemas.openxmlformats.org/officeDocument/2006/customXml" ds:itemID="{9AFF41A3-1D4D-43FE-BB40-C98B0057EB79}">
-  <ds:schemaRefs>
-    <ds:schemaRef ds:uri="http://schemas.microsoft.com/sharepoint/v3/contenttype/forms"/>
   </ds:schemaRefs>
 </ds:datastoreItem>
 </file>

</xml_diff>